<commit_message>
Translated UI sketches into English
</commit_message>
<xml_diff>
--- a/docs/notenapp-praesi.pptx
+++ b/docs/notenapp-praesi.pptx
@@ -206,7 +206,7 @@
             <a:fld id="{433F66C5-ED08-47C6-B5C9-779C66E0356B}" type="datetimeFigureOut">
               <a:rPr lang="de-DE" smtClean="0"/>
               <a:pPr/>
-              <a:t>14.01.2013</a:t>
+              <a:t>20.01.2013</a:t>
             </a:fld>
             <a:endParaRPr lang="de-DE"/>
           </a:p>
@@ -377,7 +377,7 @@
     </p:spTree>
     <p:extLst>
       <p:ext uri="{BB962C8B-B14F-4D97-AF65-F5344CB8AC3E}">
-        <p14:creationId xmlns:p14="http://schemas.microsoft.com/office/powerpoint/2010/main" xmlns="" val="163652337"/>
+        <p14:creationId xmlns="" xmlns:p14="http://schemas.microsoft.com/office/powerpoint/2010/main" val="163652337"/>
       </p:ext>
     </p:extLst>
   </p:cSld>
@@ -4862,17 +4862,12 @@
             </a:pPr>
             <a:r>
               <a:rPr lang="de-DE" sz="2400" b="1" dirty="0" smtClean="0"/>
-              <a:t>Problem</a:t>
-            </a:r>
-            <a:r>
-              <a:rPr lang="de-DE" sz="2400" b="1" dirty="0" smtClean="0"/>
-              <a:t>:</a:t>
+              <a:t>Problem:</a:t>
             </a:r>
             <a:r>
               <a:rPr lang="de-DE" sz="2400" dirty="0" smtClean="0"/>
               <a:t> </a:t>
             </a:r>
-            <a:endParaRPr lang="de-DE" sz="2400" dirty="0" smtClean="0"/>
           </a:p>
           <a:p>
             <a:pPr>
@@ -4952,11 +4947,7 @@
             </a:r>
             <a:r>
               <a:rPr lang="de-DE" sz="2400" dirty="0" smtClean="0"/>
-              <a:t> </a:t>
-            </a:r>
-            <a:r>
-              <a:rPr lang="de-DE" sz="2400" dirty="0" smtClean="0"/>
-              <a:t>HTML </a:t>
+              <a:t> HTML </a:t>
             </a:r>
             <a:r>
               <a:rPr lang="de-DE" sz="2400" dirty="0" err="1" smtClean="0"/>
@@ -5256,22 +5247,14 @@
             </a:pPr>
             <a:r>
               <a:rPr lang="de-DE" sz="2400" b="1" dirty="0" smtClean="0"/>
-              <a:t>Solution </a:t>
-            </a:r>
-            <a:r>
-              <a:rPr lang="de-DE" sz="2400" b="1" dirty="0" smtClean="0"/>
-              <a:t>1:</a:t>
+              <a:t>Solution 1:</a:t>
             </a:r>
           </a:p>
           <a:p>
             <a:pPr lvl="1"/>
             <a:r>
               <a:rPr lang="de-DE" sz="2400" dirty="0" smtClean="0"/>
-              <a:t>Parse </a:t>
-            </a:r>
-            <a:r>
-              <a:rPr lang="de-DE" sz="2400" dirty="0" smtClean="0"/>
-              <a:t>XHTML </a:t>
+              <a:t>Parse XHTML </a:t>
             </a:r>
             <a:r>
               <a:rPr lang="de-DE" sz="2400" dirty="0" err="1" smtClean="0"/>
@@ -5323,16 +5306,7 @@
                 </a:solidFill>
                 <a:sym typeface="Wingdings" pitchFamily="2" charset="2"/>
               </a:rPr>
-              <a:t></a:t>
-            </a:r>
-            <a:r>
-              <a:rPr lang="de-DE" sz="2400" dirty="0" smtClean="0">
-                <a:solidFill>
-                  <a:srgbClr val="FF0000"/>
-                </a:solidFill>
-                <a:sym typeface="Wingdings" pitchFamily="2" charset="2"/>
-              </a:rPr>
-              <a:t>Fails </a:t>
+              <a:t>Fails </a:t>
             </a:r>
             <a:r>
               <a:rPr lang="de-DE" sz="2400" dirty="0" err="1" smtClean="0">
@@ -5404,23 +5378,8 @@
                 </a:solidFill>
                 <a:sym typeface="Wingdings" pitchFamily="2" charset="2"/>
               </a:rPr>
-              <a:t> valid XHTML</a:t>
-            </a:r>
-            <a:r>
-              <a:rPr lang="de-DE" sz="2400" dirty="0" smtClean="0">
-                <a:solidFill>
-                  <a:srgbClr val="FF0000"/>
-                </a:solidFill>
-                <a:sym typeface="Wingdings" pitchFamily="2" charset="2"/>
-              </a:rPr>
-              <a:t>!</a:t>
-            </a:r>
-            <a:endParaRPr lang="de-DE" sz="2400" dirty="0" smtClean="0">
-              <a:solidFill>
-                <a:srgbClr val="FF0000"/>
-              </a:solidFill>
-              <a:sym typeface="Wingdings" pitchFamily="2" charset="2"/>
-            </a:endParaRPr>
+              <a:t> valid XHTML!</a:t>
+            </a:r>
           </a:p>
         </p:txBody>
       </p:sp>
@@ -5453,13 +5412,7 @@
               <a:rPr lang="de-DE" sz="2400" b="1" dirty="0" smtClean="0">
                 <a:sym typeface="Wingdings" pitchFamily="2" charset="2"/>
               </a:rPr>
-              <a:t>Solution </a:t>
-            </a:r>
-            <a:r>
-              <a:rPr lang="de-DE" sz="2400" b="1" dirty="0" smtClean="0">
-                <a:sym typeface="Wingdings" pitchFamily="2" charset="2"/>
-              </a:rPr>
-              <a:t>2:</a:t>
+              <a:t>Solution 2:</a:t>
             </a:r>
           </a:p>
           <a:p>
@@ -5468,13 +5421,7 @@
               <a:rPr lang="de-DE" sz="2400" dirty="0" smtClean="0">
                 <a:sym typeface="Wingdings" pitchFamily="2" charset="2"/>
               </a:rPr>
-              <a:t>Create </a:t>
-            </a:r>
-            <a:r>
-              <a:rPr lang="de-DE" sz="2400" dirty="0" smtClean="0">
-                <a:sym typeface="Wingdings" pitchFamily="2" charset="2"/>
-              </a:rPr>
-              <a:t>a </a:t>
+              <a:t>Create a </a:t>
             </a:r>
             <a:r>
               <a:rPr lang="de-DE" sz="2400" dirty="0" err="1" smtClean="0">
@@ -5781,11 +5728,7 @@
             </a:pPr>
             <a:r>
               <a:rPr lang="de-DE" sz="9600" b="1" dirty="0" smtClean="0"/>
-              <a:t>Demo</a:t>
-            </a:r>
-            <a:r>
-              <a:rPr lang="de-DE" sz="9600" b="1" dirty="0" smtClean="0"/>
-              <a:t>!</a:t>
+              <a:t>Demo!</a:t>
             </a:r>
           </a:p>
           <a:p>
@@ -5925,7 +5868,7 @@
     </p:spTree>
     <p:extLst>
       <p:ext uri="{BB962C8B-B14F-4D97-AF65-F5344CB8AC3E}">
-        <p14:creationId xmlns:p14="http://schemas.microsoft.com/office/powerpoint/2010/main" xmlns="" val="2209468386"/>
+        <p14:creationId xmlns="" xmlns:p14="http://schemas.microsoft.com/office/powerpoint/2010/main" val="2209468386"/>
       </p:ext>
     </p:extLst>
   </p:cSld>
@@ -6050,7 +5993,6 @@
               <a:rPr lang="de-DE" dirty="0" smtClean="0"/>
               <a:t>, …</a:t>
             </a:r>
-            <a:endParaRPr lang="de-DE" dirty="0" smtClean="0"/>
           </a:p>
           <a:p>
             <a:r>
@@ -6705,35 +6647,21 @@
             </a:r>
             <a:r>
               <a:rPr lang="de-DE" dirty="0" smtClean="0"/>
-              <a:t> </a:t>
-            </a:r>
+              <a:t> 50/50</a:t>
+            </a:r>
+          </a:p>
+          <a:p>
+            <a:pPr lvl="1"/>
             <a:r>
               <a:rPr lang="de-DE" dirty="0" smtClean="0"/>
-              <a:t>50/50</a:t>
-            </a:r>
-            <a:endParaRPr lang="de-DE" dirty="0" smtClean="0"/>
+              <a:t>Manuel: More QIS-Server backend</a:t>
+            </a:r>
           </a:p>
           <a:p>
             <a:pPr lvl="1"/>
             <a:r>
               <a:rPr lang="de-DE" dirty="0" smtClean="0"/>
-              <a:t>Manuel: </a:t>
-            </a:r>
-            <a:r>
-              <a:rPr lang="de-DE" dirty="0" smtClean="0"/>
-              <a:t>More QIS-Server backend</a:t>
-            </a:r>
-            <a:endParaRPr lang="de-DE" dirty="0" smtClean="0"/>
-          </a:p>
-          <a:p>
-            <a:pPr lvl="1"/>
-            <a:r>
-              <a:rPr lang="de-DE" dirty="0" smtClean="0"/>
-              <a:t>Andreas: </a:t>
-            </a:r>
-            <a:r>
-              <a:rPr lang="de-DE" dirty="0" smtClean="0"/>
-              <a:t>More </a:t>
+              <a:t>Andreas: More </a:t>
             </a:r>
             <a:r>
               <a:rPr lang="de-DE" dirty="0" err="1" smtClean="0"/>
@@ -6751,7 +6679,6 @@
               <a:rPr lang="de-DE" dirty="0" smtClean="0"/>
               <a:t> GUI</a:t>
             </a:r>
-            <a:endParaRPr lang="de-DE" dirty="0" smtClean="0"/>
           </a:p>
           <a:p>
             <a:endParaRPr lang="de-DE" dirty="0" smtClean="0"/>
@@ -7009,7 +6936,6 @@
               <a:rPr lang="de-DE" dirty="0" smtClean="0"/>
               <a:t>?</a:t>
             </a:r>
-            <a:endParaRPr lang="de-DE" dirty="0" smtClean="0"/>
           </a:p>
         </p:txBody>
       </p:sp>
@@ -9622,8 +9548,8 @@
           <a:p>
             <a:pPr algn="ctr"/>
             <a:r>
-              <a:rPr lang="de-DE" dirty="0" smtClean="0"/>
-              <a:t>Speichern</a:t>
+              <a:rPr lang="de-DE" smtClean="0"/>
+              <a:t>Save</a:t>
             </a:r>
             <a:endParaRPr lang="de-DE" dirty="0"/>
           </a:p>
@@ -9638,7 +9564,7 @@
         <p:spPr>
           <a:xfrm>
             <a:off x="6228184" y="2996952"/>
-            <a:ext cx="1731756" cy="338554"/>
+            <a:ext cx="880369" cy="338554"/>
           </a:xfrm>
           <a:prstGeom prst="rect">
             <a:avLst/>
@@ -9653,7 +9579,7 @@
           <a:p>
             <a:r>
               <a:rPr lang="de-DE" sz="1600" dirty="0" smtClean="0"/>
-              <a:t>RZ-Benutzername:</a:t>
+              <a:t>RZ User:</a:t>
             </a:r>
             <a:endParaRPr lang="de-DE" sz="1600" dirty="0"/>
           </a:p>
@@ -9727,7 +9653,7 @@
         <p:spPr>
           <a:xfrm>
             <a:off x="6228184" y="3573016"/>
-            <a:ext cx="1264129" cy="338554"/>
+            <a:ext cx="1283749" cy="338554"/>
           </a:xfrm>
           <a:prstGeom prst="rect">
             <a:avLst/>
@@ -9742,7 +9668,7 @@
           <a:p>
             <a:r>
               <a:rPr lang="de-DE" sz="1600" dirty="0" smtClean="0"/>
-              <a:t>RZ-Passwort:</a:t>
+              <a:t>RZ Password:</a:t>
             </a:r>
             <a:endParaRPr lang="de-DE" sz="1600" dirty="0"/>
           </a:p>
@@ -11901,11 +11827,7 @@
             </a:r>
             <a:r>
               <a:rPr lang="de-DE" dirty="0" smtClean="0"/>
-              <a:t> </a:t>
-            </a:r>
-            <a:r>
-              <a:rPr lang="de-DE" dirty="0" smtClean="0"/>
-              <a:t>grades </a:t>
+              <a:t> grades </a:t>
             </a:r>
             <a:r>
               <a:rPr lang="de-DE" dirty="0" err="1" smtClean="0"/>
@@ -12653,15 +12575,7 @@
                   <a:schemeClr val="tx1"/>
                 </a:solidFill>
               </a:rPr>
-              <a:t>h</a:t>
-            </a:r>
-            <a:r>
-              <a:rPr lang="de-DE" sz="2400" b="1" dirty="0" err="1" smtClean="0">
-                <a:solidFill>
-                  <a:schemeClr val="tx1"/>
-                </a:solidFill>
-              </a:rPr>
-              <a:t>elper</a:t>
+              <a:t>helper</a:t>
             </a:r>
             <a:r>
               <a:rPr lang="de-DE" sz="2400" b="1" dirty="0" smtClean="0">
@@ -15777,15 +15691,7 @@
                   <a:schemeClr val="tx1"/>
                 </a:solidFill>
               </a:rPr>
-              <a:t>degree</a:t>
-            </a:r>
-            <a:r>
-              <a:rPr lang="de-DE" sz="1200" dirty="0" err="1" smtClean="0">
-                <a:solidFill>
-                  <a:schemeClr val="tx1"/>
-                </a:solidFill>
-              </a:rPr>
-              <a:t>e</a:t>
+              <a:t>degreee</a:t>
             </a:r>
             <a:endParaRPr lang="de-DE" sz="1200" dirty="0">
               <a:solidFill>
@@ -16394,11 +16300,7 @@
             </a:r>
             <a:r>
               <a:rPr lang="de-DE" dirty="0" smtClean="0"/>
-              <a:t> </a:t>
-            </a:r>
-            <a:r>
-              <a:rPr lang="de-DE" dirty="0" smtClean="0"/>
-              <a:t>UI</a:t>
+              <a:t> UI</a:t>
             </a:r>
             <a:endParaRPr lang="de-DE" dirty="0"/>
           </a:p>
@@ -16950,17 +16852,12 @@
             </a:r>
             <a:r>
               <a:rPr lang="de-DE" sz="4000" b="1" dirty="0" smtClean="0"/>
-              <a:t>Problem</a:t>
-            </a:r>
-            <a:r>
-              <a:rPr lang="de-DE" sz="4000" b="1" dirty="0" smtClean="0"/>
-              <a:t>:</a:t>
+              <a:t>Problem:</a:t>
             </a:r>
             <a:r>
               <a:rPr lang="de-DE" sz="4000" dirty="0" smtClean="0"/>
               <a:t> </a:t>
             </a:r>
-            <a:endParaRPr lang="de-DE" sz="4000" dirty="0" smtClean="0"/>
           </a:p>
           <a:p>
             <a:pPr lvl="1">
@@ -18207,11 +18104,7 @@
             </a:r>
             <a:r>
               <a:rPr lang="de-DE" sz="2400" b="1" dirty="0" smtClean="0"/>
-              <a:t>Problem</a:t>
-            </a:r>
-            <a:r>
-              <a:rPr lang="de-DE" sz="2400" b="1" dirty="0" smtClean="0"/>
-              <a:t>: </a:t>
+              <a:t>Problem: </a:t>
             </a:r>
           </a:p>
           <a:p>
@@ -18220,11 +18113,7 @@
             </a:pPr>
             <a:r>
               <a:rPr lang="de-DE" sz="2400" dirty="0" smtClean="0"/>
-              <a:t>	</a:t>
-            </a:r>
-            <a:r>
-              <a:rPr lang="de-DE" sz="2400" dirty="0" smtClean="0"/>
-              <a:t>	</a:t>
+              <a:t>		</a:t>
             </a:r>
             <a:r>
               <a:rPr lang="de-DE" sz="2400" dirty="0" err="1" smtClean="0"/>
@@ -18232,11 +18121,7 @@
             </a:r>
             <a:r>
               <a:rPr lang="de-DE" sz="2400" dirty="0" smtClean="0"/>
-              <a:t> </a:t>
-            </a:r>
-            <a:r>
-              <a:rPr lang="de-DE" sz="2400" dirty="0" smtClean="0"/>
-              <a:t>do </a:t>
+              <a:t> do </a:t>
             </a:r>
             <a:r>
               <a:rPr lang="de-DE" sz="2400" dirty="0" err="1" smtClean="0"/>
@@ -18268,13 +18153,8 @@
             </a:r>
             <a:r>
               <a:rPr lang="de-DE" sz="2400" dirty="0" smtClean="0"/>
-              <a:t> HTTPS</a:t>
-            </a:r>
-            <a:r>
-              <a:rPr lang="de-DE" sz="2400" dirty="0" smtClean="0"/>
-              <a:t>?</a:t>
-            </a:r>
-            <a:endParaRPr lang="de-DE" sz="2400" dirty="0" smtClean="0"/>
+              <a:t> HTTPS?</a:t>
+            </a:r>
           </a:p>
         </p:txBody>
       </p:sp>

</xml_diff>

<commit_message>
Added Stop times for demo video
</commit_message>
<xml_diff>
--- a/docs/notenapp-praesi.pptx
+++ b/docs/notenapp-praesi.pptx
@@ -206,7 +206,7 @@
             <a:fld id="{433F66C5-ED08-47C6-B5C9-779C66E0356B}" type="datetimeFigureOut">
               <a:rPr lang="de-DE" smtClean="0"/>
               <a:pPr/>
-              <a:t>22.01.2013</a:t>
+              <a:t>23.01.2013</a:t>
             </a:fld>
             <a:endParaRPr lang="de-DE"/>
           </a:p>
@@ -377,7 +377,7 @@
     </p:spTree>
     <p:extLst>
       <p:ext uri="{BB962C8B-B14F-4D97-AF65-F5344CB8AC3E}">
-        <p14:creationId xmlns="" xmlns:p14="http://schemas.microsoft.com/office/powerpoint/2010/main" val="163652337"/>
+        <p14:creationId xmlns:p14="http://schemas.microsoft.com/office/powerpoint/2010/main" val="163652337"/>
       </p:ext>
     </p:extLst>
   </p:cSld>
@@ -783,8 +783,22 @@
           <a:lstStyle/>
           <a:p>
             <a:r>
+              <a:rPr lang="de-DE" smtClean="0"/>
+              <a:t>Manuel</a:t>
+            </a:r>
+            <a:endParaRPr lang="de-DE" dirty="0" smtClean="0"/>
+          </a:p>
+          <a:p>
+            <a:endParaRPr lang="de-DE" dirty="0" smtClean="0"/>
+          </a:p>
+          <a:p>
+            <a:r>
               <a:rPr lang="de-DE" dirty="0" smtClean="0"/>
-              <a:t>1.</a:t>
+              <a:t>1</a:t>
+            </a:r>
+            <a:r>
+              <a:rPr lang="de-DE" dirty="0" smtClean="0"/>
+              <a:t>.</a:t>
             </a:r>
             <a:r>
               <a:rPr lang="de-DE" baseline="0" dirty="0" smtClean="0"/>
@@ -849,12 +863,30 @@
           <a:p>
             <a:r>
               <a:rPr lang="de-DE" dirty="0" smtClean="0"/>
-              <a:t>STOP 5. Gefundene</a:t>
+              <a:t>STOP bei 0:45</a:t>
+            </a:r>
+          </a:p>
+          <a:p>
+            <a:endParaRPr lang="de-DE" dirty="0" smtClean="0"/>
+          </a:p>
+          <a:p>
+            <a:r>
+              <a:rPr lang="de-DE" dirty="0" smtClean="0"/>
+              <a:t>5</a:t>
+            </a:r>
+            <a:r>
+              <a:rPr lang="de-DE" dirty="0" smtClean="0"/>
+              <a:t>. Gefundene</a:t>
             </a:r>
             <a:r>
               <a:rPr lang="de-DE" baseline="0" dirty="0" smtClean="0"/>
-              <a:t> Daten präsentieren</a:t>
-            </a:r>
+              <a:t> Daten </a:t>
+            </a:r>
+            <a:r>
+              <a:rPr lang="de-DE" baseline="0" dirty="0" smtClean="0"/>
+              <a:t>präsentieren</a:t>
+            </a:r>
+            <a:endParaRPr lang="de-DE" baseline="0" dirty="0" smtClean="0"/>
           </a:p>
           <a:p>
             <a:r>
@@ -865,7 +897,24 @@
           <a:p>
             <a:r>
               <a:rPr lang="de-DE" baseline="0" dirty="0" smtClean="0"/>
-              <a:t>STOP 7. </a:t>
+              <a:t>STOP </a:t>
+            </a:r>
+            <a:r>
+              <a:rPr lang="de-DE" baseline="0" dirty="0" smtClean="0"/>
+              <a:t>bei 0:54</a:t>
+            </a:r>
+          </a:p>
+          <a:p>
+            <a:endParaRPr lang="de-DE" baseline="0" dirty="0" smtClean="0"/>
+          </a:p>
+          <a:p>
+            <a:r>
+              <a:rPr lang="de-DE" baseline="0" dirty="0" smtClean="0"/>
+              <a:t>7</a:t>
+            </a:r>
+            <a:r>
+              <a:rPr lang="de-DE" baseline="0" dirty="0" smtClean="0"/>
+              <a:t>. </a:t>
             </a:r>
             <a:r>
               <a:rPr lang="de-DE" baseline="0" dirty="0" err="1" smtClean="0"/>
@@ -891,7 +940,20 @@
           <a:p>
             <a:r>
               <a:rPr lang="de-DE" baseline="0" dirty="0" smtClean="0"/>
-              <a:t>STOP 10. Clear </a:t>
+              <a:t>STOP bei 1:53</a:t>
+            </a:r>
+          </a:p>
+          <a:p>
+            <a:endParaRPr lang="de-DE" baseline="0" dirty="0" smtClean="0"/>
+          </a:p>
+          <a:p>
+            <a:r>
+              <a:rPr lang="de-DE" baseline="0" dirty="0" smtClean="0"/>
+              <a:t>10</a:t>
+            </a:r>
+            <a:r>
+              <a:rPr lang="de-DE" baseline="0" dirty="0" smtClean="0"/>
+              <a:t>. Clear </a:t>
             </a:r>
             <a:r>
               <a:rPr lang="de-DE" baseline="0" dirty="0" err="1" smtClean="0"/>
@@ -919,7 +981,20 @@
           <a:p>
             <a:r>
               <a:rPr lang="de-DE" dirty="0" smtClean="0"/>
-              <a:t>STOP 12. und </a:t>
+              <a:t>STOP bei 2:20</a:t>
+            </a:r>
+          </a:p>
+          <a:p>
+            <a:endParaRPr lang="de-DE" dirty="0" smtClean="0"/>
+          </a:p>
+          <a:p>
+            <a:r>
+              <a:rPr lang="de-DE" dirty="0" smtClean="0"/>
+              <a:t>12</a:t>
+            </a:r>
+            <a:r>
+              <a:rPr lang="de-DE" dirty="0" smtClean="0"/>
+              <a:t>. und </a:t>
             </a:r>
             <a:r>
               <a:rPr lang="de-DE" dirty="0" err="1" smtClean="0"/>
@@ -1423,11 +1498,7 @@
             </a:pPr>
             <a:r>
               <a:rPr lang="de-DE" dirty="0" smtClean="0"/>
-              <a:t>Refresh </a:t>
-            </a:r>
-            <a:r>
-              <a:rPr lang="de-DE" dirty="0" smtClean="0"/>
-              <a:t>Button</a:t>
+              <a:t>Refresh Button</a:t>
             </a:r>
           </a:p>
           <a:p>
@@ -7026,7 +7097,7 @@
     </p:spTree>
     <p:extLst>
       <p:ext uri="{BB962C8B-B14F-4D97-AF65-F5344CB8AC3E}">
-        <p14:creationId xmlns="" xmlns:p14="http://schemas.microsoft.com/office/powerpoint/2010/main" val="2209468386"/>
+        <p14:creationId xmlns:p14="http://schemas.microsoft.com/office/powerpoint/2010/main" val="2209468386"/>
       </p:ext>
     </p:extLst>
   </p:cSld>

</xml_diff>

<commit_message>
Added some final notes on the power point slides
</commit_message>
<xml_diff>
--- a/docs/notenapp-praesi.pptx
+++ b/docs/notenapp-praesi.pptx
@@ -377,7 +377,7 @@
     </p:spTree>
     <p:extLst>
       <p:ext uri="{BB962C8B-B14F-4D97-AF65-F5344CB8AC3E}">
-        <p14:creationId xmlns:p14="http://schemas.microsoft.com/office/powerpoint/2010/main" val="163652337"/>
+        <p14:creationId xmlns:p14="http://schemas.microsoft.com/office/powerpoint/2010/main" xmlns="" val="163652337"/>
       </p:ext>
     </p:extLst>
   </p:cSld>
@@ -702,6 +702,867 @@
               <a:t>Manuel</a:t>
             </a:r>
           </a:p>
+          <a:p>
+            <a:pPr marL="0" marR="0" indent="0" algn="l" defTabSz="914400" rtl="0" eaLnBrk="1" fontAlgn="auto" latinLnBrk="0" hangingPunct="1">
+              <a:lnSpc>
+                <a:spcPct val="100000"/>
+              </a:lnSpc>
+              <a:spcBef>
+                <a:spcPts val="0"/>
+              </a:spcBef>
+              <a:spcAft>
+                <a:spcPts val="0"/>
+              </a:spcAft>
+              <a:buClrTx/>
+              <a:buSzTx/>
+              <a:buFontTx/>
+              <a:buNone/>
+              <a:tabLst/>
+              <a:defRPr/>
+            </a:pPr>
+            <a:endParaRPr lang="de-DE" dirty="0" smtClean="0"/>
+          </a:p>
+          <a:p>
+            <a:pPr marL="0" marR="0" indent="0" algn="l" defTabSz="914400" rtl="0" eaLnBrk="1" fontAlgn="auto" latinLnBrk="0" hangingPunct="1">
+              <a:lnSpc>
+                <a:spcPct val="100000"/>
+              </a:lnSpc>
+              <a:spcBef>
+                <a:spcPts val="0"/>
+              </a:spcBef>
+              <a:spcAft>
+                <a:spcPts val="0"/>
+              </a:spcAft>
+              <a:buClrTx/>
+              <a:buSzTx/>
+              <a:buFontTx/>
+              <a:buNone/>
+              <a:tabLst/>
+              <a:defRPr/>
+            </a:pPr>
+            <a:r>
+              <a:rPr lang="de-DE" dirty="0" err="1" smtClean="0"/>
+              <a:t>Once</a:t>
+            </a:r>
+            <a:r>
+              <a:rPr lang="de-DE" dirty="0" smtClean="0"/>
+              <a:t> </a:t>
+            </a:r>
+            <a:r>
+              <a:rPr lang="de-DE" dirty="0" err="1" smtClean="0"/>
+              <a:t>we</a:t>
+            </a:r>
+            <a:r>
+              <a:rPr lang="de-DE" dirty="0" smtClean="0"/>
+              <a:t> </a:t>
+            </a:r>
+            <a:r>
+              <a:rPr lang="de-DE" dirty="0" err="1" smtClean="0"/>
+              <a:t>have</a:t>
+            </a:r>
+            <a:r>
+              <a:rPr lang="de-DE" dirty="0" smtClean="0"/>
+              <a:t> </a:t>
+            </a:r>
+            <a:r>
+              <a:rPr lang="de-DE" dirty="0" err="1" smtClean="0"/>
+              <a:t>fetched</a:t>
+            </a:r>
+            <a:r>
+              <a:rPr lang="de-DE" baseline="0" dirty="0" smtClean="0"/>
+              <a:t> </a:t>
+            </a:r>
+            <a:r>
+              <a:rPr lang="de-DE" baseline="0" dirty="0" err="1" smtClean="0"/>
+              <a:t>the</a:t>
+            </a:r>
+            <a:r>
+              <a:rPr lang="de-DE" baseline="0" dirty="0" smtClean="0"/>
+              <a:t> </a:t>
+            </a:r>
+            <a:r>
+              <a:rPr lang="de-DE" baseline="0" dirty="0" err="1" smtClean="0"/>
+              <a:t>websites</a:t>
+            </a:r>
+            <a:r>
+              <a:rPr lang="de-DE" baseline="0" dirty="0" smtClean="0"/>
+              <a:t> </a:t>
+            </a:r>
+            <a:r>
+              <a:rPr lang="de-DE" baseline="0" dirty="0" err="1" smtClean="0"/>
+              <a:t>as</a:t>
+            </a:r>
+            <a:r>
+              <a:rPr lang="de-DE" baseline="0" dirty="0" smtClean="0"/>
+              <a:t> HTML </a:t>
+            </a:r>
+            <a:r>
+              <a:rPr lang="de-DE" baseline="0" dirty="0" err="1" smtClean="0"/>
+              <a:t>files</a:t>
+            </a:r>
+            <a:r>
+              <a:rPr lang="de-DE" baseline="0" dirty="0" smtClean="0"/>
+              <a:t>, </a:t>
+            </a:r>
+            <a:r>
+              <a:rPr lang="de-DE" baseline="0" dirty="0" err="1" smtClean="0"/>
+              <a:t>we</a:t>
+            </a:r>
+            <a:r>
+              <a:rPr lang="de-DE" baseline="0" dirty="0" smtClean="0"/>
+              <a:t> </a:t>
+            </a:r>
+            <a:r>
+              <a:rPr lang="de-DE" baseline="0" dirty="0" err="1" smtClean="0"/>
+              <a:t>need</a:t>
+            </a:r>
+            <a:r>
+              <a:rPr lang="de-DE" baseline="0" dirty="0" smtClean="0"/>
+              <a:t> a </a:t>
+            </a:r>
+            <a:r>
+              <a:rPr lang="de-DE" baseline="0" dirty="0" err="1" smtClean="0"/>
+              <a:t>way</a:t>
+            </a:r>
+            <a:r>
+              <a:rPr lang="de-DE" baseline="0" dirty="0" smtClean="0"/>
+              <a:t> </a:t>
+            </a:r>
+            <a:r>
+              <a:rPr lang="de-DE" baseline="0" dirty="0" err="1" smtClean="0"/>
+              <a:t>to</a:t>
+            </a:r>
+            <a:r>
+              <a:rPr lang="de-DE" baseline="0" dirty="0" smtClean="0"/>
+              <a:t> </a:t>
+            </a:r>
+            <a:r>
+              <a:rPr lang="de-DE" baseline="0" dirty="0" err="1" smtClean="0"/>
+              <a:t>extract</a:t>
+            </a:r>
+            <a:r>
+              <a:rPr lang="de-DE" baseline="0" dirty="0" smtClean="0"/>
+              <a:t> </a:t>
+            </a:r>
+            <a:r>
+              <a:rPr lang="de-DE" baseline="0" dirty="0" err="1" smtClean="0"/>
+              <a:t>the</a:t>
+            </a:r>
+            <a:r>
+              <a:rPr lang="de-DE" baseline="0" dirty="0" smtClean="0"/>
+              <a:t> </a:t>
+            </a:r>
+            <a:r>
+              <a:rPr lang="de-DE" baseline="0" dirty="0" err="1" smtClean="0"/>
+              <a:t>degrees</a:t>
+            </a:r>
+            <a:r>
+              <a:rPr lang="de-DE" baseline="0" dirty="0" smtClean="0"/>
+              <a:t> </a:t>
+            </a:r>
+            <a:r>
+              <a:rPr lang="de-DE" baseline="0" dirty="0" err="1" smtClean="0"/>
+              <a:t>and</a:t>
+            </a:r>
+            <a:r>
+              <a:rPr lang="de-DE" baseline="0" dirty="0" smtClean="0"/>
+              <a:t> grades.</a:t>
+            </a:r>
+          </a:p>
+          <a:p>
+            <a:pPr marL="0" marR="0" indent="0" algn="l" defTabSz="914400" rtl="0" eaLnBrk="1" fontAlgn="auto" latinLnBrk="0" hangingPunct="1">
+              <a:lnSpc>
+                <a:spcPct val="100000"/>
+              </a:lnSpc>
+              <a:spcBef>
+                <a:spcPts val="0"/>
+              </a:spcBef>
+              <a:spcAft>
+                <a:spcPts val="0"/>
+              </a:spcAft>
+              <a:buClrTx/>
+              <a:buSzTx/>
+              <a:buFontTx/>
+              <a:buNone/>
+              <a:tabLst/>
+              <a:defRPr/>
+            </a:pPr>
+            <a:r>
+              <a:rPr lang="de-DE" baseline="0" dirty="0" err="1" smtClean="0"/>
+              <a:t>Has</a:t>
+            </a:r>
+            <a:r>
+              <a:rPr lang="de-DE" baseline="0" dirty="0" smtClean="0"/>
+              <a:t> </a:t>
+            </a:r>
+            <a:r>
+              <a:rPr lang="de-DE" baseline="0" dirty="0" err="1" smtClean="0"/>
+              <a:t>anyone</a:t>
+            </a:r>
+            <a:r>
+              <a:rPr lang="de-DE" baseline="0" dirty="0" smtClean="0"/>
+              <a:t> a </a:t>
+            </a:r>
+            <a:r>
+              <a:rPr lang="de-DE" baseline="0" dirty="0" err="1" smtClean="0"/>
+              <a:t>idea</a:t>
+            </a:r>
+            <a:r>
+              <a:rPr lang="de-DE" baseline="0" dirty="0" smtClean="0"/>
+              <a:t> </a:t>
+            </a:r>
+            <a:r>
+              <a:rPr lang="de-DE" baseline="0" dirty="0" err="1" smtClean="0"/>
+              <a:t>how</a:t>
+            </a:r>
+            <a:r>
+              <a:rPr lang="de-DE" baseline="0" dirty="0" smtClean="0"/>
+              <a:t> </a:t>
+            </a:r>
+            <a:r>
+              <a:rPr lang="de-DE" baseline="0" dirty="0" err="1" smtClean="0"/>
+              <a:t>this</a:t>
+            </a:r>
+            <a:r>
+              <a:rPr lang="de-DE" baseline="0" dirty="0" smtClean="0"/>
+              <a:t> </a:t>
+            </a:r>
+            <a:r>
+              <a:rPr lang="de-DE" baseline="0" dirty="0" err="1" smtClean="0"/>
+              <a:t>could</a:t>
+            </a:r>
+            <a:r>
+              <a:rPr lang="de-DE" baseline="0" dirty="0" smtClean="0"/>
+              <a:t> </a:t>
+            </a:r>
+            <a:r>
+              <a:rPr lang="de-DE" baseline="0" dirty="0" err="1" smtClean="0"/>
+              <a:t>be</a:t>
+            </a:r>
+            <a:r>
+              <a:rPr lang="de-DE" baseline="0" dirty="0" smtClean="0"/>
+              <a:t> </a:t>
+            </a:r>
+            <a:r>
+              <a:rPr lang="de-DE" baseline="0" dirty="0" err="1" smtClean="0"/>
+              <a:t>done</a:t>
+            </a:r>
+            <a:r>
+              <a:rPr lang="de-DE" baseline="0" dirty="0" smtClean="0"/>
+              <a:t>?</a:t>
+            </a:r>
+          </a:p>
+          <a:p>
+            <a:pPr marL="0" marR="0" indent="0" algn="l" defTabSz="914400" rtl="0" eaLnBrk="1" fontAlgn="auto" latinLnBrk="0" hangingPunct="1">
+              <a:lnSpc>
+                <a:spcPct val="100000"/>
+              </a:lnSpc>
+              <a:spcBef>
+                <a:spcPts val="0"/>
+              </a:spcBef>
+              <a:spcAft>
+                <a:spcPts val="0"/>
+              </a:spcAft>
+              <a:buClrTx/>
+              <a:buSzTx/>
+              <a:buFontTx/>
+              <a:buNone/>
+              <a:tabLst/>
+              <a:defRPr/>
+            </a:pPr>
+            <a:r>
+              <a:rPr lang="de-DE" baseline="0" dirty="0" err="1" smtClean="0"/>
+              <a:t>We</a:t>
+            </a:r>
+            <a:r>
+              <a:rPr lang="de-DE" baseline="0" dirty="0" smtClean="0"/>
+              <a:t> </a:t>
+            </a:r>
+            <a:r>
+              <a:rPr lang="de-DE" baseline="0" dirty="0" err="1" smtClean="0"/>
+              <a:t>had</a:t>
+            </a:r>
+            <a:r>
+              <a:rPr lang="de-DE" baseline="0" dirty="0" smtClean="0"/>
+              <a:t> </a:t>
+            </a:r>
+            <a:r>
+              <a:rPr lang="de-DE" baseline="0" dirty="0" err="1" smtClean="0"/>
+              <a:t>two</a:t>
+            </a:r>
+            <a:r>
+              <a:rPr lang="de-DE" baseline="0" dirty="0" smtClean="0"/>
+              <a:t> different </a:t>
+            </a:r>
+            <a:r>
+              <a:rPr lang="de-DE" baseline="0" dirty="0" err="1" smtClean="0"/>
+              <a:t>ideas</a:t>
+            </a:r>
+            <a:r>
+              <a:rPr lang="de-DE" baseline="0" dirty="0" smtClean="0"/>
+              <a:t>.</a:t>
+            </a:r>
+          </a:p>
+          <a:p>
+            <a:pPr marL="0" marR="0" indent="0" algn="l" defTabSz="914400" rtl="0" eaLnBrk="1" fontAlgn="auto" latinLnBrk="0" hangingPunct="1">
+              <a:lnSpc>
+                <a:spcPct val="100000"/>
+              </a:lnSpc>
+              <a:spcBef>
+                <a:spcPts val="0"/>
+              </a:spcBef>
+              <a:spcAft>
+                <a:spcPts val="0"/>
+              </a:spcAft>
+              <a:buClrTx/>
+              <a:buSzTx/>
+              <a:buFontTx/>
+              <a:buNone/>
+              <a:tabLst/>
+              <a:defRPr/>
+            </a:pPr>
+            <a:endParaRPr lang="de-DE" baseline="0" dirty="0" smtClean="0"/>
+          </a:p>
+          <a:p>
+            <a:pPr marL="0" marR="0" indent="0" algn="l" defTabSz="914400" rtl="0" eaLnBrk="1" fontAlgn="auto" latinLnBrk="0" hangingPunct="1">
+              <a:lnSpc>
+                <a:spcPct val="100000"/>
+              </a:lnSpc>
+              <a:spcBef>
+                <a:spcPts val="0"/>
+              </a:spcBef>
+              <a:spcAft>
+                <a:spcPts val="0"/>
+              </a:spcAft>
+              <a:buClrTx/>
+              <a:buSzTx/>
+              <a:buFontTx/>
+              <a:buNone/>
+              <a:tabLst/>
+              <a:defRPr/>
+            </a:pPr>
+            <a:r>
+              <a:rPr lang="de-DE" baseline="0" dirty="0" err="1" smtClean="0"/>
+              <a:t>It</a:t>
+            </a:r>
+            <a:r>
+              <a:rPr lang="de-DE" baseline="0" dirty="0" smtClean="0"/>
+              <a:t> </a:t>
+            </a:r>
+            <a:r>
+              <a:rPr lang="de-DE" baseline="0" dirty="0" err="1" smtClean="0"/>
+              <a:t>turned</a:t>
+            </a:r>
+            <a:r>
+              <a:rPr lang="de-DE" baseline="0" dirty="0" smtClean="0"/>
+              <a:t> out </a:t>
+            </a:r>
+            <a:r>
+              <a:rPr lang="de-DE" baseline="0" dirty="0" err="1" smtClean="0"/>
+              <a:t>that</a:t>
+            </a:r>
+            <a:r>
+              <a:rPr lang="de-DE" baseline="0" dirty="0" smtClean="0"/>
+              <a:t> </a:t>
+            </a:r>
+            <a:r>
+              <a:rPr lang="de-DE" baseline="0" dirty="0" err="1" smtClean="0"/>
+              <a:t>one</a:t>
+            </a:r>
+            <a:r>
+              <a:rPr lang="de-DE" baseline="0" dirty="0" smtClean="0"/>
+              <a:t> </a:t>
+            </a:r>
+            <a:r>
+              <a:rPr lang="de-DE" baseline="0" dirty="0" err="1" smtClean="0"/>
+              <a:t>of</a:t>
+            </a:r>
+            <a:r>
+              <a:rPr lang="de-DE" baseline="0" dirty="0" smtClean="0"/>
+              <a:t> </a:t>
+            </a:r>
+            <a:r>
+              <a:rPr lang="de-DE" baseline="0" dirty="0" err="1" smtClean="0"/>
+              <a:t>them</a:t>
+            </a:r>
+            <a:r>
+              <a:rPr lang="de-DE" baseline="0" dirty="0" smtClean="0"/>
+              <a:t> was not </a:t>
+            </a:r>
+            <a:r>
+              <a:rPr lang="de-DE" baseline="0" dirty="0" err="1" smtClean="0"/>
+              <a:t>possible</a:t>
+            </a:r>
+            <a:r>
+              <a:rPr lang="de-DE" baseline="0" dirty="0" smtClean="0"/>
+              <a:t>.</a:t>
+            </a:r>
+          </a:p>
+          <a:p>
+            <a:pPr marL="0" marR="0" indent="0" algn="l" defTabSz="914400" rtl="0" eaLnBrk="1" fontAlgn="auto" latinLnBrk="0" hangingPunct="1">
+              <a:lnSpc>
+                <a:spcPct val="100000"/>
+              </a:lnSpc>
+              <a:spcBef>
+                <a:spcPts val="0"/>
+              </a:spcBef>
+              <a:spcAft>
+                <a:spcPts val="0"/>
+              </a:spcAft>
+              <a:buClrTx/>
+              <a:buSzTx/>
+              <a:buFontTx/>
+              <a:buNone/>
+              <a:tabLst/>
+              <a:defRPr/>
+            </a:pPr>
+            <a:r>
+              <a:rPr lang="de-DE" baseline="0" dirty="0" err="1" smtClean="0"/>
+              <a:t>We</a:t>
+            </a:r>
+            <a:r>
+              <a:rPr lang="de-DE" baseline="0" dirty="0" smtClean="0"/>
+              <a:t> </a:t>
+            </a:r>
+            <a:r>
+              <a:rPr lang="de-DE" baseline="0" dirty="0" err="1" smtClean="0"/>
+              <a:t>were</a:t>
+            </a:r>
+            <a:r>
+              <a:rPr lang="de-DE" baseline="0" dirty="0" smtClean="0"/>
+              <a:t> </a:t>
+            </a:r>
+            <a:r>
+              <a:rPr lang="de-DE" baseline="0" dirty="0" err="1" smtClean="0"/>
+              <a:t>unable</a:t>
+            </a:r>
+            <a:r>
+              <a:rPr lang="de-DE" baseline="0" dirty="0" smtClean="0"/>
+              <a:t> </a:t>
+            </a:r>
+            <a:r>
+              <a:rPr lang="de-DE" baseline="0" dirty="0" err="1" smtClean="0"/>
+              <a:t>to</a:t>
+            </a:r>
+            <a:r>
+              <a:rPr lang="de-DE" baseline="0" dirty="0" smtClean="0"/>
+              <a:t> parse </a:t>
+            </a:r>
+            <a:r>
+              <a:rPr lang="de-DE" baseline="0" dirty="0" err="1" smtClean="0"/>
+              <a:t>the</a:t>
+            </a:r>
+            <a:r>
+              <a:rPr lang="de-DE" baseline="0" dirty="0" smtClean="0"/>
+              <a:t> </a:t>
+            </a:r>
+            <a:r>
+              <a:rPr lang="de-DE" baseline="0" dirty="0" err="1" smtClean="0"/>
+              <a:t>website</a:t>
+            </a:r>
+            <a:r>
+              <a:rPr lang="de-DE" baseline="0" dirty="0" smtClean="0"/>
+              <a:t> </a:t>
+            </a:r>
+            <a:r>
+              <a:rPr lang="de-DE" baseline="0" dirty="0" err="1" smtClean="0"/>
+              <a:t>as</a:t>
+            </a:r>
+            <a:r>
+              <a:rPr lang="de-DE" baseline="0" dirty="0" smtClean="0"/>
+              <a:t> XML </a:t>
+            </a:r>
+            <a:r>
+              <a:rPr lang="de-DE" baseline="0" dirty="0" err="1" smtClean="0"/>
+              <a:t>and</a:t>
+            </a:r>
+            <a:r>
+              <a:rPr lang="de-DE" baseline="0" dirty="0" smtClean="0"/>
+              <a:t> </a:t>
+            </a:r>
+            <a:r>
+              <a:rPr lang="de-DE" baseline="0" dirty="0" err="1" smtClean="0"/>
+              <a:t>run</a:t>
+            </a:r>
+            <a:r>
+              <a:rPr lang="de-DE" baseline="0" dirty="0" smtClean="0"/>
+              <a:t> </a:t>
+            </a:r>
+            <a:r>
+              <a:rPr lang="de-DE" baseline="0" dirty="0" err="1" smtClean="0"/>
+              <a:t>search</a:t>
+            </a:r>
+            <a:r>
+              <a:rPr lang="de-DE" baseline="0" dirty="0" smtClean="0"/>
+              <a:t> </a:t>
+            </a:r>
+            <a:r>
+              <a:rPr lang="de-DE" baseline="0" dirty="0" err="1" smtClean="0"/>
+              <a:t>queries</a:t>
+            </a:r>
+            <a:r>
+              <a:rPr lang="de-DE" baseline="0" dirty="0" smtClean="0"/>
+              <a:t>, </a:t>
+            </a:r>
+            <a:r>
+              <a:rPr lang="de-DE" baseline="0" dirty="0" err="1" smtClean="0"/>
+              <a:t>because</a:t>
+            </a:r>
+            <a:r>
+              <a:rPr lang="de-DE" baseline="0" dirty="0" smtClean="0"/>
+              <a:t> </a:t>
+            </a:r>
+            <a:r>
+              <a:rPr lang="de-DE" baseline="0" dirty="0" err="1" smtClean="0"/>
+              <a:t>the</a:t>
+            </a:r>
+            <a:r>
+              <a:rPr lang="de-DE" baseline="0" dirty="0" smtClean="0"/>
+              <a:t> HTML was not valid XHTML.</a:t>
+            </a:r>
+          </a:p>
+          <a:p>
+            <a:pPr marL="0" marR="0" indent="0" algn="l" defTabSz="914400" rtl="0" eaLnBrk="1" fontAlgn="auto" latinLnBrk="0" hangingPunct="1">
+              <a:lnSpc>
+                <a:spcPct val="100000"/>
+              </a:lnSpc>
+              <a:spcBef>
+                <a:spcPts val="0"/>
+              </a:spcBef>
+              <a:spcAft>
+                <a:spcPts val="0"/>
+              </a:spcAft>
+              <a:buClrTx/>
+              <a:buSzTx/>
+              <a:buFontTx/>
+              <a:buNone/>
+              <a:tabLst/>
+              <a:defRPr/>
+            </a:pPr>
+            <a:endParaRPr lang="de-DE" baseline="0" dirty="0" smtClean="0"/>
+          </a:p>
+          <a:p>
+            <a:pPr marL="0" marR="0" indent="0" algn="l" defTabSz="914400" rtl="0" eaLnBrk="1" fontAlgn="auto" latinLnBrk="0" hangingPunct="1">
+              <a:lnSpc>
+                <a:spcPct val="100000"/>
+              </a:lnSpc>
+              <a:spcBef>
+                <a:spcPts val="0"/>
+              </a:spcBef>
+              <a:spcAft>
+                <a:spcPts val="0"/>
+              </a:spcAft>
+              <a:buClrTx/>
+              <a:buSzTx/>
+              <a:buFontTx/>
+              <a:buNone/>
+              <a:tabLst/>
+              <a:defRPr/>
+            </a:pPr>
+            <a:r>
+              <a:rPr lang="de-DE" baseline="0" dirty="0" smtClean="0"/>
+              <a:t>The </a:t>
+            </a:r>
+            <a:r>
+              <a:rPr lang="de-DE" baseline="0" dirty="0" err="1" smtClean="0"/>
+              <a:t>second</a:t>
+            </a:r>
+            <a:r>
+              <a:rPr lang="de-DE" baseline="0" dirty="0" smtClean="0"/>
+              <a:t> </a:t>
+            </a:r>
+            <a:r>
+              <a:rPr lang="de-DE" baseline="0" dirty="0" err="1" smtClean="0"/>
+              <a:t>idea</a:t>
+            </a:r>
+            <a:r>
+              <a:rPr lang="de-DE" baseline="0" dirty="0" smtClean="0"/>
+              <a:t> was </a:t>
+            </a:r>
+            <a:r>
+              <a:rPr lang="de-DE" baseline="0" dirty="0" err="1" smtClean="0"/>
+              <a:t>to</a:t>
+            </a:r>
+            <a:r>
+              <a:rPr lang="de-DE" baseline="0" dirty="0" smtClean="0"/>
+              <a:t> </a:t>
+            </a:r>
+            <a:r>
+              <a:rPr lang="de-DE" baseline="0" dirty="0" err="1" smtClean="0"/>
+              <a:t>use</a:t>
+            </a:r>
+            <a:r>
+              <a:rPr lang="de-DE" baseline="0" dirty="0" smtClean="0"/>
+              <a:t> </a:t>
+            </a:r>
+            <a:r>
+              <a:rPr lang="de-DE" baseline="0" dirty="0" err="1" smtClean="0"/>
+              <a:t>regular</a:t>
+            </a:r>
+            <a:r>
+              <a:rPr lang="de-DE" baseline="0" dirty="0" smtClean="0"/>
+              <a:t> </a:t>
+            </a:r>
+            <a:r>
+              <a:rPr lang="de-DE" baseline="0" dirty="0" err="1" smtClean="0"/>
+              <a:t>expressions</a:t>
+            </a:r>
+            <a:r>
+              <a:rPr lang="de-DE" baseline="0" dirty="0" smtClean="0"/>
+              <a:t>.</a:t>
+            </a:r>
+          </a:p>
+          <a:p>
+            <a:pPr marL="0" marR="0" indent="0" algn="l" defTabSz="914400" rtl="0" eaLnBrk="1" fontAlgn="auto" latinLnBrk="0" hangingPunct="1">
+              <a:lnSpc>
+                <a:spcPct val="100000"/>
+              </a:lnSpc>
+              <a:spcBef>
+                <a:spcPts val="0"/>
+              </a:spcBef>
+              <a:spcAft>
+                <a:spcPts val="0"/>
+              </a:spcAft>
+              <a:buClrTx/>
+              <a:buSzTx/>
+              <a:buFontTx/>
+              <a:buNone/>
+              <a:tabLst/>
+              <a:defRPr/>
+            </a:pPr>
+            <a:r>
+              <a:rPr lang="de-DE" baseline="0" dirty="0" smtClean="0"/>
+              <a:t>After </a:t>
+            </a:r>
+            <a:r>
+              <a:rPr lang="de-DE" baseline="0" dirty="0" err="1" smtClean="0"/>
+              <a:t>we</a:t>
+            </a:r>
+            <a:r>
+              <a:rPr lang="de-DE" baseline="0" dirty="0" smtClean="0"/>
+              <a:t> </a:t>
+            </a:r>
+            <a:r>
+              <a:rPr lang="de-DE" baseline="0" dirty="0" err="1" smtClean="0"/>
+              <a:t>created</a:t>
+            </a:r>
+            <a:r>
+              <a:rPr lang="de-DE" baseline="0" dirty="0" smtClean="0"/>
+              <a:t> </a:t>
+            </a:r>
+            <a:r>
+              <a:rPr lang="de-DE" baseline="0" dirty="0" err="1" smtClean="0"/>
+              <a:t>some</a:t>
+            </a:r>
+            <a:r>
+              <a:rPr lang="de-DE" baseline="0" dirty="0" smtClean="0"/>
+              <a:t> </a:t>
+            </a:r>
+            <a:r>
+              <a:rPr lang="de-DE" baseline="0" dirty="0" err="1" smtClean="0"/>
+              <a:t>expressions</a:t>
+            </a:r>
+            <a:r>
+              <a:rPr lang="de-DE" baseline="0" dirty="0" smtClean="0"/>
+              <a:t>, </a:t>
+            </a:r>
+            <a:r>
+              <a:rPr lang="de-DE" baseline="0" dirty="0" err="1" smtClean="0"/>
+              <a:t>we</a:t>
+            </a:r>
+            <a:r>
+              <a:rPr lang="de-DE" baseline="0" dirty="0" smtClean="0"/>
+              <a:t> </a:t>
+            </a:r>
+            <a:r>
+              <a:rPr lang="de-DE" baseline="0" dirty="0" err="1" smtClean="0"/>
+              <a:t>were</a:t>
+            </a:r>
+            <a:r>
+              <a:rPr lang="de-DE" baseline="0" dirty="0" smtClean="0"/>
+              <a:t> </a:t>
+            </a:r>
+            <a:r>
+              <a:rPr lang="de-DE" baseline="0" dirty="0" err="1" smtClean="0"/>
+              <a:t>able</a:t>
+            </a:r>
+            <a:r>
+              <a:rPr lang="de-DE" baseline="0" dirty="0" smtClean="0"/>
+              <a:t> </a:t>
+            </a:r>
+            <a:r>
+              <a:rPr lang="de-DE" baseline="0" dirty="0" err="1" smtClean="0"/>
+              <a:t>to</a:t>
+            </a:r>
+            <a:r>
+              <a:rPr lang="de-DE" baseline="0" dirty="0" smtClean="0"/>
+              <a:t> </a:t>
+            </a:r>
+            <a:r>
+              <a:rPr lang="de-DE" baseline="0" dirty="0" err="1" smtClean="0"/>
+              <a:t>match</a:t>
+            </a:r>
+            <a:r>
+              <a:rPr lang="de-DE" baseline="0" dirty="0" smtClean="0"/>
+              <a:t> </a:t>
+            </a:r>
+            <a:r>
+              <a:rPr lang="de-DE" baseline="0" dirty="0" err="1" smtClean="0"/>
+              <a:t>the</a:t>
+            </a:r>
+            <a:r>
+              <a:rPr lang="de-DE" baseline="0" dirty="0" smtClean="0"/>
+              <a:t> tags </a:t>
+            </a:r>
+            <a:r>
+              <a:rPr lang="de-DE" baseline="0" dirty="0" err="1" smtClean="0"/>
+              <a:t>of</a:t>
+            </a:r>
+            <a:r>
+              <a:rPr lang="de-DE" baseline="0" dirty="0" smtClean="0"/>
+              <a:t> </a:t>
+            </a:r>
+            <a:r>
+              <a:rPr lang="de-DE" baseline="0" dirty="0" err="1" smtClean="0"/>
+              <a:t>the</a:t>
+            </a:r>
+            <a:r>
+              <a:rPr lang="de-DE" baseline="0" dirty="0" smtClean="0"/>
+              <a:t> HTML </a:t>
+            </a:r>
+            <a:r>
+              <a:rPr lang="de-DE" baseline="0" dirty="0" err="1" smtClean="0"/>
+              <a:t>table</a:t>
+            </a:r>
+            <a:r>
+              <a:rPr lang="de-DE" baseline="0" dirty="0" smtClean="0"/>
+              <a:t> </a:t>
+            </a:r>
+            <a:r>
+              <a:rPr lang="de-DE" baseline="0" dirty="0" err="1" smtClean="0"/>
+              <a:t>around</a:t>
+            </a:r>
+            <a:r>
+              <a:rPr lang="de-DE" baseline="0" dirty="0" smtClean="0"/>
+              <a:t> </a:t>
+            </a:r>
+            <a:r>
+              <a:rPr lang="de-DE" baseline="0" dirty="0" err="1" smtClean="0"/>
+              <a:t>the</a:t>
+            </a:r>
+            <a:r>
+              <a:rPr lang="de-DE" baseline="0" dirty="0" smtClean="0"/>
+              <a:t> grades.</a:t>
+            </a:r>
+          </a:p>
+          <a:p>
+            <a:pPr marL="0" marR="0" indent="0" algn="l" defTabSz="914400" rtl="0" eaLnBrk="1" fontAlgn="auto" latinLnBrk="0" hangingPunct="1">
+              <a:lnSpc>
+                <a:spcPct val="100000"/>
+              </a:lnSpc>
+              <a:spcBef>
+                <a:spcPts val="0"/>
+              </a:spcBef>
+              <a:spcAft>
+                <a:spcPts val="0"/>
+              </a:spcAft>
+              <a:buClrTx/>
+              <a:buSzTx/>
+              <a:buFontTx/>
+              <a:buNone/>
+              <a:tabLst/>
+              <a:defRPr/>
+            </a:pPr>
+            <a:r>
+              <a:rPr lang="de-DE" baseline="0" dirty="0" err="1" smtClean="0"/>
+              <a:t>We</a:t>
+            </a:r>
+            <a:r>
+              <a:rPr lang="de-DE" baseline="0" dirty="0" smtClean="0"/>
+              <a:t> </a:t>
+            </a:r>
+            <a:r>
+              <a:rPr lang="de-DE" baseline="0" dirty="0" err="1" smtClean="0"/>
+              <a:t>used</a:t>
+            </a:r>
+            <a:r>
+              <a:rPr lang="de-DE" baseline="0" dirty="0" smtClean="0"/>
+              <a:t> </a:t>
+            </a:r>
+            <a:r>
+              <a:rPr lang="de-DE" baseline="0" dirty="0" err="1" smtClean="0"/>
+              <a:t>the</a:t>
+            </a:r>
+            <a:r>
+              <a:rPr lang="de-DE" baseline="0" dirty="0" smtClean="0"/>
+              <a:t> </a:t>
+            </a:r>
+            <a:r>
+              <a:rPr lang="de-DE" baseline="0" dirty="0" err="1" smtClean="0"/>
+              <a:t>included</a:t>
+            </a:r>
+            <a:r>
+              <a:rPr lang="de-DE" baseline="0" dirty="0" smtClean="0"/>
+              <a:t> CSS </a:t>
+            </a:r>
+            <a:r>
+              <a:rPr lang="de-DE" baseline="0" dirty="0" err="1" smtClean="0"/>
+              <a:t>attributes</a:t>
+            </a:r>
+            <a:r>
+              <a:rPr lang="de-DE" baseline="0" dirty="0" smtClean="0"/>
+              <a:t> </a:t>
+            </a:r>
+            <a:r>
+              <a:rPr lang="de-DE" baseline="0" dirty="0" err="1" smtClean="0"/>
+              <a:t>to</a:t>
+            </a:r>
+            <a:r>
+              <a:rPr lang="de-DE" baseline="0" dirty="0" smtClean="0"/>
+              <a:t> </a:t>
+            </a:r>
+            <a:r>
+              <a:rPr lang="de-DE" baseline="0" dirty="0" err="1" smtClean="0"/>
+              <a:t>distinguish</a:t>
+            </a:r>
+            <a:r>
+              <a:rPr lang="de-DE" baseline="0" dirty="0" smtClean="0"/>
+              <a:t> </a:t>
+            </a:r>
+            <a:r>
+              <a:rPr lang="de-DE" baseline="0" dirty="0" err="1" smtClean="0"/>
+              <a:t>between</a:t>
+            </a:r>
+            <a:r>
+              <a:rPr lang="de-DE" baseline="0" dirty="0" smtClean="0"/>
+              <a:t> </a:t>
+            </a:r>
+            <a:r>
+              <a:rPr lang="de-DE" baseline="0" dirty="0" err="1" smtClean="0"/>
+              <a:t>certificates</a:t>
+            </a:r>
+            <a:r>
+              <a:rPr lang="de-DE" baseline="0" dirty="0" smtClean="0"/>
+              <a:t>, grades </a:t>
+            </a:r>
+            <a:r>
+              <a:rPr lang="de-DE" baseline="0" dirty="0" err="1" smtClean="0"/>
+              <a:t>and</a:t>
+            </a:r>
+            <a:r>
+              <a:rPr lang="de-DE" baseline="0" dirty="0" smtClean="0"/>
+              <a:t> </a:t>
+            </a:r>
+            <a:r>
+              <a:rPr lang="de-DE" baseline="0" dirty="0" err="1" smtClean="0"/>
+              <a:t>modules</a:t>
+            </a:r>
+            <a:r>
+              <a:rPr lang="de-DE" baseline="0" dirty="0" smtClean="0"/>
+              <a:t>.</a:t>
+            </a:r>
+            <a:endParaRPr lang="de-DE" dirty="0" smtClean="0"/>
+          </a:p>
         </p:txBody>
       </p:sp>
       <p:sp>
@@ -783,82 +1644,479 @@
           <a:lstStyle/>
           <a:p>
             <a:r>
-              <a:rPr lang="de-DE" smtClean="0"/>
+              <a:rPr lang="de-DE" dirty="0" smtClean="0"/>
               <a:t>Manuel</a:t>
             </a:r>
+          </a:p>
+          <a:p>
             <a:endParaRPr lang="de-DE" dirty="0" smtClean="0"/>
           </a:p>
           <a:p>
+            <a:r>
+              <a:rPr lang="de-DE" dirty="0" err="1" smtClean="0"/>
+              <a:t>Now</a:t>
+            </a:r>
+            <a:r>
+              <a:rPr lang="de-DE" baseline="0" dirty="0" smtClean="0"/>
+              <a:t> </a:t>
+            </a:r>
+            <a:r>
+              <a:rPr lang="de-DE" baseline="0" dirty="0" err="1" smtClean="0"/>
+              <a:t>its</a:t>
+            </a:r>
+            <a:r>
+              <a:rPr lang="de-DE" baseline="0" dirty="0" smtClean="0"/>
+              <a:t> time </a:t>
+            </a:r>
+            <a:r>
+              <a:rPr lang="de-DE" baseline="0" dirty="0" err="1" smtClean="0"/>
+              <a:t>to</a:t>
+            </a:r>
+            <a:r>
+              <a:rPr lang="de-DE" baseline="0" dirty="0" smtClean="0"/>
+              <a:t> </a:t>
+            </a:r>
+            <a:r>
+              <a:rPr lang="de-DE" baseline="0" dirty="0" err="1" smtClean="0"/>
+              <a:t>show</a:t>
+            </a:r>
+            <a:r>
+              <a:rPr lang="de-DE" baseline="0" dirty="0" smtClean="0"/>
+              <a:t> </a:t>
+            </a:r>
+            <a:r>
+              <a:rPr lang="de-DE" baseline="0" dirty="0" err="1" smtClean="0"/>
+              <a:t>our</a:t>
+            </a:r>
+            <a:r>
+              <a:rPr lang="de-DE" baseline="0" dirty="0" smtClean="0"/>
+              <a:t> mobile </a:t>
+            </a:r>
+            <a:r>
+              <a:rPr lang="de-DE" baseline="0" dirty="0" err="1" smtClean="0"/>
+              <a:t>application</a:t>
+            </a:r>
+            <a:r>
+              <a:rPr lang="de-DE" baseline="0" dirty="0" smtClean="0"/>
+              <a:t>.</a:t>
+            </a:r>
+          </a:p>
+          <a:p>
+            <a:r>
+              <a:rPr lang="de-DE" baseline="0" dirty="0" err="1" smtClean="0"/>
+              <a:t>We</a:t>
+            </a:r>
+            <a:r>
+              <a:rPr lang="de-DE" baseline="0" dirty="0" smtClean="0"/>
+              <a:t> </a:t>
+            </a:r>
+            <a:r>
+              <a:rPr lang="de-DE" baseline="0" dirty="0" err="1" smtClean="0"/>
+              <a:t>prepared</a:t>
+            </a:r>
+            <a:r>
+              <a:rPr lang="de-DE" baseline="0" dirty="0" smtClean="0"/>
+              <a:t> </a:t>
+            </a:r>
+            <a:r>
+              <a:rPr lang="de-DE" baseline="0" dirty="0" err="1" smtClean="0"/>
+              <a:t>two</a:t>
+            </a:r>
+            <a:r>
+              <a:rPr lang="de-DE" baseline="0" dirty="0" smtClean="0"/>
+              <a:t> </a:t>
+            </a:r>
+            <a:r>
+              <a:rPr lang="de-DE" baseline="0" dirty="0" err="1" smtClean="0"/>
+              <a:t>videos</a:t>
+            </a:r>
+            <a:r>
+              <a:rPr lang="de-DE" baseline="0" dirty="0" smtClean="0"/>
+              <a:t>.</a:t>
+            </a:r>
+          </a:p>
+          <a:p>
+            <a:r>
+              <a:rPr lang="de-DE" baseline="0" dirty="0" err="1" smtClean="0"/>
+              <a:t>One</a:t>
+            </a:r>
+            <a:r>
+              <a:rPr lang="de-DE" baseline="0" dirty="0" smtClean="0"/>
+              <a:t> </a:t>
+            </a:r>
+            <a:r>
+              <a:rPr lang="de-DE" baseline="0" dirty="0" err="1" smtClean="0"/>
+              <a:t>shows</a:t>
+            </a:r>
+            <a:r>
+              <a:rPr lang="de-DE" baseline="0" dirty="0" smtClean="0"/>
+              <a:t> </a:t>
+            </a:r>
+            <a:r>
+              <a:rPr lang="de-DE" baseline="0" dirty="0" err="1" smtClean="0"/>
+              <a:t>the</a:t>
+            </a:r>
+            <a:r>
+              <a:rPr lang="de-DE" baseline="0" dirty="0" smtClean="0"/>
+              <a:t> </a:t>
+            </a:r>
+            <a:r>
+              <a:rPr lang="de-DE" baseline="0" dirty="0" err="1" smtClean="0"/>
+              <a:t>smarthone</a:t>
+            </a:r>
+            <a:r>
+              <a:rPr lang="de-DE" baseline="0" dirty="0" smtClean="0"/>
+              <a:t> </a:t>
+            </a:r>
+            <a:r>
+              <a:rPr lang="de-DE" baseline="0" dirty="0" err="1" smtClean="0"/>
+              <a:t>layout</a:t>
+            </a:r>
+            <a:r>
+              <a:rPr lang="de-DE" baseline="0" dirty="0" smtClean="0"/>
+              <a:t> in English.</a:t>
+            </a:r>
+          </a:p>
+          <a:p>
+            <a:r>
+              <a:rPr lang="de-DE" baseline="0" dirty="0" err="1" smtClean="0"/>
+              <a:t>And</a:t>
+            </a:r>
+            <a:r>
+              <a:rPr lang="de-DE" baseline="0" dirty="0" smtClean="0"/>
+              <a:t> </a:t>
+            </a:r>
+            <a:r>
+              <a:rPr lang="de-DE" baseline="0" dirty="0" err="1" smtClean="0"/>
+              <a:t>the</a:t>
+            </a:r>
+            <a:r>
+              <a:rPr lang="de-DE" baseline="0" dirty="0" smtClean="0"/>
+              <a:t> </a:t>
+            </a:r>
+            <a:r>
+              <a:rPr lang="de-DE" baseline="0" dirty="0" err="1" smtClean="0"/>
+              <a:t>other</a:t>
+            </a:r>
+            <a:r>
+              <a:rPr lang="de-DE" baseline="0" dirty="0" smtClean="0"/>
+              <a:t> </a:t>
+            </a:r>
+            <a:r>
+              <a:rPr lang="de-DE" baseline="0" dirty="0" err="1" smtClean="0"/>
+              <a:t>shows</a:t>
+            </a:r>
+            <a:r>
+              <a:rPr lang="de-DE" baseline="0" dirty="0" smtClean="0"/>
+              <a:t> </a:t>
+            </a:r>
+            <a:r>
+              <a:rPr lang="de-DE" baseline="0" dirty="0" err="1" smtClean="0"/>
+              <a:t>the</a:t>
+            </a:r>
+            <a:r>
+              <a:rPr lang="de-DE" baseline="0" dirty="0" smtClean="0"/>
+              <a:t> </a:t>
+            </a:r>
+            <a:r>
+              <a:rPr lang="de-DE" baseline="0" dirty="0" err="1" smtClean="0"/>
+              <a:t>tablet</a:t>
+            </a:r>
+            <a:r>
+              <a:rPr lang="de-DE" baseline="0" dirty="0" smtClean="0"/>
+              <a:t> </a:t>
+            </a:r>
+            <a:r>
+              <a:rPr lang="de-DE" baseline="0" dirty="0" err="1" smtClean="0"/>
+              <a:t>layout</a:t>
+            </a:r>
+            <a:r>
+              <a:rPr lang="de-DE" baseline="0" dirty="0" smtClean="0"/>
+              <a:t> in German.</a:t>
+            </a:r>
+          </a:p>
+          <a:p>
             <a:endParaRPr lang="de-DE" dirty="0" smtClean="0"/>
           </a:p>
           <a:p>
             <a:r>
               <a:rPr lang="de-DE" dirty="0" smtClean="0"/>
-              <a:t>1</a:t>
-            </a:r>
-            <a:r>
-              <a:rPr lang="de-DE" dirty="0" smtClean="0"/>
-              <a:t>.</a:t>
-            </a:r>
-            <a:r>
-              <a:rPr lang="de-DE" baseline="0" dirty="0" smtClean="0"/>
-              <a:t> Beim ersten Start wird Einstellungs-</a:t>
-            </a:r>
-            <a:r>
-              <a:rPr lang="de-DE" baseline="0" dirty="0" err="1" smtClean="0"/>
-              <a:t>Activity</a:t>
-            </a:r>
-            <a:r>
-              <a:rPr lang="de-DE" baseline="0" dirty="0" smtClean="0"/>
-              <a:t> angezeigt da keine Daten vorliegen -&gt; RZ-Benutzerdaten eintragen!</a:t>
-            </a:r>
-          </a:p>
-          <a:p>
-            <a:r>
-              <a:rPr lang="de-DE" baseline="0" dirty="0" smtClean="0"/>
-              <a:t>2. Zurück zu Haupt-</a:t>
-            </a:r>
-            <a:r>
-              <a:rPr lang="de-DE" baseline="0" dirty="0" err="1" smtClean="0"/>
-              <a:t>Activity</a:t>
+              <a:t>1.</a:t>
+            </a:r>
+            <a:r>
+              <a:rPr lang="de-DE" baseline="0" dirty="0" smtClean="0"/>
+              <a:t> </a:t>
+            </a:r>
+            <a:r>
+              <a:rPr lang="de-DE" baseline="0" dirty="0" smtClean="0"/>
+              <a:t>On </a:t>
+            </a:r>
+            <a:r>
+              <a:rPr lang="de-DE" baseline="0" dirty="0" err="1" smtClean="0"/>
+              <a:t>the</a:t>
+            </a:r>
+            <a:r>
+              <a:rPr lang="de-DE" baseline="0" dirty="0" smtClean="0"/>
+              <a:t> </a:t>
+            </a:r>
+            <a:r>
+              <a:rPr lang="de-DE" baseline="0" dirty="0" err="1" smtClean="0"/>
+              <a:t>first</a:t>
+            </a:r>
+            <a:r>
+              <a:rPr lang="de-DE" baseline="0" dirty="0" smtClean="0"/>
+              <a:t> </a:t>
+            </a:r>
+            <a:r>
+              <a:rPr lang="de-DE" baseline="0" dirty="0" err="1" smtClean="0"/>
+              <a:t>start</a:t>
+            </a:r>
+            <a:r>
+              <a:rPr lang="de-DE" baseline="0" dirty="0" smtClean="0"/>
+              <a:t> </a:t>
+            </a:r>
+            <a:r>
+              <a:rPr lang="de-DE" baseline="0" dirty="0" err="1" smtClean="0"/>
+              <a:t>it</a:t>
+            </a:r>
+            <a:r>
+              <a:rPr lang="de-DE" baseline="0" dirty="0" smtClean="0"/>
+              <a:t> </a:t>
+            </a:r>
+            <a:r>
+              <a:rPr lang="de-DE" baseline="0" dirty="0" err="1" smtClean="0"/>
+              <a:t>shows</a:t>
+            </a:r>
+            <a:r>
+              <a:rPr lang="de-DE" baseline="0" dirty="0" smtClean="0"/>
+              <a:t> </a:t>
+            </a:r>
+            <a:r>
+              <a:rPr lang="de-DE" baseline="0" dirty="0" err="1" smtClean="0"/>
+              <a:t>the</a:t>
+            </a:r>
+            <a:r>
+              <a:rPr lang="de-DE" baseline="0" dirty="0" smtClean="0"/>
+              <a:t> </a:t>
+            </a:r>
+            <a:r>
+              <a:rPr lang="de-DE" baseline="0" dirty="0" err="1" smtClean="0"/>
+              <a:t>settings</a:t>
+            </a:r>
+            <a:r>
+              <a:rPr lang="de-DE" baseline="0" dirty="0" smtClean="0"/>
+              <a:t> </a:t>
+            </a:r>
+            <a:r>
+              <a:rPr lang="de-DE" baseline="0" dirty="0" err="1" smtClean="0"/>
+              <a:t>activity</a:t>
+            </a:r>
+            <a:r>
+              <a:rPr lang="de-DE" baseline="0" dirty="0" smtClean="0"/>
+              <a:t> </a:t>
+            </a:r>
+            <a:r>
+              <a:rPr lang="de-DE" baseline="0" dirty="0" smtClean="0"/>
+              <a:t>-&gt; </a:t>
+            </a:r>
+            <a:r>
+              <a:rPr lang="de-DE" baseline="0" dirty="0" smtClean="0"/>
+              <a:t>Enter </a:t>
+            </a:r>
+            <a:r>
+              <a:rPr lang="de-DE" baseline="0" dirty="0" err="1" smtClean="0"/>
+              <a:t>your</a:t>
+            </a:r>
+            <a:r>
+              <a:rPr lang="de-DE" baseline="0" dirty="0" smtClean="0"/>
+              <a:t> HTWG </a:t>
+            </a:r>
+            <a:r>
+              <a:rPr lang="de-DE" baseline="0" dirty="0" err="1" smtClean="0"/>
+              <a:t>username</a:t>
+            </a:r>
+            <a:r>
+              <a:rPr lang="de-DE" baseline="0" dirty="0" smtClean="0"/>
+              <a:t> </a:t>
+            </a:r>
+            <a:r>
+              <a:rPr lang="de-DE" baseline="0" dirty="0" err="1" smtClean="0"/>
+              <a:t>and</a:t>
+            </a:r>
+            <a:r>
+              <a:rPr lang="de-DE" baseline="0" dirty="0" smtClean="0"/>
+              <a:t> </a:t>
+            </a:r>
+            <a:r>
+              <a:rPr lang="de-DE" baseline="0" dirty="0" err="1" smtClean="0"/>
+              <a:t>password</a:t>
+            </a:r>
+            <a:r>
+              <a:rPr lang="de-DE" baseline="0" dirty="0" smtClean="0"/>
+              <a:t>!</a:t>
             </a:r>
             <a:endParaRPr lang="de-DE" baseline="0" dirty="0" smtClean="0"/>
           </a:p>
           <a:p>
             <a:r>
               <a:rPr lang="de-DE" baseline="0" dirty="0" smtClean="0"/>
-              <a:t>3. Noch nichts geladen, wird aktualisierungs-</a:t>
-            </a:r>
-            <a:r>
-              <a:rPr lang="de-DE" baseline="0" dirty="0" err="1" smtClean="0"/>
-              <a:t>activity</a:t>
-            </a:r>
-            <a:r>
-              <a:rPr lang="de-DE" baseline="0" dirty="0" smtClean="0"/>
-              <a:t> angezeigt</a:t>
-            </a:r>
-          </a:p>
-          <a:p>
-            <a:r>
-              <a:rPr lang="de-DE" baseline="0" dirty="0" smtClean="0"/>
-              <a:t>4. Aktualisieren! </a:t>
-            </a:r>
-            <a:r>
-              <a:rPr lang="de-DE" baseline="0" dirty="0" err="1" smtClean="0"/>
-              <a:t>Läd</a:t>
-            </a:r>
-            <a:r>
-              <a:rPr lang="de-DE" baseline="0" dirty="0" smtClean="0"/>
-              <a:t> Daten (schnitt wegen zu langer </a:t>
-            </a:r>
-            <a:r>
-              <a:rPr lang="de-DE" baseline="0" dirty="0" err="1" smtClean="0"/>
-              <a:t>ladezeiten</a:t>
-            </a:r>
-            <a:r>
-              <a:rPr lang="de-DE" baseline="0" dirty="0" smtClean="0"/>
-              <a:t> des Emulators)</a:t>
-            </a:r>
+              <a:t>2. </a:t>
+            </a:r>
+            <a:r>
+              <a:rPr lang="de-DE" baseline="0" dirty="0" smtClean="0"/>
+              <a:t>Return </a:t>
+            </a:r>
+            <a:r>
+              <a:rPr lang="de-DE" baseline="0" dirty="0" err="1" smtClean="0"/>
+              <a:t>to</a:t>
+            </a:r>
+            <a:r>
+              <a:rPr lang="de-DE" baseline="0" dirty="0" smtClean="0"/>
+              <a:t> </a:t>
+            </a:r>
+            <a:r>
+              <a:rPr lang="de-DE" baseline="0" dirty="0" err="1" smtClean="0"/>
+              <a:t>the</a:t>
+            </a:r>
+            <a:r>
+              <a:rPr lang="de-DE" baseline="0" dirty="0" smtClean="0"/>
+              <a:t> </a:t>
+            </a:r>
+            <a:r>
+              <a:rPr lang="de-DE" baseline="0" dirty="0" err="1" smtClean="0"/>
+              <a:t>mainscreen</a:t>
+            </a:r>
+            <a:endParaRPr lang="de-DE" baseline="0" dirty="0" smtClean="0"/>
+          </a:p>
+          <a:p>
+            <a:r>
+              <a:rPr lang="de-DE" baseline="0" dirty="0" smtClean="0"/>
+              <a:t>3. </a:t>
+            </a:r>
+            <a:r>
+              <a:rPr lang="de-DE" baseline="0" dirty="0" err="1" smtClean="0"/>
+              <a:t>If</a:t>
+            </a:r>
+            <a:r>
+              <a:rPr lang="de-DE" baseline="0" dirty="0" smtClean="0"/>
+              <a:t> </a:t>
+            </a:r>
+            <a:r>
+              <a:rPr lang="de-DE" baseline="0" dirty="0" err="1" smtClean="0"/>
+              <a:t>there</a:t>
+            </a:r>
+            <a:r>
+              <a:rPr lang="de-DE" baseline="0" dirty="0" smtClean="0"/>
+              <a:t> </a:t>
+            </a:r>
+            <a:r>
+              <a:rPr lang="de-DE" baseline="0" dirty="0" err="1" smtClean="0"/>
+              <a:t>is</a:t>
+            </a:r>
+            <a:r>
+              <a:rPr lang="de-DE" baseline="0" dirty="0" smtClean="0"/>
+              <a:t> </a:t>
+            </a:r>
+            <a:r>
+              <a:rPr lang="de-DE" baseline="0" dirty="0" err="1" smtClean="0"/>
+              <a:t>no</a:t>
+            </a:r>
+            <a:r>
+              <a:rPr lang="de-DE" baseline="0" dirty="0" smtClean="0"/>
+              <a:t> </a:t>
+            </a:r>
+            <a:r>
+              <a:rPr lang="de-DE" baseline="0" dirty="0" err="1" smtClean="0"/>
+              <a:t>data</a:t>
+            </a:r>
+            <a:r>
+              <a:rPr lang="de-DE" baseline="0" dirty="0" smtClean="0"/>
+              <a:t>, </a:t>
+            </a:r>
+            <a:r>
+              <a:rPr lang="de-DE" baseline="0" dirty="0" err="1" smtClean="0"/>
+              <a:t>it</a:t>
+            </a:r>
+            <a:r>
+              <a:rPr lang="de-DE" baseline="0" dirty="0" smtClean="0"/>
+              <a:t> </a:t>
+            </a:r>
+            <a:r>
+              <a:rPr lang="de-DE" baseline="0" dirty="0" err="1" smtClean="0"/>
+              <a:t>shows</a:t>
+            </a:r>
+            <a:r>
+              <a:rPr lang="de-DE" baseline="0" dirty="0" smtClean="0"/>
+              <a:t> a </a:t>
+            </a:r>
+            <a:r>
+              <a:rPr lang="de-DE" baseline="0" dirty="0" err="1" smtClean="0"/>
+              <a:t>refresh</a:t>
+            </a:r>
+            <a:r>
+              <a:rPr lang="de-DE" baseline="0" dirty="0" smtClean="0"/>
+              <a:t> </a:t>
+            </a:r>
+            <a:r>
+              <a:rPr lang="de-DE" baseline="0" dirty="0" err="1" smtClean="0"/>
+              <a:t>button</a:t>
+            </a:r>
+            <a:endParaRPr lang="de-DE" baseline="0" dirty="0" smtClean="0"/>
+          </a:p>
+          <a:p>
+            <a:r>
+              <a:rPr lang="de-DE" baseline="0" dirty="0" smtClean="0"/>
+              <a:t>4. </a:t>
+            </a:r>
+            <a:r>
+              <a:rPr lang="de-DE" baseline="0" dirty="0" err="1" smtClean="0"/>
+              <a:t>Refreshing</a:t>
+            </a:r>
+            <a:r>
+              <a:rPr lang="de-DE" baseline="0" dirty="0" smtClean="0"/>
+              <a:t>! </a:t>
+            </a:r>
+            <a:r>
+              <a:rPr lang="de-DE" baseline="0" dirty="0" err="1" smtClean="0"/>
+              <a:t>Loads</a:t>
+            </a:r>
+            <a:r>
+              <a:rPr lang="de-DE" baseline="0" dirty="0" smtClean="0"/>
+              <a:t> </a:t>
+            </a:r>
+            <a:r>
+              <a:rPr lang="de-DE" baseline="0" dirty="0" err="1" smtClean="0"/>
+              <a:t>data</a:t>
+            </a:r>
+            <a:r>
+              <a:rPr lang="de-DE" baseline="0" dirty="0" smtClean="0"/>
+              <a:t> </a:t>
+            </a:r>
+            <a:r>
+              <a:rPr lang="de-DE" baseline="0" dirty="0" err="1" smtClean="0"/>
+              <a:t>from</a:t>
+            </a:r>
+            <a:r>
+              <a:rPr lang="de-DE" baseline="0" dirty="0" smtClean="0"/>
+              <a:t> </a:t>
+            </a:r>
+            <a:r>
+              <a:rPr lang="de-DE" baseline="0" dirty="0" err="1" smtClean="0"/>
+              <a:t>the</a:t>
+            </a:r>
+            <a:r>
+              <a:rPr lang="de-DE" baseline="0" dirty="0" smtClean="0"/>
+              <a:t> </a:t>
+            </a:r>
+            <a:r>
+              <a:rPr lang="de-DE" baseline="0" dirty="0" err="1" smtClean="0"/>
+              <a:t>student</a:t>
+            </a:r>
+            <a:r>
+              <a:rPr lang="de-DE" baseline="0" dirty="0" smtClean="0"/>
+              <a:t> terminal</a:t>
+            </a:r>
+            <a:endParaRPr lang="de-DE" baseline="0" dirty="0" smtClean="0"/>
           </a:p>
           <a:p>
             <a:r>
@@ -872,70 +2130,238 @@
           <a:p>
             <a:r>
               <a:rPr lang="de-DE" dirty="0" smtClean="0"/>
-              <a:t>5</a:t>
+              <a:t>5. </a:t>
             </a:r>
             <a:r>
               <a:rPr lang="de-DE" dirty="0" smtClean="0"/>
-              <a:t>. Gefundene</a:t>
-            </a:r>
-            <a:r>
-              <a:rPr lang="de-DE" baseline="0" dirty="0" smtClean="0"/>
-              <a:t> Daten </a:t>
-            </a:r>
-            <a:r>
-              <a:rPr lang="de-DE" baseline="0" dirty="0" smtClean="0"/>
-              <a:t>präsentieren</a:t>
+              <a:t>Mainscreen </a:t>
+            </a:r>
+            <a:r>
+              <a:rPr lang="de-DE" dirty="0" err="1" smtClean="0"/>
+              <a:t>with</a:t>
+            </a:r>
+            <a:r>
+              <a:rPr lang="de-DE" dirty="0" smtClean="0"/>
+              <a:t> </a:t>
+            </a:r>
+            <a:r>
+              <a:rPr lang="de-DE" dirty="0" err="1" smtClean="0"/>
+              <a:t>user</a:t>
+            </a:r>
+            <a:r>
+              <a:rPr lang="de-DE" dirty="0" smtClean="0"/>
+              <a:t> </a:t>
+            </a:r>
+            <a:r>
+              <a:rPr lang="de-DE" dirty="0" err="1" smtClean="0"/>
+              <a:t>information</a:t>
+            </a:r>
+            <a:r>
+              <a:rPr lang="de-DE" dirty="0" smtClean="0"/>
+              <a:t> </a:t>
+            </a:r>
+            <a:r>
+              <a:rPr lang="de-DE" dirty="0" err="1" smtClean="0"/>
+              <a:t>and</a:t>
+            </a:r>
+            <a:r>
+              <a:rPr lang="de-DE" dirty="0" smtClean="0"/>
+              <a:t> </a:t>
+            </a:r>
+            <a:r>
+              <a:rPr lang="de-DE" dirty="0" err="1" smtClean="0"/>
+              <a:t>degrees</a:t>
             </a:r>
             <a:endParaRPr lang="de-DE" baseline="0" dirty="0" smtClean="0"/>
           </a:p>
           <a:p>
             <a:r>
               <a:rPr lang="de-DE" baseline="0" dirty="0" smtClean="0"/>
-              <a:t>6. Bachelor-Abschluss anzeigen</a:t>
-            </a:r>
-          </a:p>
-          <a:p>
-            <a:r>
-              <a:rPr lang="de-DE" baseline="0" dirty="0" smtClean="0"/>
-              <a:t>STOP </a:t>
-            </a:r>
-            <a:r>
-              <a:rPr lang="de-DE" baseline="0" dirty="0" smtClean="0"/>
-              <a:t>bei 0:54</a:t>
-            </a:r>
-          </a:p>
-          <a:p>
+              <a:t>6. Bachelor </a:t>
+            </a:r>
+            <a:r>
+              <a:rPr lang="de-DE" baseline="0" dirty="0" err="1" smtClean="0"/>
+              <a:t>degree</a:t>
+            </a:r>
+            <a:r>
+              <a:rPr lang="de-DE" baseline="0" dirty="0" smtClean="0"/>
+              <a:t> </a:t>
+            </a:r>
+            <a:r>
+              <a:rPr lang="de-DE" baseline="0" dirty="0" err="1" smtClean="0"/>
+              <a:t>with</a:t>
+            </a:r>
+            <a:r>
+              <a:rPr lang="de-DE" baseline="0" dirty="0" smtClean="0"/>
+              <a:t> all </a:t>
+            </a:r>
+            <a:r>
+              <a:rPr lang="de-DE" baseline="0" dirty="0" err="1" smtClean="0"/>
+              <a:t>the</a:t>
+            </a:r>
+            <a:r>
+              <a:rPr lang="de-DE" baseline="0" dirty="0" smtClean="0"/>
+              <a:t> grades</a:t>
+            </a:r>
             <a:endParaRPr lang="de-DE" baseline="0" dirty="0" smtClean="0"/>
           </a:p>
           <a:p>
             <a:r>
               <a:rPr lang="de-DE" baseline="0" dirty="0" smtClean="0"/>
-              <a:t>7</a:t>
+              <a:t>STOP bei 0:54</a:t>
+            </a:r>
+          </a:p>
+          <a:p>
+            <a:endParaRPr lang="de-DE" baseline="0" dirty="0" smtClean="0"/>
+          </a:p>
+          <a:p>
+            <a:r>
+              <a:rPr lang="de-DE" baseline="0" dirty="0" smtClean="0"/>
+              <a:t>7. </a:t>
+            </a:r>
+            <a:r>
+              <a:rPr lang="de-DE" baseline="0" dirty="0" err="1" smtClean="0"/>
+              <a:t>Explain</a:t>
+            </a:r>
+            <a:r>
+              <a:rPr lang="de-DE" baseline="0" dirty="0" smtClean="0"/>
+              <a:t> </a:t>
+            </a:r>
+            <a:r>
+              <a:rPr lang="de-DE" baseline="0" dirty="0" err="1" smtClean="0"/>
+              <a:t>colors</a:t>
+            </a:r>
+            <a:r>
+              <a:rPr lang="de-DE" baseline="0" dirty="0" smtClean="0"/>
+              <a:t>: </a:t>
+            </a:r>
+            <a:r>
+              <a:rPr lang="de-DE" baseline="0" dirty="0" err="1" smtClean="0"/>
+              <a:t>green</a:t>
+            </a:r>
+            <a:r>
+              <a:rPr lang="de-DE" baseline="0" dirty="0" smtClean="0"/>
+              <a:t> </a:t>
+            </a:r>
+            <a:r>
+              <a:rPr lang="de-DE" baseline="0" dirty="0" err="1" smtClean="0"/>
+              <a:t>are</a:t>
+            </a:r>
+            <a:r>
+              <a:rPr lang="de-DE" baseline="0" dirty="0" smtClean="0"/>
+              <a:t> </a:t>
+            </a:r>
+            <a:r>
+              <a:rPr lang="de-DE" baseline="0" dirty="0" err="1" smtClean="0"/>
+              <a:t>certificates</a:t>
+            </a:r>
+            <a:r>
+              <a:rPr lang="de-DE" baseline="0" dirty="0" smtClean="0"/>
+              <a:t> (Scheine), </a:t>
+            </a:r>
+            <a:r>
+              <a:rPr lang="de-DE" baseline="0" dirty="0" err="1" smtClean="0"/>
+              <a:t>blue</a:t>
+            </a:r>
+            <a:r>
+              <a:rPr lang="de-DE" baseline="0" dirty="0" smtClean="0"/>
+              <a:t> </a:t>
+            </a:r>
+            <a:r>
+              <a:rPr lang="de-DE" baseline="0" dirty="0" err="1" smtClean="0"/>
+              <a:t>are</a:t>
+            </a:r>
+            <a:r>
+              <a:rPr lang="de-DE" baseline="0" dirty="0" smtClean="0"/>
+              <a:t> </a:t>
+            </a:r>
+            <a:r>
+              <a:rPr lang="de-DE" baseline="0" dirty="0" err="1" smtClean="0"/>
+              <a:t>modules</a:t>
+            </a:r>
+            <a:r>
+              <a:rPr lang="de-DE" baseline="0" dirty="0" smtClean="0"/>
+              <a:t> </a:t>
+            </a:r>
+            <a:r>
+              <a:rPr lang="de-DE" baseline="0" dirty="0" err="1" smtClean="0"/>
+              <a:t>and</a:t>
+            </a:r>
+            <a:r>
+              <a:rPr lang="de-DE" baseline="0" dirty="0" smtClean="0"/>
+              <a:t> normal grades </a:t>
+            </a:r>
+            <a:r>
+              <a:rPr lang="de-DE" baseline="0" dirty="0" err="1" smtClean="0"/>
+              <a:t>are</a:t>
+            </a:r>
+            <a:r>
+              <a:rPr lang="de-DE" baseline="0" dirty="0" smtClean="0"/>
+              <a:t> </a:t>
+            </a:r>
+            <a:r>
+              <a:rPr lang="de-DE" baseline="0" dirty="0" err="1" smtClean="0"/>
+              <a:t>white</a:t>
+            </a:r>
+            <a:endParaRPr lang="de-DE" baseline="0" dirty="0" smtClean="0"/>
+          </a:p>
+          <a:p>
+            <a:r>
+              <a:rPr lang="de-DE" baseline="0" dirty="0" smtClean="0"/>
+              <a:t>8</a:t>
             </a:r>
             <a:r>
               <a:rPr lang="de-DE" baseline="0" dirty="0" smtClean="0"/>
               <a:t>. </a:t>
             </a:r>
             <a:r>
-              <a:rPr lang="de-DE" baseline="0" dirty="0" err="1" smtClean="0"/>
-              <a:t>farben</a:t>
-            </a:r>
-            <a:r>
-              <a:rPr lang="de-DE" baseline="0" dirty="0" smtClean="0"/>
-              <a:t> erklären und was angezeigt wird</a:t>
-            </a:r>
-          </a:p>
-          <a:p>
-            <a:r>
-              <a:rPr lang="de-DE" baseline="0" dirty="0" smtClean="0"/>
-              <a:t>8. Filter zeigen</a:t>
-            </a:r>
-          </a:p>
-          <a:p>
-            <a:r>
-              <a:rPr lang="de-DE" baseline="0" dirty="0" smtClean="0"/>
-              <a:t>9. Suche nach Mathe</a:t>
-            </a:r>
+              <a:rPr lang="de-DE" baseline="0" dirty="0" smtClean="0"/>
+              <a:t>Filter </a:t>
+            </a:r>
+            <a:r>
+              <a:rPr lang="de-DE" baseline="0" dirty="0" err="1" smtClean="0"/>
+              <a:t>the</a:t>
+            </a:r>
+            <a:r>
+              <a:rPr lang="de-DE" baseline="0" dirty="0" smtClean="0"/>
+              <a:t> grades </a:t>
+            </a:r>
+            <a:r>
+              <a:rPr lang="de-DE" baseline="0" dirty="0" err="1" smtClean="0"/>
+              <a:t>by</a:t>
+            </a:r>
+            <a:r>
+              <a:rPr lang="de-DE" baseline="0" dirty="0" smtClean="0"/>
+              <a:t> type</a:t>
+            </a:r>
+            <a:endParaRPr lang="de-DE" baseline="0" dirty="0" smtClean="0"/>
+          </a:p>
+          <a:p>
+            <a:r>
+              <a:rPr lang="de-DE" baseline="0" dirty="0" smtClean="0"/>
+              <a:t>9. </a:t>
+            </a:r>
+            <a:r>
+              <a:rPr lang="de-DE" baseline="0" dirty="0" err="1" smtClean="0"/>
+              <a:t>Search</a:t>
+            </a:r>
+            <a:r>
+              <a:rPr lang="de-DE" baseline="0" dirty="0" smtClean="0"/>
+              <a:t> grades </a:t>
+            </a:r>
+            <a:r>
+              <a:rPr lang="de-DE" baseline="0" dirty="0" err="1" smtClean="0"/>
+              <a:t>by</a:t>
+            </a:r>
+            <a:r>
+              <a:rPr lang="de-DE" baseline="0" dirty="0" smtClean="0"/>
+              <a:t> </a:t>
+            </a:r>
+            <a:r>
+              <a:rPr lang="de-DE" baseline="0" dirty="0" err="1" smtClean="0"/>
+              <a:t>name</a:t>
+            </a:r>
+            <a:endParaRPr lang="de-DE" baseline="0" dirty="0" smtClean="0"/>
           </a:p>
           <a:p>
             <a:r>
@@ -949,11 +2375,7 @@
           <a:p>
             <a:r>
               <a:rPr lang="de-DE" baseline="0" dirty="0" smtClean="0"/>
-              <a:t>10</a:t>
-            </a:r>
-            <a:r>
-              <a:rPr lang="de-DE" baseline="0" dirty="0" smtClean="0"/>
-              <a:t>. Clear </a:t>
+              <a:t>10. Clear </a:t>
             </a:r>
             <a:r>
               <a:rPr lang="de-DE" baseline="0" dirty="0" err="1" smtClean="0"/>
@@ -969,14 +2391,164 @@
             </a:r>
             <a:r>
               <a:rPr lang="de-DE" baseline="0" dirty="0" smtClean="0"/>
-              <a:t> 	Was genau wurde wo hinterlegt und wird gelöscht</a:t>
-            </a:r>
+              <a:t>: The </a:t>
+            </a:r>
+            <a:r>
+              <a:rPr lang="de-DE" baseline="0" dirty="0" err="1" smtClean="0"/>
+              <a:t>search</a:t>
+            </a:r>
+            <a:r>
+              <a:rPr lang="de-DE" baseline="0" dirty="0" smtClean="0"/>
+              <a:t> box </a:t>
+            </a:r>
+            <a:r>
+              <a:rPr lang="de-DE" baseline="0" dirty="0" err="1" smtClean="0"/>
+              <a:t>saves</a:t>
+            </a:r>
+            <a:r>
+              <a:rPr lang="de-DE" baseline="0" dirty="0" smtClean="0"/>
+              <a:t> </a:t>
+            </a:r>
+            <a:r>
+              <a:rPr lang="de-DE" baseline="0" dirty="0" err="1" smtClean="0"/>
+              <a:t>the</a:t>
+            </a:r>
+            <a:r>
+              <a:rPr lang="de-DE" baseline="0" dirty="0" smtClean="0"/>
+              <a:t> last </a:t>
+            </a:r>
+            <a:r>
+              <a:rPr lang="de-DE" baseline="0" dirty="0" err="1" smtClean="0"/>
+              <a:t>search</a:t>
+            </a:r>
+            <a:r>
+              <a:rPr lang="de-DE" baseline="0" dirty="0" smtClean="0"/>
+              <a:t> </a:t>
+            </a:r>
+            <a:r>
+              <a:rPr lang="de-DE" baseline="0" dirty="0" err="1" smtClean="0"/>
+              <a:t>queries</a:t>
+            </a:r>
+            <a:r>
+              <a:rPr lang="de-DE" baseline="0" dirty="0" smtClean="0"/>
+              <a:t> </a:t>
+            </a:r>
+            <a:r>
+              <a:rPr lang="de-DE" baseline="0" dirty="0" err="1" smtClean="0"/>
+              <a:t>and</a:t>
+            </a:r>
+            <a:r>
+              <a:rPr lang="de-DE" baseline="0" dirty="0" smtClean="0"/>
+              <a:t> </a:t>
+            </a:r>
+            <a:r>
+              <a:rPr lang="de-DE" baseline="0" dirty="0" err="1" smtClean="0"/>
+              <a:t>clear</a:t>
+            </a:r>
+            <a:r>
+              <a:rPr lang="de-DE" baseline="0" dirty="0" smtClean="0"/>
+              <a:t> </a:t>
+            </a:r>
+            <a:r>
+              <a:rPr lang="de-DE" baseline="0" dirty="0" err="1" smtClean="0"/>
+              <a:t>removes</a:t>
+            </a:r>
+            <a:r>
+              <a:rPr lang="de-DE" baseline="0" dirty="0" smtClean="0"/>
+              <a:t> all </a:t>
+            </a:r>
+            <a:r>
+              <a:rPr lang="de-DE" baseline="0" dirty="0" err="1" smtClean="0"/>
+              <a:t>the</a:t>
+            </a:r>
+            <a:r>
+              <a:rPr lang="de-DE" baseline="0" dirty="0" smtClean="0"/>
+              <a:t> </a:t>
+            </a:r>
+            <a:r>
+              <a:rPr lang="de-DE" baseline="0" dirty="0" err="1" smtClean="0"/>
+              <a:t>old</a:t>
+            </a:r>
+            <a:r>
+              <a:rPr lang="de-DE" baseline="0" dirty="0" smtClean="0"/>
+              <a:t> </a:t>
+            </a:r>
+            <a:r>
+              <a:rPr lang="de-DE" baseline="0" dirty="0" err="1" smtClean="0"/>
+              <a:t>search</a:t>
+            </a:r>
+            <a:r>
+              <a:rPr lang="de-DE" baseline="0" dirty="0" smtClean="0"/>
+              <a:t> </a:t>
+            </a:r>
+            <a:r>
+              <a:rPr lang="de-DE" baseline="0" dirty="0" err="1" smtClean="0"/>
+              <a:t>entries</a:t>
+            </a:r>
+            <a:r>
+              <a:rPr lang="de-DE" baseline="0" dirty="0" smtClean="0"/>
+              <a:t>.</a:t>
+            </a:r>
+            <a:endParaRPr lang="de-DE" baseline="0" dirty="0" smtClean="0"/>
           </a:p>
           <a:p>
             <a:r>
               <a:rPr lang="de-DE" dirty="0" smtClean="0"/>
-              <a:t>11. Details zeigen</a:t>
-            </a:r>
+              <a:t>11. </a:t>
+            </a:r>
+            <a:r>
+              <a:rPr lang="de-DE" dirty="0" smtClean="0"/>
+              <a:t>Grade </a:t>
+            </a:r>
+            <a:r>
+              <a:rPr lang="de-DE" dirty="0" err="1" smtClean="0"/>
+              <a:t>details</a:t>
+            </a:r>
+            <a:r>
+              <a:rPr lang="de-DE" baseline="0" dirty="0" smtClean="0"/>
+              <a:t> (</a:t>
+            </a:r>
+            <a:r>
+              <a:rPr lang="de-DE" baseline="0" dirty="0" err="1" smtClean="0"/>
+              <a:t>everything</a:t>
+            </a:r>
+            <a:r>
+              <a:rPr lang="de-DE" baseline="0" dirty="0" smtClean="0"/>
+              <a:t> </a:t>
+            </a:r>
+            <a:r>
+              <a:rPr lang="de-DE" baseline="0" dirty="0" err="1" smtClean="0"/>
+              <a:t>available</a:t>
+            </a:r>
+            <a:r>
+              <a:rPr lang="de-DE" baseline="0" dirty="0" smtClean="0"/>
+              <a:t> </a:t>
+            </a:r>
+            <a:r>
+              <a:rPr lang="de-DE" baseline="0" dirty="0" err="1" smtClean="0"/>
+              <a:t>from</a:t>
+            </a:r>
+            <a:r>
+              <a:rPr lang="de-DE" baseline="0" dirty="0" smtClean="0"/>
+              <a:t> </a:t>
+            </a:r>
+            <a:r>
+              <a:rPr lang="de-DE" baseline="0" dirty="0" err="1" smtClean="0"/>
+              <a:t>the</a:t>
+            </a:r>
+            <a:r>
+              <a:rPr lang="de-DE" baseline="0" dirty="0" smtClean="0"/>
+              <a:t> </a:t>
+            </a:r>
+            <a:r>
+              <a:rPr lang="de-DE" baseline="0" dirty="0" err="1" smtClean="0"/>
+              <a:t>student</a:t>
+            </a:r>
+            <a:r>
+              <a:rPr lang="de-DE" baseline="0" dirty="0" smtClean="0"/>
+              <a:t> terminal)</a:t>
+            </a:r>
+            <a:endParaRPr lang="de-DE" dirty="0" smtClean="0"/>
           </a:p>
           <a:p>
             <a:r>
@@ -990,33 +2562,162 @@
           <a:p>
             <a:r>
               <a:rPr lang="de-DE" dirty="0" smtClean="0"/>
-              <a:t>12</a:t>
+              <a:t>12. </a:t>
+            </a:r>
+            <a:r>
+              <a:rPr lang="de-DE" dirty="0" err="1" smtClean="0"/>
+              <a:t>Explain</a:t>
             </a:r>
             <a:r>
               <a:rPr lang="de-DE" dirty="0" smtClean="0"/>
-              <a:t>. und </a:t>
+              <a:t> </a:t>
+            </a:r>
+            <a:r>
+              <a:rPr lang="de-DE" dirty="0" err="1" smtClean="0"/>
+              <a:t>the</a:t>
+            </a:r>
+            <a:r>
+              <a:rPr lang="de-DE" dirty="0" smtClean="0"/>
+              <a:t> </a:t>
             </a:r>
             <a:r>
               <a:rPr lang="de-DE" dirty="0" err="1" smtClean="0"/>
               <a:t>share</a:t>
             </a:r>
             <a:r>
-              <a:rPr lang="de-DE" baseline="0" dirty="0" smtClean="0"/>
-              <a:t> erklären</a:t>
-            </a:r>
-          </a:p>
-          <a:p>
-            <a:r>
-              <a:rPr lang="de-DE" baseline="0" dirty="0" smtClean="0"/>
-              <a:t>13. Zurück auf </a:t>
-            </a:r>
-            <a:r>
-              <a:rPr lang="de-DE" baseline="0" dirty="0" err="1" smtClean="0"/>
-              <a:t>home</a:t>
-            </a:r>
-            <a:r>
-              <a:rPr lang="de-DE" baseline="0" dirty="0" smtClean="0"/>
-              <a:t>… </a:t>
+              <a:rPr lang="de-DE" dirty="0" smtClean="0"/>
+              <a:t> </a:t>
+            </a:r>
+            <a:r>
+              <a:rPr lang="de-DE" dirty="0" err="1" smtClean="0"/>
+              <a:t>button</a:t>
+            </a:r>
+            <a:r>
+              <a:rPr lang="de-DE" dirty="0" smtClean="0"/>
+              <a:t>. </a:t>
+            </a:r>
+            <a:r>
+              <a:rPr lang="de-DE" dirty="0" err="1" smtClean="0"/>
+              <a:t>Normally</a:t>
+            </a:r>
+            <a:r>
+              <a:rPr lang="de-DE" baseline="0" dirty="0" smtClean="0"/>
+              <a:t> </a:t>
+            </a:r>
+            <a:r>
+              <a:rPr lang="de-DE" baseline="0" dirty="0" err="1" smtClean="0"/>
+              <a:t>this</a:t>
+            </a:r>
+            <a:r>
+              <a:rPr lang="de-DE" baseline="0" dirty="0" smtClean="0"/>
+              <a:t> </a:t>
+            </a:r>
+            <a:r>
+              <a:rPr lang="de-DE" baseline="0" dirty="0" err="1" smtClean="0"/>
+              <a:t>would</a:t>
+            </a:r>
+            <a:r>
+              <a:rPr lang="de-DE" baseline="0" dirty="0" smtClean="0"/>
+              <a:t> open a </a:t>
+            </a:r>
+            <a:r>
+              <a:rPr lang="de-DE" baseline="0" dirty="0" err="1" smtClean="0"/>
+              <a:t>dialog</a:t>
+            </a:r>
+            <a:r>
+              <a:rPr lang="de-DE" baseline="0" dirty="0" smtClean="0"/>
+              <a:t> </a:t>
+            </a:r>
+            <a:r>
+              <a:rPr lang="de-DE" baseline="0" dirty="0" err="1" smtClean="0"/>
+              <a:t>where</a:t>
+            </a:r>
+            <a:r>
+              <a:rPr lang="de-DE" baseline="0" dirty="0" smtClean="0"/>
+              <a:t> </a:t>
+            </a:r>
+            <a:r>
+              <a:rPr lang="de-DE" baseline="0" dirty="0" err="1" smtClean="0"/>
+              <a:t>you</a:t>
+            </a:r>
+            <a:r>
+              <a:rPr lang="de-DE" baseline="0" dirty="0" smtClean="0"/>
+              <a:t> </a:t>
+            </a:r>
+            <a:r>
+              <a:rPr lang="de-DE" baseline="0" dirty="0" err="1" smtClean="0"/>
+              <a:t>can</a:t>
+            </a:r>
+            <a:r>
+              <a:rPr lang="de-DE" baseline="0" dirty="0" smtClean="0"/>
+              <a:t> </a:t>
+            </a:r>
+            <a:r>
+              <a:rPr lang="de-DE" baseline="0" dirty="0" err="1" smtClean="0"/>
+              <a:t>choose</a:t>
+            </a:r>
+            <a:r>
+              <a:rPr lang="de-DE" baseline="0" dirty="0" smtClean="0"/>
+              <a:t> </a:t>
+            </a:r>
+            <a:r>
+              <a:rPr lang="de-DE" baseline="0" dirty="0" err="1" smtClean="0"/>
+              <a:t>between</a:t>
+            </a:r>
+            <a:r>
+              <a:rPr lang="de-DE" baseline="0" dirty="0" smtClean="0"/>
+              <a:t> different </a:t>
+            </a:r>
+            <a:r>
+              <a:rPr lang="de-DE" baseline="0" dirty="0" err="1" smtClean="0"/>
+              <a:t>apps</a:t>
+            </a:r>
+            <a:r>
+              <a:rPr lang="de-DE" baseline="0" dirty="0" smtClean="0"/>
+              <a:t>.</a:t>
+            </a:r>
+            <a:endParaRPr lang="de-DE" baseline="0" dirty="0" smtClean="0"/>
+          </a:p>
+          <a:p>
+            <a:r>
+              <a:rPr lang="de-DE" baseline="0" dirty="0" smtClean="0"/>
+              <a:t>13. </a:t>
+            </a:r>
+            <a:r>
+              <a:rPr lang="de-DE" baseline="0" dirty="0" smtClean="0"/>
+              <a:t>Back </a:t>
+            </a:r>
+            <a:r>
+              <a:rPr lang="de-DE" baseline="0" dirty="0" err="1" smtClean="0"/>
+              <a:t>to</a:t>
+            </a:r>
+            <a:r>
+              <a:rPr lang="de-DE" baseline="0" dirty="0" smtClean="0"/>
+              <a:t> </a:t>
+            </a:r>
+            <a:r>
+              <a:rPr lang="de-DE" baseline="0" dirty="0" err="1" smtClean="0"/>
+              <a:t>the</a:t>
+            </a:r>
+            <a:r>
+              <a:rPr lang="de-DE" baseline="0" dirty="0" smtClean="0"/>
+              <a:t> </a:t>
+            </a:r>
+            <a:r>
+              <a:rPr lang="de-DE" baseline="0" dirty="0" err="1" smtClean="0"/>
+              <a:t>mainscreen</a:t>
+            </a:r>
+            <a:r>
+              <a:rPr lang="de-DE" baseline="0" dirty="0" smtClean="0"/>
+              <a:t> </a:t>
+            </a:r>
+            <a:r>
+              <a:rPr lang="de-DE" baseline="0" dirty="0" err="1" smtClean="0"/>
+              <a:t>and</a:t>
+            </a:r>
+            <a:r>
+              <a:rPr lang="de-DE" baseline="0" dirty="0" smtClean="0"/>
+              <a:t> </a:t>
             </a:r>
             <a:r>
               <a:rPr lang="de-DE" baseline="0" dirty="0" err="1" smtClean="0"/>
@@ -1024,11 +2725,11 @@
             </a:r>
             <a:r>
               <a:rPr lang="de-DE" baseline="0" dirty="0" smtClean="0"/>
-              <a:t> mit „anderen“ </a:t>
-            </a:r>
-            <a:r>
-              <a:rPr lang="de-DE" baseline="0" dirty="0" err="1" smtClean="0"/>
-              <a:t>daten</a:t>
+              <a:t> </a:t>
+            </a:r>
+            <a:r>
+              <a:rPr lang="de-DE" baseline="0" dirty="0" err="1" smtClean="0"/>
+              <a:t>again</a:t>
             </a:r>
             <a:endParaRPr lang="de-DE" dirty="0"/>
           </a:p>
@@ -1134,6 +2835,149 @@
               <a:t>Manuel</a:t>
             </a:r>
           </a:p>
+          <a:p>
+            <a:pPr marL="0" marR="0" indent="0" algn="l" defTabSz="914400" rtl="0" eaLnBrk="1" fontAlgn="auto" latinLnBrk="0" hangingPunct="1">
+              <a:lnSpc>
+                <a:spcPct val="100000"/>
+              </a:lnSpc>
+              <a:spcBef>
+                <a:spcPts val="0"/>
+              </a:spcBef>
+              <a:spcAft>
+                <a:spcPts val="0"/>
+              </a:spcAft>
+              <a:buClrTx/>
+              <a:buSzTx/>
+              <a:buFontTx/>
+              <a:buNone/>
+              <a:tabLst/>
+              <a:defRPr/>
+            </a:pPr>
+            <a:endParaRPr lang="de-DE" dirty="0" smtClean="0"/>
+          </a:p>
+          <a:p>
+            <a:pPr marL="0" marR="0" indent="0" algn="l" defTabSz="914400" rtl="0" eaLnBrk="1" fontAlgn="auto" latinLnBrk="0" hangingPunct="1">
+              <a:lnSpc>
+                <a:spcPct val="100000"/>
+              </a:lnSpc>
+              <a:spcBef>
+                <a:spcPts val="0"/>
+              </a:spcBef>
+              <a:spcAft>
+                <a:spcPts val="0"/>
+              </a:spcAft>
+              <a:buClrTx/>
+              <a:buSzTx/>
+              <a:buFontTx/>
+              <a:buNone/>
+              <a:tabLst/>
+              <a:defRPr/>
+            </a:pPr>
+            <a:r>
+              <a:rPr lang="de-DE" dirty="0" err="1" smtClean="0"/>
+              <a:t>There</a:t>
+            </a:r>
+            <a:r>
+              <a:rPr lang="de-DE" dirty="0" smtClean="0"/>
+              <a:t> </a:t>
+            </a:r>
+            <a:r>
+              <a:rPr lang="de-DE" dirty="0" err="1" smtClean="0"/>
+              <a:t>are</a:t>
+            </a:r>
+            <a:r>
+              <a:rPr lang="de-DE" dirty="0" smtClean="0"/>
+              <a:t> </a:t>
+            </a:r>
+            <a:r>
+              <a:rPr lang="de-DE" dirty="0" err="1" smtClean="0"/>
+              <a:t>some</a:t>
+            </a:r>
+            <a:r>
+              <a:rPr lang="de-DE" dirty="0" smtClean="0"/>
+              <a:t> additional </a:t>
+            </a:r>
+            <a:r>
+              <a:rPr lang="de-DE" dirty="0" err="1" smtClean="0"/>
+              <a:t>features</a:t>
+            </a:r>
+            <a:r>
+              <a:rPr lang="de-DE" dirty="0" smtClean="0"/>
+              <a:t> on </a:t>
+            </a:r>
+            <a:r>
+              <a:rPr lang="de-DE" dirty="0" err="1" smtClean="0"/>
+              <a:t>this</a:t>
+            </a:r>
+            <a:r>
+              <a:rPr lang="de-DE" dirty="0" smtClean="0"/>
+              <a:t> </a:t>
+            </a:r>
+            <a:r>
+              <a:rPr lang="de-DE" dirty="0" err="1" smtClean="0"/>
+              <a:t>list</a:t>
+            </a:r>
+            <a:r>
+              <a:rPr lang="de-DE" dirty="0" smtClean="0"/>
+              <a:t> </a:t>
+            </a:r>
+            <a:r>
+              <a:rPr lang="de-DE" dirty="0" err="1" smtClean="0"/>
+              <a:t>which</a:t>
+            </a:r>
+            <a:r>
+              <a:rPr lang="de-DE" dirty="0" smtClean="0"/>
+              <a:t> </a:t>
+            </a:r>
+            <a:r>
+              <a:rPr lang="de-DE" dirty="0" err="1" smtClean="0"/>
+              <a:t>would</a:t>
+            </a:r>
+            <a:r>
+              <a:rPr lang="de-DE" dirty="0" smtClean="0"/>
+              <a:t> </a:t>
+            </a:r>
+            <a:r>
+              <a:rPr lang="de-DE" dirty="0" err="1" smtClean="0"/>
+              <a:t>be</a:t>
+            </a:r>
+            <a:r>
+              <a:rPr lang="de-DE" dirty="0" smtClean="0"/>
+              <a:t> cool </a:t>
+            </a:r>
+            <a:r>
+              <a:rPr lang="de-DE" dirty="0" err="1" smtClean="0"/>
+              <a:t>to</a:t>
+            </a:r>
+            <a:r>
+              <a:rPr lang="de-DE" dirty="0" smtClean="0"/>
+              <a:t> </a:t>
+            </a:r>
+            <a:r>
+              <a:rPr lang="de-DE" dirty="0" err="1" smtClean="0"/>
+              <a:t>have</a:t>
+            </a:r>
+            <a:r>
+              <a:rPr lang="de-DE" dirty="0" smtClean="0"/>
+              <a:t> in </a:t>
+            </a:r>
+            <a:r>
+              <a:rPr lang="de-DE" dirty="0" err="1" smtClean="0"/>
+              <a:t>our</a:t>
+            </a:r>
+            <a:r>
+              <a:rPr lang="de-DE" baseline="0" dirty="0" smtClean="0"/>
+              <a:t> </a:t>
+            </a:r>
+            <a:r>
+              <a:rPr lang="de-DE" baseline="0" dirty="0" err="1" smtClean="0"/>
+              <a:t>app</a:t>
+            </a:r>
+            <a:r>
+              <a:rPr lang="de-DE" baseline="0" dirty="0" smtClean="0"/>
+              <a:t>.</a:t>
+            </a:r>
+          </a:p>
         </p:txBody>
       </p:sp>
       <p:sp>
@@ -1236,6 +3080,1119 @@
               <a:t>Manuel</a:t>
             </a:r>
           </a:p>
+          <a:p>
+            <a:pPr marL="0" marR="0" indent="0" algn="l" defTabSz="914400" rtl="0" eaLnBrk="1" fontAlgn="auto" latinLnBrk="0" hangingPunct="1">
+              <a:lnSpc>
+                <a:spcPct val="100000"/>
+              </a:lnSpc>
+              <a:spcBef>
+                <a:spcPts val="0"/>
+              </a:spcBef>
+              <a:spcAft>
+                <a:spcPts val="0"/>
+              </a:spcAft>
+              <a:buClrTx/>
+              <a:buSzTx/>
+              <a:buFontTx/>
+              <a:buNone/>
+              <a:tabLst/>
+              <a:defRPr/>
+            </a:pPr>
+            <a:endParaRPr lang="de-DE" dirty="0" smtClean="0"/>
+          </a:p>
+          <a:p>
+            <a:pPr marL="0" marR="0" indent="0" algn="l" defTabSz="914400" rtl="0" eaLnBrk="1" fontAlgn="auto" latinLnBrk="0" hangingPunct="1">
+              <a:lnSpc>
+                <a:spcPct val="100000"/>
+              </a:lnSpc>
+              <a:spcBef>
+                <a:spcPts val="0"/>
+              </a:spcBef>
+              <a:spcAft>
+                <a:spcPts val="0"/>
+              </a:spcAft>
+              <a:buClrTx/>
+              <a:buSzTx/>
+              <a:buFontTx/>
+              <a:buNone/>
+              <a:tabLst/>
+              <a:defRPr/>
+            </a:pPr>
+            <a:r>
+              <a:rPr lang="de-DE" dirty="0" smtClean="0"/>
+              <a:t>I </a:t>
+            </a:r>
+            <a:r>
+              <a:rPr lang="de-DE" dirty="0" err="1" smtClean="0"/>
+              <a:t>would</a:t>
+            </a:r>
+            <a:r>
+              <a:rPr lang="de-DE" dirty="0" smtClean="0"/>
+              <a:t> </a:t>
+            </a:r>
+            <a:r>
+              <a:rPr lang="de-DE" dirty="0" err="1" smtClean="0"/>
+              <a:t>like</a:t>
+            </a:r>
+            <a:r>
+              <a:rPr lang="de-DE" dirty="0" smtClean="0"/>
+              <a:t> </a:t>
+            </a:r>
+            <a:r>
+              <a:rPr lang="de-DE" dirty="0" err="1" smtClean="0"/>
+              <a:t>to</a:t>
+            </a:r>
+            <a:r>
+              <a:rPr lang="de-DE" dirty="0" smtClean="0"/>
+              <a:t> end </a:t>
+            </a:r>
+            <a:r>
+              <a:rPr lang="de-DE" dirty="0" err="1" smtClean="0"/>
+              <a:t>our</a:t>
+            </a:r>
+            <a:r>
+              <a:rPr lang="de-DE" dirty="0" smtClean="0"/>
+              <a:t> </a:t>
+            </a:r>
+            <a:r>
+              <a:rPr lang="de-DE" dirty="0" err="1" smtClean="0"/>
+              <a:t>presentation</a:t>
+            </a:r>
+            <a:r>
+              <a:rPr lang="de-DE" dirty="0" smtClean="0"/>
+              <a:t> </a:t>
+            </a:r>
+            <a:r>
+              <a:rPr lang="de-DE" dirty="0" err="1" smtClean="0"/>
+              <a:t>with</a:t>
+            </a:r>
+            <a:r>
+              <a:rPr lang="de-DE" dirty="0" smtClean="0"/>
+              <a:t> a </a:t>
+            </a:r>
+            <a:r>
+              <a:rPr lang="de-DE" dirty="0" err="1" smtClean="0"/>
+              <a:t>short</a:t>
+            </a:r>
+            <a:r>
+              <a:rPr lang="de-DE" dirty="0" smtClean="0"/>
+              <a:t> </a:t>
+            </a:r>
+            <a:r>
+              <a:rPr lang="de-DE" dirty="0" err="1" smtClean="0"/>
+              <a:t>summary</a:t>
+            </a:r>
+            <a:r>
+              <a:rPr lang="de-DE" dirty="0" smtClean="0"/>
+              <a:t>.</a:t>
+            </a:r>
+          </a:p>
+          <a:p>
+            <a:pPr marL="0" marR="0" indent="0" algn="l" defTabSz="914400" rtl="0" eaLnBrk="1" fontAlgn="auto" latinLnBrk="0" hangingPunct="1">
+              <a:lnSpc>
+                <a:spcPct val="100000"/>
+              </a:lnSpc>
+              <a:spcBef>
+                <a:spcPts val="0"/>
+              </a:spcBef>
+              <a:spcAft>
+                <a:spcPts val="0"/>
+              </a:spcAft>
+              <a:buClrTx/>
+              <a:buSzTx/>
+              <a:buFontTx/>
+              <a:buNone/>
+              <a:tabLst/>
+              <a:defRPr/>
+            </a:pPr>
+            <a:endParaRPr lang="de-DE" dirty="0" smtClean="0"/>
+          </a:p>
+          <a:p>
+            <a:pPr marL="0" marR="0" indent="0" algn="l" defTabSz="914400" rtl="0" eaLnBrk="1" fontAlgn="auto" latinLnBrk="0" hangingPunct="1">
+              <a:lnSpc>
+                <a:spcPct val="100000"/>
+              </a:lnSpc>
+              <a:spcBef>
+                <a:spcPts val="0"/>
+              </a:spcBef>
+              <a:spcAft>
+                <a:spcPts val="0"/>
+              </a:spcAft>
+              <a:buClrTx/>
+              <a:buSzTx/>
+              <a:buFontTx/>
+              <a:buNone/>
+              <a:tabLst/>
+              <a:defRPr/>
+            </a:pPr>
+            <a:r>
+              <a:rPr lang="de-DE" dirty="0" err="1" smtClean="0"/>
+              <a:t>We</a:t>
+            </a:r>
+            <a:r>
+              <a:rPr lang="de-DE" dirty="0" smtClean="0"/>
+              <a:t> </a:t>
+            </a:r>
+            <a:r>
+              <a:rPr lang="de-DE" dirty="0" err="1" smtClean="0"/>
+              <a:t>have</a:t>
+            </a:r>
+            <a:r>
+              <a:rPr lang="de-DE" baseline="0" dirty="0" smtClean="0"/>
+              <a:t> </a:t>
+            </a:r>
+            <a:r>
+              <a:rPr lang="de-DE" baseline="0" dirty="0" err="1" smtClean="0"/>
+              <a:t>implemented</a:t>
+            </a:r>
+            <a:r>
+              <a:rPr lang="de-DE" baseline="0" dirty="0" smtClean="0"/>
+              <a:t> all </a:t>
+            </a:r>
+            <a:r>
+              <a:rPr lang="de-DE" baseline="0" dirty="0" err="1" smtClean="0"/>
+              <a:t>features</a:t>
+            </a:r>
+            <a:r>
+              <a:rPr lang="de-DE" baseline="0" dirty="0" smtClean="0"/>
+              <a:t> </a:t>
+            </a:r>
+            <a:r>
+              <a:rPr lang="de-DE" baseline="0" dirty="0" err="1" smtClean="0"/>
+              <a:t>which</a:t>
+            </a:r>
+            <a:r>
+              <a:rPr lang="de-DE" baseline="0" dirty="0" smtClean="0"/>
+              <a:t> </a:t>
+            </a:r>
+            <a:r>
+              <a:rPr lang="de-DE" baseline="0" dirty="0" err="1" smtClean="0"/>
+              <a:t>were</a:t>
+            </a:r>
+            <a:r>
+              <a:rPr lang="de-DE" baseline="0" dirty="0" smtClean="0"/>
+              <a:t> </a:t>
+            </a:r>
+            <a:r>
+              <a:rPr lang="de-DE" baseline="0" dirty="0" err="1" smtClean="0"/>
+              <a:t>described</a:t>
+            </a:r>
+            <a:r>
+              <a:rPr lang="de-DE" baseline="0" dirty="0" smtClean="0"/>
+              <a:t> in </a:t>
+            </a:r>
+            <a:r>
+              <a:rPr lang="de-DE" baseline="0" dirty="0" err="1" smtClean="0"/>
+              <a:t>our</a:t>
+            </a:r>
+            <a:r>
+              <a:rPr lang="de-DE" baseline="0" dirty="0" smtClean="0"/>
+              <a:t> </a:t>
+            </a:r>
+            <a:r>
+              <a:rPr lang="de-DE" baseline="0" dirty="0" err="1" smtClean="0"/>
+              <a:t>proposal</a:t>
+            </a:r>
+            <a:r>
+              <a:rPr lang="de-DE" baseline="0" dirty="0" smtClean="0"/>
+              <a:t> </a:t>
+            </a:r>
+            <a:r>
+              <a:rPr lang="de-DE" baseline="0" dirty="0" err="1" smtClean="0"/>
+              <a:t>document</a:t>
+            </a:r>
+            <a:r>
+              <a:rPr lang="de-DE" baseline="0" dirty="0" smtClean="0"/>
+              <a:t>: </a:t>
+            </a:r>
+            <a:r>
+              <a:rPr lang="de-DE" baseline="0" dirty="0" err="1" smtClean="0"/>
+              <a:t>Showing</a:t>
+            </a:r>
+            <a:r>
+              <a:rPr lang="de-DE" baseline="0" dirty="0" smtClean="0"/>
+              <a:t> </a:t>
+            </a:r>
+            <a:r>
+              <a:rPr lang="de-DE" baseline="0" dirty="0" err="1" smtClean="0"/>
+              <a:t>degrees</a:t>
+            </a:r>
+            <a:r>
+              <a:rPr lang="de-DE" baseline="0" dirty="0" smtClean="0"/>
+              <a:t> </a:t>
+            </a:r>
+            <a:r>
+              <a:rPr lang="de-DE" baseline="0" dirty="0" err="1" smtClean="0"/>
+              <a:t>and</a:t>
+            </a:r>
+            <a:r>
+              <a:rPr lang="de-DE" baseline="0" dirty="0" smtClean="0"/>
+              <a:t> grades plus </a:t>
+            </a:r>
+            <a:r>
+              <a:rPr lang="de-DE" baseline="0" dirty="0" err="1" smtClean="0"/>
+              <a:t>filtering</a:t>
+            </a:r>
+            <a:r>
+              <a:rPr lang="de-DE" baseline="0" dirty="0" smtClean="0"/>
+              <a:t> </a:t>
+            </a:r>
+            <a:r>
+              <a:rPr lang="de-DE" baseline="0" dirty="0" err="1" smtClean="0"/>
+              <a:t>and</a:t>
+            </a:r>
+            <a:r>
+              <a:rPr lang="de-DE" baseline="0" dirty="0" smtClean="0"/>
+              <a:t> </a:t>
+            </a:r>
+            <a:r>
+              <a:rPr lang="de-DE" baseline="0" dirty="0" err="1" smtClean="0"/>
+              <a:t>searching</a:t>
+            </a:r>
+            <a:r>
+              <a:rPr lang="de-DE" baseline="0" dirty="0" smtClean="0"/>
+              <a:t>.</a:t>
+            </a:r>
+          </a:p>
+          <a:p>
+            <a:pPr marL="0" marR="0" indent="0" algn="l" defTabSz="914400" rtl="0" eaLnBrk="1" fontAlgn="auto" latinLnBrk="0" hangingPunct="1">
+              <a:lnSpc>
+                <a:spcPct val="100000"/>
+              </a:lnSpc>
+              <a:spcBef>
+                <a:spcPts val="0"/>
+              </a:spcBef>
+              <a:spcAft>
+                <a:spcPts val="0"/>
+              </a:spcAft>
+              <a:buClrTx/>
+              <a:buSzTx/>
+              <a:buFontTx/>
+              <a:buNone/>
+              <a:tabLst/>
+              <a:defRPr/>
+            </a:pPr>
+            <a:r>
+              <a:rPr lang="de-DE" baseline="0" dirty="0" err="1" smtClean="0"/>
+              <a:t>Additionally</a:t>
+            </a:r>
+            <a:r>
+              <a:rPr lang="de-DE" baseline="0" dirty="0" smtClean="0"/>
+              <a:t> </a:t>
+            </a:r>
+            <a:r>
+              <a:rPr lang="de-DE" baseline="0" dirty="0" err="1" smtClean="0"/>
+              <a:t>we</a:t>
+            </a:r>
+            <a:r>
+              <a:rPr lang="de-DE" baseline="0" dirty="0" smtClean="0"/>
+              <a:t> </a:t>
+            </a:r>
+            <a:r>
+              <a:rPr lang="de-DE" baseline="0" dirty="0" err="1" smtClean="0"/>
+              <a:t>implemented</a:t>
+            </a:r>
+            <a:r>
+              <a:rPr lang="de-DE" baseline="0" dirty="0" smtClean="0"/>
+              <a:t> a grade </a:t>
+            </a:r>
+            <a:r>
+              <a:rPr lang="de-DE" baseline="0" dirty="0" err="1" smtClean="0"/>
+              <a:t>details</a:t>
+            </a:r>
+            <a:r>
+              <a:rPr lang="de-DE" baseline="0" dirty="0" smtClean="0"/>
+              <a:t> </a:t>
+            </a:r>
+            <a:r>
+              <a:rPr lang="de-DE" baseline="0" dirty="0" err="1" smtClean="0"/>
+              <a:t>acitivity</a:t>
+            </a:r>
+            <a:r>
+              <a:rPr lang="de-DE" baseline="0" dirty="0" smtClean="0"/>
+              <a:t>, a </a:t>
+            </a:r>
+            <a:r>
+              <a:rPr lang="de-DE" baseline="0" dirty="0" err="1" smtClean="0"/>
+              <a:t>way</a:t>
+            </a:r>
+            <a:r>
+              <a:rPr lang="de-DE" baseline="0" dirty="0" smtClean="0"/>
+              <a:t> </a:t>
+            </a:r>
+            <a:r>
+              <a:rPr lang="de-DE" baseline="0" dirty="0" err="1" smtClean="0"/>
+              <a:t>to</a:t>
+            </a:r>
+            <a:r>
+              <a:rPr lang="de-DE" baseline="0" dirty="0" smtClean="0"/>
+              <a:t> </a:t>
+            </a:r>
+            <a:r>
+              <a:rPr lang="de-DE" baseline="0" dirty="0" err="1" smtClean="0"/>
+              <a:t>share</a:t>
+            </a:r>
+            <a:r>
+              <a:rPr lang="de-DE" baseline="0" dirty="0" smtClean="0"/>
+              <a:t> </a:t>
+            </a:r>
+            <a:r>
+              <a:rPr lang="de-DE" baseline="0" dirty="0" err="1" smtClean="0"/>
+              <a:t>your</a:t>
+            </a:r>
+            <a:r>
+              <a:rPr lang="de-DE" baseline="0" dirty="0" smtClean="0"/>
+              <a:t> grades </a:t>
+            </a:r>
+            <a:r>
+              <a:rPr lang="de-DE" baseline="0" dirty="0" err="1" smtClean="0"/>
+              <a:t>and</a:t>
+            </a:r>
+            <a:r>
+              <a:rPr lang="de-DE" baseline="0" dirty="0" smtClean="0"/>
+              <a:t> a </a:t>
+            </a:r>
+            <a:r>
+              <a:rPr lang="de-DE" baseline="0" dirty="0" err="1" smtClean="0"/>
+              <a:t>special</a:t>
+            </a:r>
+            <a:r>
+              <a:rPr lang="de-DE" baseline="0" dirty="0" smtClean="0"/>
+              <a:t> </a:t>
+            </a:r>
+            <a:r>
+              <a:rPr lang="de-DE" baseline="0" dirty="0" err="1" smtClean="0"/>
+              <a:t>second</a:t>
+            </a:r>
+            <a:r>
+              <a:rPr lang="de-DE" baseline="0" dirty="0" smtClean="0"/>
+              <a:t> </a:t>
+            </a:r>
+            <a:r>
+              <a:rPr lang="de-DE" baseline="0" dirty="0" err="1" smtClean="0"/>
+              <a:t>layout</a:t>
+            </a:r>
+            <a:r>
+              <a:rPr lang="de-DE" baseline="0" dirty="0" smtClean="0"/>
+              <a:t> </a:t>
+            </a:r>
+            <a:r>
+              <a:rPr lang="de-DE" baseline="0" dirty="0" err="1" smtClean="0"/>
+              <a:t>for</a:t>
+            </a:r>
+            <a:r>
+              <a:rPr lang="de-DE" baseline="0" dirty="0" smtClean="0"/>
+              <a:t> </a:t>
+            </a:r>
+            <a:r>
+              <a:rPr lang="de-DE" baseline="0" dirty="0" err="1" smtClean="0"/>
+              <a:t>tablets</a:t>
+            </a:r>
+            <a:r>
+              <a:rPr lang="de-DE" baseline="0" dirty="0" smtClean="0"/>
+              <a:t>.</a:t>
+            </a:r>
+          </a:p>
+          <a:p>
+            <a:pPr marL="0" marR="0" indent="0" algn="l" defTabSz="914400" rtl="0" eaLnBrk="1" fontAlgn="auto" latinLnBrk="0" hangingPunct="1">
+              <a:lnSpc>
+                <a:spcPct val="100000"/>
+              </a:lnSpc>
+              <a:spcBef>
+                <a:spcPts val="0"/>
+              </a:spcBef>
+              <a:spcAft>
+                <a:spcPts val="0"/>
+              </a:spcAft>
+              <a:buClrTx/>
+              <a:buSzTx/>
+              <a:buFontTx/>
+              <a:buNone/>
+              <a:tabLst/>
+              <a:defRPr/>
+            </a:pPr>
+            <a:endParaRPr lang="de-DE" baseline="0" dirty="0" smtClean="0"/>
+          </a:p>
+          <a:p>
+            <a:pPr marL="0" marR="0" indent="0" algn="l" defTabSz="914400" rtl="0" eaLnBrk="1" fontAlgn="auto" latinLnBrk="0" hangingPunct="1">
+              <a:lnSpc>
+                <a:spcPct val="100000"/>
+              </a:lnSpc>
+              <a:spcBef>
+                <a:spcPts val="0"/>
+              </a:spcBef>
+              <a:spcAft>
+                <a:spcPts val="0"/>
+              </a:spcAft>
+              <a:buClrTx/>
+              <a:buSzTx/>
+              <a:buFontTx/>
+              <a:buNone/>
+              <a:tabLst/>
+              <a:defRPr/>
+            </a:pPr>
+            <a:r>
+              <a:rPr lang="de-DE" baseline="0" dirty="0" err="1" smtClean="0"/>
+              <a:t>We</a:t>
+            </a:r>
+            <a:r>
+              <a:rPr lang="de-DE" baseline="0" dirty="0" smtClean="0"/>
+              <a:t> </a:t>
+            </a:r>
+            <a:r>
+              <a:rPr lang="de-DE" baseline="0" dirty="0" err="1" smtClean="0"/>
+              <a:t>worked</a:t>
+            </a:r>
+            <a:r>
+              <a:rPr lang="de-DE" baseline="0" dirty="0" smtClean="0"/>
+              <a:t> </a:t>
+            </a:r>
+            <a:r>
+              <a:rPr lang="de-DE" baseline="0" dirty="0" err="1" smtClean="0"/>
+              <a:t>more</a:t>
+            </a:r>
+            <a:r>
+              <a:rPr lang="de-DE" baseline="0" dirty="0" smtClean="0"/>
+              <a:t> on </a:t>
+            </a:r>
+            <a:r>
+              <a:rPr lang="de-DE" baseline="0" dirty="0" err="1" smtClean="0"/>
+              <a:t>the</a:t>
+            </a:r>
+            <a:r>
+              <a:rPr lang="de-DE" baseline="0" dirty="0" smtClean="0"/>
+              <a:t> </a:t>
+            </a:r>
+            <a:r>
+              <a:rPr lang="de-DE" baseline="0" dirty="0" err="1" smtClean="0"/>
+              <a:t>project</a:t>
+            </a:r>
+            <a:r>
+              <a:rPr lang="de-DE" baseline="0" dirty="0" smtClean="0"/>
+              <a:t> </a:t>
+            </a:r>
+            <a:r>
+              <a:rPr lang="de-DE" baseline="0" dirty="0" err="1" smtClean="0"/>
+              <a:t>as</a:t>
+            </a:r>
+            <a:r>
+              <a:rPr lang="de-DE" baseline="0" dirty="0" smtClean="0"/>
+              <a:t> </a:t>
+            </a:r>
+            <a:r>
+              <a:rPr lang="de-DE" baseline="0" dirty="0" err="1" smtClean="0"/>
+              <a:t>intended</a:t>
+            </a:r>
+            <a:r>
+              <a:rPr lang="de-DE" baseline="0" dirty="0" smtClean="0"/>
+              <a:t>, but </a:t>
+            </a:r>
+            <a:r>
+              <a:rPr lang="de-DE" baseline="0" dirty="0" err="1" smtClean="0"/>
+              <a:t>that</a:t>
+            </a:r>
+            <a:r>
+              <a:rPr lang="de-DE" baseline="0" dirty="0" smtClean="0"/>
+              <a:t> was not </a:t>
+            </a:r>
+            <a:r>
+              <a:rPr lang="de-DE" baseline="0" dirty="0" err="1" smtClean="0"/>
+              <a:t>bad</a:t>
+            </a:r>
+            <a:r>
+              <a:rPr lang="de-DE" baseline="0" dirty="0" smtClean="0"/>
+              <a:t> </a:t>
+            </a:r>
+            <a:r>
+              <a:rPr lang="de-DE" baseline="0" dirty="0" err="1" smtClean="0"/>
+              <a:t>because</a:t>
+            </a:r>
+            <a:r>
+              <a:rPr lang="de-DE" baseline="0" dirty="0" smtClean="0"/>
+              <a:t> </a:t>
+            </a:r>
+            <a:r>
+              <a:rPr lang="de-DE" baseline="0" dirty="0" err="1" smtClean="0"/>
+              <a:t>it</a:t>
+            </a:r>
+            <a:r>
+              <a:rPr lang="de-DE" baseline="0" dirty="0" smtClean="0"/>
+              <a:t> was </a:t>
+            </a:r>
+            <a:r>
+              <a:rPr lang="de-DE" baseline="0" dirty="0" err="1" smtClean="0"/>
+              <a:t>fun</a:t>
+            </a:r>
+            <a:r>
+              <a:rPr lang="de-DE" baseline="0" dirty="0" smtClean="0"/>
+              <a:t>.</a:t>
+            </a:r>
+          </a:p>
+          <a:p>
+            <a:pPr marL="0" marR="0" indent="0" algn="l" defTabSz="914400" rtl="0" eaLnBrk="1" fontAlgn="auto" latinLnBrk="0" hangingPunct="1">
+              <a:lnSpc>
+                <a:spcPct val="100000"/>
+              </a:lnSpc>
+              <a:spcBef>
+                <a:spcPts val="0"/>
+              </a:spcBef>
+              <a:spcAft>
+                <a:spcPts val="0"/>
+              </a:spcAft>
+              <a:buClrTx/>
+              <a:buSzTx/>
+              <a:buFontTx/>
+              <a:buNone/>
+              <a:tabLst/>
+              <a:defRPr/>
+            </a:pPr>
+            <a:r>
+              <a:rPr lang="de-DE" baseline="0" dirty="0" err="1" smtClean="0"/>
+              <a:t>We</a:t>
+            </a:r>
+            <a:r>
+              <a:rPr lang="de-DE" baseline="0" dirty="0" smtClean="0"/>
+              <a:t> </a:t>
+            </a:r>
+            <a:r>
+              <a:rPr lang="de-DE" baseline="0" dirty="0" err="1" smtClean="0"/>
+              <a:t>splitted</a:t>
+            </a:r>
+            <a:r>
+              <a:rPr lang="de-DE" baseline="0" dirty="0" smtClean="0"/>
+              <a:t> </a:t>
+            </a:r>
+            <a:r>
+              <a:rPr lang="de-DE" baseline="0" dirty="0" err="1" smtClean="0"/>
+              <a:t>the</a:t>
+            </a:r>
+            <a:r>
+              <a:rPr lang="de-DE" baseline="0" dirty="0" smtClean="0"/>
+              <a:t> </a:t>
+            </a:r>
+            <a:r>
+              <a:rPr lang="de-DE" baseline="0" dirty="0" err="1" smtClean="0"/>
+              <a:t>workload</a:t>
+            </a:r>
+            <a:r>
+              <a:rPr lang="de-DE" baseline="0" dirty="0" smtClean="0"/>
+              <a:t> </a:t>
+            </a:r>
+            <a:r>
+              <a:rPr lang="de-DE" baseline="0" dirty="0" err="1" smtClean="0"/>
+              <a:t>and</a:t>
+            </a:r>
+            <a:r>
+              <a:rPr lang="de-DE" baseline="0" dirty="0" smtClean="0"/>
+              <a:t> </a:t>
+            </a:r>
+            <a:r>
+              <a:rPr lang="de-DE" baseline="0" dirty="0" err="1" smtClean="0"/>
+              <a:t>worked</a:t>
+            </a:r>
+            <a:r>
+              <a:rPr lang="de-DE" baseline="0" dirty="0" smtClean="0"/>
+              <a:t> </a:t>
+            </a:r>
+            <a:r>
+              <a:rPr lang="de-DE" baseline="0" dirty="0" err="1" smtClean="0"/>
+              <a:t>both</a:t>
+            </a:r>
+            <a:r>
+              <a:rPr lang="de-DE" baseline="0" dirty="0" smtClean="0"/>
+              <a:t> on </a:t>
+            </a:r>
+            <a:r>
+              <a:rPr lang="de-DE" baseline="0" dirty="0" err="1" smtClean="0"/>
+              <a:t>the</a:t>
+            </a:r>
+            <a:r>
+              <a:rPr lang="de-DE" baseline="0" dirty="0" smtClean="0"/>
+              <a:t> </a:t>
+            </a:r>
+            <a:r>
+              <a:rPr lang="de-DE" baseline="0" dirty="0" err="1" smtClean="0"/>
+              <a:t>project</a:t>
+            </a:r>
+            <a:r>
+              <a:rPr lang="de-DE" baseline="0" dirty="0" smtClean="0"/>
+              <a:t>, but Andreas </a:t>
+            </a:r>
+            <a:r>
+              <a:rPr lang="de-DE" baseline="0" dirty="0" err="1" smtClean="0"/>
+              <a:t>did</a:t>
+            </a:r>
+            <a:r>
+              <a:rPr lang="de-DE" baseline="0" dirty="0" smtClean="0"/>
+              <a:t> </a:t>
+            </a:r>
+            <a:r>
+              <a:rPr lang="de-DE" baseline="0" dirty="0" err="1" smtClean="0"/>
+              <a:t>more</a:t>
+            </a:r>
+            <a:r>
+              <a:rPr lang="de-DE" baseline="0" dirty="0" smtClean="0"/>
+              <a:t> </a:t>
+            </a:r>
+            <a:r>
+              <a:rPr lang="de-DE" baseline="0" dirty="0" err="1" smtClean="0"/>
+              <a:t>of</a:t>
+            </a:r>
+            <a:r>
+              <a:rPr lang="de-DE" baseline="0" dirty="0" smtClean="0"/>
+              <a:t> </a:t>
+            </a:r>
+            <a:r>
+              <a:rPr lang="de-DE" baseline="0" dirty="0" err="1" smtClean="0"/>
+              <a:t>the</a:t>
+            </a:r>
+            <a:r>
+              <a:rPr lang="de-DE" baseline="0" dirty="0" smtClean="0"/>
+              <a:t> </a:t>
+            </a:r>
+            <a:r>
+              <a:rPr lang="de-DE" baseline="0" dirty="0" err="1" smtClean="0"/>
+              <a:t>App</a:t>
+            </a:r>
+            <a:r>
+              <a:rPr lang="de-DE" baseline="0" dirty="0" smtClean="0"/>
+              <a:t> in </a:t>
+            </a:r>
+            <a:r>
+              <a:rPr lang="de-DE" baseline="0" dirty="0" err="1" smtClean="0"/>
+              <a:t>general</a:t>
+            </a:r>
+            <a:r>
+              <a:rPr lang="de-DE" baseline="0" dirty="0" smtClean="0"/>
+              <a:t> </a:t>
+            </a:r>
+            <a:r>
+              <a:rPr lang="de-DE" baseline="0" dirty="0" err="1" smtClean="0"/>
+              <a:t>and</a:t>
+            </a:r>
+            <a:r>
+              <a:rPr lang="de-DE" baseline="0" dirty="0" smtClean="0"/>
+              <a:t> I </a:t>
+            </a:r>
+            <a:r>
+              <a:rPr lang="de-DE" baseline="0" dirty="0" err="1" smtClean="0"/>
+              <a:t>did</a:t>
+            </a:r>
+            <a:r>
+              <a:rPr lang="de-DE" baseline="0" dirty="0" smtClean="0"/>
+              <a:t> </a:t>
+            </a:r>
+            <a:r>
+              <a:rPr lang="de-DE" baseline="0" dirty="0" err="1" smtClean="0"/>
+              <a:t>more</a:t>
+            </a:r>
+            <a:r>
+              <a:rPr lang="de-DE" baseline="0" dirty="0" smtClean="0"/>
+              <a:t> on </a:t>
+            </a:r>
+            <a:r>
+              <a:rPr lang="de-DE" baseline="0" dirty="0" err="1" smtClean="0"/>
+              <a:t>the</a:t>
+            </a:r>
+            <a:r>
+              <a:rPr lang="de-DE" baseline="0" dirty="0" smtClean="0"/>
+              <a:t> backend </a:t>
+            </a:r>
+            <a:r>
+              <a:rPr lang="de-DE" baseline="0" dirty="0" err="1" smtClean="0"/>
+              <a:t>which</a:t>
+            </a:r>
+            <a:r>
+              <a:rPr lang="de-DE" baseline="0" dirty="0" smtClean="0"/>
+              <a:t> </a:t>
+            </a:r>
+            <a:r>
+              <a:rPr lang="de-DE" baseline="0" dirty="0" err="1" smtClean="0"/>
+              <a:t>reads</a:t>
+            </a:r>
+            <a:r>
+              <a:rPr lang="de-DE" baseline="0" dirty="0" smtClean="0"/>
+              <a:t> </a:t>
+            </a:r>
+            <a:r>
+              <a:rPr lang="de-DE" baseline="0" dirty="0" err="1" smtClean="0"/>
+              <a:t>the</a:t>
+            </a:r>
+            <a:r>
+              <a:rPr lang="de-DE" baseline="0" dirty="0" smtClean="0"/>
+              <a:t> </a:t>
+            </a:r>
+            <a:r>
+              <a:rPr lang="de-DE" baseline="0" dirty="0" err="1" smtClean="0"/>
+              <a:t>data</a:t>
+            </a:r>
+            <a:r>
+              <a:rPr lang="de-DE" baseline="0" dirty="0" smtClean="0"/>
+              <a:t> </a:t>
+            </a:r>
+            <a:r>
+              <a:rPr lang="de-DE" baseline="0" dirty="0" err="1" smtClean="0"/>
+              <a:t>from</a:t>
+            </a:r>
+            <a:r>
+              <a:rPr lang="de-DE" baseline="0" dirty="0" smtClean="0"/>
+              <a:t> </a:t>
+            </a:r>
+            <a:r>
+              <a:rPr lang="de-DE" baseline="0" dirty="0" err="1" smtClean="0"/>
+              <a:t>the</a:t>
+            </a:r>
+            <a:r>
+              <a:rPr lang="de-DE" baseline="0" dirty="0" smtClean="0"/>
+              <a:t> terminal.</a:t>
+            </a:r>
+          </a:p>
+          <a:p>
+            <a:pPr marL="0" marR="0" indent="0" algn="l" defTabSz="914400" rtl="0" eaLnBrk="1" fontAlgn="auto" latinLnBrk="0" hangingPunct="1">
+              <a:lnSpc>
+                <a:spcPct val="100000"/>
+              </a:lnSpc>
+              <a:spcBef>
+                <a:spcPts val="0"/>
+              </a:spcBef>
+              <a:spcAft>
+                <a:spcPts val="0"/>
+              </a:spcAft>
+              <a:buClrTx/>
+              <a:buSzTx/>
+              <a:buFontTx/>
+              <a:buNone/>
+              <a:tabLst/>
+              <a:defRPr/>
+            </a:pPr>
+            <a:endParaRPr lang="de-DE" baseline="0" dirty="0" smtClean="0"/>
+          </a:p>
+          <a:p>
+            <a:pPr marL="0" marR="0" indent="0" algn="l" defTabSz="914400" rtl="0" eaLnBrk="1" fontAlgn="auto" latinLnBrk="0" hangingPunct="1">
+              <a:lnSpc>
+                <a:spcPct val="100000"/>
+              </a:lnSpc>
+              <a:spcBef>
+                <a:spcPts val="0"/>
+              </a:spcBef>
+              <a:spcAft>
+                <a:spcPts val="0"/>
+              </a:spcAft>
+              <a:buClrTx/>
+              <a:buSzTx/>
+              <a:buFontTx/>
+              <a:buNone/>
+              <a:tabLst/>
+              <a:defRPr/>
+            </a:pPr>
+            <a:r>
+              <a:rPr lang="de-DE" baseline="0" dirty="0" err="1" smtClean="0"/>
+              <a:t>If</a:t>
+            </a:r>
+            <a:r>
+              <a:rPr lang="de-DE" baseline="0" dirty="0" smtClean="0"/>
+              <a:t> </a:t>
+            </a:r>
+            <a:r>
+              <a:rPr lang="de-DE" baseline="0" dirty="0" err="1" smtClean="0"/>
+              <a:t>the</a:t>
+            </a:r>
+            <a:r>
+              <a:rPr lang="de-DE" baseline="0" dirty="0" smtClean="0"/>
+              <a:t> </a:t>
+            </a:r>
+            <a:r>
+              <a:rPr lang="de-DE" baseline="0" dirty="0" err="1" smtClean="0"/>
+              <a:t>data</a:t>
+            </a:r>
+            <a:r>
+              <a:rPr lang="de-DE" baseline="0" dirty="0" smtClean="0"/>
+              <a:t> </a:t>
+            </a:r>
+            <a:r>
+              <a:rPr lang="de-DE" baseline="0" dirty="0" err="1" smtClean="0"/>
+              <a:t>extracted</a:t>
+            </a:r>
+            <a:r>
+              <a:rPr lang="de-DE" baseline="0" dirty="0" smtClean="0"/>
+              <a:t> </a:t>
+            </a:r>
+            <a:r>
+              <a:rPr lang="de-DE" baseline="0" dirty="0" err="1" smtClean="0"/>
+              <a:t>from</a:t>
+            </a:r>
+            <a:r>
+              <a:rPr lang="de-DE" baseline="0" dirty="0" smtClean="0"/>
+              <a:t> </a:t>
+            </a:r>
+            <a:r>
+              <a:rPr lang="de-DE" baseline="0" dirty="0" err="1" smtClean="0"/>
+              <a:t>the</a:t>
+            </a:r>
+            <a:r>
+              <a:rPr lang="de-DE" baseline="0" dirty="0" smtClean="0"/>
+              <a:t> terminal </a:t>
+            </a:r>
+            <a:r>
+              <a:rPr lang="de-DE" baseline="0" dirty="0" err="1" smtClean="0"/>
+              <a:t>would</a:t>
+            </a:r>
+            <a:r>
+              <a:rPr lang="de-DE" baseline="0" dirty="0" smtClean="0"/>
+              <a:t> </a:t>
+            </a:r>
+            <a:r>
+              <a:rPr lang="de-DE" baseline="0" dirty="0" err="1" smtClean="0"/>
+              <a:t>be</a:t>
+            </a:r>
+            <a:r>
+              <a:rPr lang="de-DE" baseline="0" dirty="0" smtClean="0"/>
+              <a:t> </a:t>
+            </a:r>
+            <a:r>
+              <a:rPr lang="de-DE" baseline="0" dirty="0" err="1" smtClean="0"/>
+              <a:t>less</a:t>
+            </a:r>
+            <a:r>
+              <a:rPr lang="de-DE" baseline="0" dirty="0" smtClean="0"/>
+              <a:t> </a:t>
+            </a:r>
+            <a:r>
+              <a:rPr lang="de-DE" baseline="0" dirty="0" err="1" smtClean="0"/>
+              <a:t>faulty</a:t>
+            </a:r>
+            <a:r>
+              <a:rPr lang="de-DE" baseline="0" dirty="0" smtClean="0"/>
+              <a:t> </a:t>
+            </a:r>
+            <a:r>
+              <a:rPr lang="de-DE" baseline="0" dirty="0" err="1" smtClean="0"/>
+              <a:t>and</a:t>
+            </a:r>
+            <a:r>
+              <a:rPr lang="de-DE" baseline="0" dirty="0" smtClean="0"/>
+              <a:t> </a:t>
+            </a:r>
+            <a:r>
+              <a:rPr lang="de-DE" baseline="0" dirty="0" err="1" smtClean="0"/>
+              <a:t>better</a:t>
+            </a:r>
+            <a:r>
+              <a:rPr lang="de-DE" baseline="0" dirty="0" smtClean="0"/>
+              <a:t> </a:t>
+            </a:r>
+            <a:r>
+              <a:rPr lang="de-DE" baseline="0" dirty="0" err="1" smtClean="0"/>
+              <a:t>structured</a:t>
+            </a:r>
+            <a:r>
+              <a:rPr lang="de-DE" baseline="0" dirty="0" smtClean="0"/>
+              <a:t>, </a:t>
+            </a:r>
+            <a:r>
+              <a:rPr lang="de-DE" baseline="0" dirty="0" err="1" smtClean="0"/>
+              <a:t>we</a:t>
+            </a:r>
+            <a:r>
+              <a:rPr lang="de-DE" baseline="0" dirty="0" smtClean="0"/>
+              <a:t> </a:t>
+            </a:r>
+            <a:r>
+              <a:rPr lang="de-DE" baseline="0" dirty="0" err="1" smtClean="0"/>
+              <a:t>could</a:t>
+            </a:r>
+            <a:r>
+              <a:rPr lang="de-DE" baseline="0" dirty="0" smtClean="0"/>
+              <a:t> </a:t>
+            </a:r>
+            <a:r>
+              <a:rPr lang="de-DE" baseline="0" dirty="0" err="1" smtClean="0"/>
+              <a:t>add</a:t>
+            </a:r>
+            <a:r>
+              <a:rPr lang="de-DE" baseline="0" dirty="0" smtClean="0"/>
+              <a:t> </a:t>
+            </a:r>
+            <a:r>
+              <a:rPr lang="de-DE" baseline="0" dirty="0" err="1" smtClean="0"/>
+              <a:t>some</a:t>
+            </a:r>
+            <a:r>
+              <a:rPr lang="de-DE" baseline="0" dirty="0" smtClean="0"/>
+              <a:t> </a:t>
+            </a:r>
+            <a:r>
+              <a:rPr lang="de-DE" baseline="0" dirty="0" err="1" smtClean="0"/>
+              <a:t>interesting</a:t>
+            </a:r>
+            <a:r>
+              <a:rPr lang="de-DE" baseline="0" dirty="0" smtClean="0"/>
+              <a:t> </a:t>
+            </a:r>
+            <a:r>
+              <a:rPr lang="de-DE" baseline="0" dirty="0" err="1" smtClean="0"/>
+              <a:t>features</a:t>
+            </a:r>
+            <a:r>
+              <a:rPr lang="de-DE" baseline="0" dirty="0" smtClean="0"/>
+              <a:t>!</a:t>
+            </a:r>
+          </a:p>
+          <a:p>
+            <a:pPr marL="0" marR="0" indent="0" algn="l" defTabSz="914400" rtl="0" eaLnBrk="1" fontAlgn="auto" latinLnBrk="0" hangingPunct="1">
+              <a:lnSpc>
+                <a:spcPct val="100000"/>
+              </a:lnSpc>
+              <a:spcBef>
+                <a:spcPts val="0"/>
+              </a:spcBef>
+              <a:spcAft>
+                <a:spcPts val="0"/>
+              </a:spcAft>
+              <a:buClrTx/>
+              <a:buSzTx/>
+              <a:buFontTx/>
+              <a:buNone/>
+              <a:tabLst/>
+              <a:defRPr/>
+            </a:pPr>
+            <a:r>
+              <a:rPr lang="de-DE" baseline="0" dirty="0" smtClean="0"/>
+              <a:t>(</a:t>
+            </a:r>
+            <a:r>
+              <a:rPr lang="de-DE" baseline="0" dirty="0" err="1" smtClean="0"/>
+              <a:t>Wrong</a:t>
+            </a:r>
+            <a:r>
+              <a:rPr lang="de-DE" baseline="0" dirty="0" smtClean="0"/>
+              <a:t> grade </a:t>
+            </a:r>
+            <a:r>
+              <a:rPr lang="de-DE" baseline="0" dirty="0" err="1" smtClean="0"/>
+              <a:t>names</a:t>
+            </a:r>
+            <a:r>
+              <a:rPr lang="de-DE" baseline="0" dirty="0" smtClean="0"/>
+              <a:t>, double </a:t>
+            </a:r>
+            <a:r>
+              <a:rPr lang="de-DE" baseline="0" dirty="0" err="1" smtClean="0"/>
+              <a:t>entries</a:t>
+            </a:r>
+            <a:r>
+              <a:rPr lang="de-DE" baseline="0" dirty="0" smtClean="0"/>
+              <a:t>, </a:t>
+            </a:r>
+            <a:r>
+              <a:rPr lang="de-DE" baseline="0" dirty="0" err="1" smtClean="0"/>
+              <a:t>and</a:t>
+            </a:r>
+            <a:r>
+              <a:rPr lang="de-DE" baseline="0" dirty="0" smtClean="0"/>
+              <a:t> </a:t>
+            </a:r>
+            <a:r>
+              <a:rPr lang="de-DE" baseline="0" dirty="0" err="1" smtClean="0"/>
+              <a:t>no</a:t>
+            </a:r>
+            <a:r>
+              <a:rPr lang="de-DE" baseline="0" dirty="0" smtClean="0"/>
+              <a:t> link </a:t>
+            </a:r>
+            <a:r>
+              <a:rPr lang="de-DE" baseline="0" dirty="0" err="1" smtClean="0"/>
+              <a:t>between</a:t>
+            </a:r>
+            <a:r>
+              <a:rPr lang="de-DE" baseline="0" dirty="0" smtClean="0"/>
+              <a:t> grades </a:t>
+            </a:r>
+            <a:r>
+              <a:rPr lang="de-DE" baseline="0" dirty="0" err="1" smtClean="0"/>
+              <a:t>and</a:t>
+            </a:r>
+            <a:r>
+              <a:rPr lang="de-DE" baseline="0" dirty="0" smtClean="0"/>
+              <a:t> </a:t>
+            </a:r>
+            <a:r>
+              <a:rPr lang="de-DE" baseline="0" dirty="0" err="1" smtClean="0"/>
+              <a:t>modules</a:t>
+            </a:r>
+            <a:r>
+              <a:rPr lang="de-DE" baseline="0" dirty="0" smtClean="0"/>
+              <a:t>.)</a:t>
+            </a:r>
+          </a:p>
+          <a:p>
+            <a:pPr marL="0" marR="0" indent="0" algn="l" defTabSz="914400" rtl="0" eaLnBrk="1" fontAlgn="auto" latinLnBrk="0" hangingPunct="1">
+              <a:lnSpc>
+                <a:spcPct val="100000"/>
+              </a:lnSpc>
+              <a:spcBef>
+                <a:spcPts val="0"/>
+              </a:spcBef>
+              <a:spcAft>
+                <a:spcPts val="0"/>
+              </a:spcAft>
+              <a:buClrTx/>
+              <a:buSzTx/>
+              <a:buFontTx/>
+              <a:buNone/>
+              <a:tabLst/>
+              <a:defRPr/>
+            </a:pPr>
+            <a:r>
+              <a:rPr lang="de-DE" baseline="0" dirty="0" err="1" smtClean="0"/>
+              <a:t>Example</a:t>
+            </a:r>
+            <a:r>
+              <a:rPr lang="de-DE" baseline="0" dirty="0" smtClean="0"/>
+              <a:t>: </a:t>
+            </a:r>
+            <a:r>
+              <a:rPr lang="de-DE" baseline="0" dirty="0" err="1" smtClean="0"/>
+              <a:t>Average</a:t>
+            </a:r>
+            <a:r>
+              <a:rPr lang="de-DE" baseline="0" dirty="0" smtClean="0"/>
+              <a:t> grade </a:t>
+            </a:r>
+            <a:r>
+              <a:rPr lang="de-DE" baseline="0" dirty="0" err="1" smtClean="0"/>
+              <a:t>calculated</a:t>
+            </a:r>
+            <a:r>
+              <a:rPr lang="de-DE" baseline="0" dirty="0" smtClean="0"/>
+              <a:t> </a:t>
+            </a:r>
+            <a:r>
+              <a:rPr lang="de-DE" baseline="0" dirty="0" err="1" smtClean="0"/>
+              <a:t>with</a:t>
+            </a:r>
+            <a:r>
+              <a:rPr lang="de-DE" baseline="0" dirty="0" smtClean="0"/>
+              <a:t> </a:t>
+            </a:r>
+            <a:r>
+              <a:rPr lang="de-DE" baseline="0" dirty="0" err="1" smtClean="0"/>
+              <a:t>the</a:t>
+            </a:r>
+            <a:r>
+              <a:rPr lang="de-DE" baseline="0" dirty="0" smtClean="0"/>
+              <a:t> ECTS </a:t>
+            </a:r>
+            <a:r>
+              <a:rPr lang="de-DE" baseline="0" dirty="0" err="1" smtClean="0"/>
+              <a:t>points</a:t>
+            </a:r>
+            <a:r>
+              <a:rPr lang="de-DE" baseline="0" dirty="0" smtClean="0"/>
+              <a:t> in mind.</a:t>
+            </a:r>
+            <a:endParaRPr lang="de-DE" dirty="0" smtClean="0"/>
+          </a:p>
         </p:txBody>
       </p:sp>
       <p:sp>
@@ -1258,7 +4215,7 @@
               <a:pPr/>
               <a:t>13</a:t>
             </a:fld>
-            <a:endParaRPr lang="de-DE"/>
+            <a:endParaRPr lang="de-DE" dirty="0"/>
           </a:p>
         </p:txBody>
       </p:sp>
@@ -2618,6 +5575,367 @@
             <a:endParaRPr lang="de-DE" dirty="0" smtClean="0"/>
           </a:p>
           <a:p>
+            <a:r>
+              <a:rPr lang="de-DE" dirty="0" smtClean="0"/>
+              <a:t>The </a:t>
+            </a:r>
+            <a:r>
+              <a:rPr lang="de-DE" dirty="0" err="1" smtClean="0"/>
+              <a:t>main</a:t>
+            </a:r>
+            <a:r>
+              <a:rPr lang="de-DE" dirty="0" smtClean="0"/>
+              <a:t> </a:t>
+            </a:r>
+            <a:r>
+              <a:rPr lang="de-DE" dirty="0" err="1" smtClean="0"/>
+              <a:t>purpose</a:t>
+            </a:r>
+            <a:r>
+              <a:rPr lang="de-DE" dirty="0" smtClean="0"/>
+              <a:t> </a:t>
+            </a:r>
+            <a:r>
+              <a:rPr lang="de-DE" dirty="0" err="1" smtClean="0"/>
+              <a:t>of</a:t>
+            </a:r>
+            <a:r>
+              <a:rPr lang="de-DE" dirty="0" smtClean="0"/>
+              <a:t> </a:t>
+            </a:r>
+            <a:r>
+              <a:rPr lang="de-DE" dirty="0" err="1" smtClean="0"/>
+              <a:t>our</a:t>
+            </a:r>
+            <a:r>
+              <a:rPr lang="de-DE" dirty="0" smtClean="0"/>
+              <a:t> </a:t>
+            </a:r>
+            <a:r>
+              <a:rPr lang="de-DE" dirty="0" err="1" smtClean="0"/>
+              <a:t>app</a:t>
+            </a:r>
+            <a:r>
+              <a:rPr lang="de-DE" baseline="0" dirty="0" smtClean="0"/>
+              <a:t> </a:t>
+            </a:r>
+            <a:r>
+              <a:rPr lang="de-DE" baseline="0" dirty="0" err="1" smtClean="0"/>
+              <a:t>is</a:t>
+            </a:r>
+            <a:r>
+              <a:rPr lang="de-DE" baseline="0" dirty="0" smtClean="0"/>
+              <a:t> </a:t>
+            </a:r>
+            <a:r>
+              <a:rPr lang="de-DE" baseline="0" dirty="0" err="1" smtClean="0"/>
+              <a:t>to</a:t>
+            </a:r>
+            <a:r>
+              <a:rPr lang="de-DE" baseline="0" dirty="0" smtClean="0"/>
+              <a:t> </a:t>
+            </a:r>
+            <a:r>
+              <a:rPr lang="de-DE" baseline="0" dirty="0" err="1" smtClean="0"/>
+              <a:t>display</a:t>
+            </a:r>
+            <a:r>
+              <a:rPr lang="de-DE" baseline="0" dirty="0" smtClean="0"/>
+              <a:t> </a:t>
+            </a:r>
+            <a:r>
+              <a:rPr lang="de-DE" baseline="0" dirty="0" err="1" smtClean="0"/>
+              <a:t>the</a:t>
+            </a:r>
+            <a:r>
+              <a:rPr lang="de-DE" baseline="0" dirty="0" smtClean="0"/>
+              <a:t> </a:t>
+            </a:r>
+            <a:r>
+              <a:rPr lang="de-DE" baseline="0" dirty="0" err="1" smtClean="0"/>
+              <a:t>information</a:t>
+            </a:r>
+            <a:r>
+              <a:rPr lang="de-DE" baseline="0" dirty="0" smtClean="0"/>
+              <a:t> </a:t>
+            </a:r>
+            <a:r>
+              <a:rPr lang="de-DE" baseline="0" dirty="0" err="1" smtClean="0"/>
+              <a:t>from</a:t>
+            </a:r>
+            <a:r>
+              <a:rPr lang="de-DE" baseline="0" dirty="0" smtClean="0"/>
+              <a:t> </a:t>
+            </a:r>
+            <a:r>
+              <a:rPr lang="de-DE" baseline="0" dirty="0" err="1" smtClean="0"/>
+              <a:t>the</a:t>
+            </a:r>
+            <a:r>
+              <a:rPr lang="de-DE" baseline="0" dirty="0" smtClean="0"/>
+              <a:t> </a:t>
+            </a:r>
+            <a:r>
+              <a:rPr lang="de-DE" baseline="0" dirty="0" err="1" smtClean="0"/>
+              <a:t>student</a:t>
+            </a:r>
+            <a:r>
+              <a:rPr lang="de-DE" baseline="0" dirty="0" smtClean="0"/>
+              <a:t> terminal.</a:t>
+            </a:r>
+          </a:p>
+          <a:p>
+            <a:r>
+              <a:rPr lang="de-DE" baseline="0" dirty="0" smtClean="0"/>
+              <a:t>But </a:t>
+            </a:r>
+            <a:r>
+              <a:rPr lang="de-DE" baseline="0" dirty="0" err="1" smtClean="0"/>
+              <a:t>how</a:t>
+            </a:r>
+            <a:r>
+              <a:rPr lang="de-DE" baseline="0" dirty="0" smtClean="0"/>
+              <a:t> do </a:t>
+            </a:r>
+            <a:r>
+              <a:rPr lang="de-DE" baseline="0" dirty="0" err="1" smtClean="0"/>
+              <a:t>we</a:t>
+            </a:r>
+            <a:r>
+              <a:rPr lang="de-DE" baseline="0" dirty="0" smtClean="0"/>
+              <a:t> </a:t>
+            </a:r>
+            <a:r>
+              <a:rPr lang="de-DE" baseline="0" dirty="0" err="1" smtClean="0"/>
+              <a:t>get</a:t>
+            </a:r>
+            <a:r>
+              <a:rPr lang="de-DE" baseline="0" dirty="0" smtClean="0"/>
+              <a:t> </a:t>
+            </a:r>
+            <a:r>
+              <a:rPr lang="de-DE" baseline="0" dirty="0" err="1" smtClean="0"/>
+              <a:t>this</a:t>
+            </a:r>
+            <a:r>
+              <a:rPr lang="de-DE" baseline="0" dirty="0" smtClean="0"/>
+              <a:t> </a:t>
+            </a:r>
+            <a:r>
+              <a:rPr lang="de-DE" baseline="0" dirty="0" err="1" smtClean="0"/>
+              <a:t>information</a:t>
+            </a:r>
+            <a:r>
+              <a:rPr lang="de-DE" baseline="0" dirty="0" smtClean="0"/>
+              <a:t> </a:t>
+            </a:r>
+            <a:r>
+              <a:rPr lang="de-DE" baseline="0" dirty="0" err="1" smtClean="0"/>
+              <a:t>without</a:t>
+            </a:r>
+            <a:r>
+              <a:rPr lang="de-DE" baseline="0" dirty="0" smtClean="0"/>
+              <a:t> </a:t>
+            </a:r>
+            <a:r>
+              <a:rPr lang="de-DE" baseline="0" dirty="0" err="1" smtClean="0"/>
+              <a:t>any</a:t>
+            </a:r>
+            <a:r>
+              <a:rPr lang="de-DE" baseline="0" dirty="0" smtClean="0"/>
+              <a:t> </a:t>
+            </a:r>
+            <a:r>
+              <a:rPr lang="de-DE" baseline="0" dirty="0" err="1" smtClean="0"/>
+              <a:t>public</a:t>
+            </a:r>
+            <a:r>
+              <a:rPr lang="de-DE" baseline="0" dirty="0" smtClean="0"/>
+              <a:t> API </a:t>
+            </a:r>
+            <a:r>
+              <a:rPr lang="de-DE" baseline="0" dirty="0" err="1" smtClean="0"/>
+              <a:t>or</a:t>
+            </a:r>
+            <a:r>
+              <a:rPr lang="de-DE" baseline="0" dirty="0" smtClean="0"/>
+              <a:t> </a:t>
+            </a:r>
+            <a:r>
+              <a:rPr lang="de-DE" baseline="0" dirty="0" err="1" smtClean="0"/>
+              <a:t>interface</a:t>
+            </a:r>
+            <a:r>
+              <a:rPr lang="de-DE" baseline="0" dirty="0" smtClean="0"/>
+              <a:t>?</a:t>
+            </a:r>
+          </a:p>
+          <a:p>
+            <a:endParaRPr lang="de-DE" baseline="0" dirty="0" smtClean="0"/>
+          </a:p>
+          <a:p>
+            <a:r>
+              <a:rPr lang="de-DE" baseline="0" dirty="0" err="1" smtClean="0"/>
+              <a:t>Since</a:t>
+            </a:r>
+            <a:r>
+              <a:rPr lang="de-DE" baseline="0" dirty="0" smtClean="0"/>
+              <a:t> </a:t>
+            </a:r>
+            <a:r>
+              <a:rPr lang="de-DE" baseline="0" dirty="0" err="1" smtClean="0"/>
+              <a:t>the</a:t>
+            </a:r>
+            <a:r>
+              <a:rPr lang="de-DE" baseline="0" dirty="0" smtClean="0"/>
+              <a:t> </a:t>
+            </a:r>
+            <a:r>
+              <a:rPr lang="de-DE" baseline="0" dirty="0" err="1" smtClean="0"/>
+              <a:t>data</a:t>
+            </a:r>
+            <a:r>
+              <a:rPr lang="de-DE" baseline="0" dirty="0" smtClean="0"/>
+              <a:t> </a:t>
+            </a:r>
+            <a:r>
+              <a:rPr lang="de-DE" baseline="0" dirty="0" err="1" smtClean="0"/>
+              <a:t>is</a:t>
+            </a:r>
+            <a:r>
+              <a:rPr lang="de-DE" baseline="0" dirty="0" smtClean="0"/>
+              <a:t> </a:t>
+            </a:r>
+            <a:r>
+              <a:rPr lang="de-DE" baseline="0" dirty="0" err="1" smtClean="0"/>
+              <a:t>normally</a:t>
+            </a:r>
+            <a:r>
+              <a:rPr lang="de-DE" baseline="0" dirty="0" smtClean="0"/>
+              <a:t> </a:t>
+            </a:r>
+            <a:r>
+              <a:rPr lang="de-DE" baseline="0" dirty="0" err="1" smtClean="0"/>
+              <a:t>accessed</a:t>
+            </a:r>
+            <a:r>
+              <a:rPr lang="de-DE" baseline="0" dirty="0" smtClean="0"/>
+              <a:t> </a:t>
+            </a:r>
+            <a:r>
+              <a:rPr lang="de-DE" baseline="0" dirty="0" err="1" smtClean="0"/>
+              <a:t>over</a:t>
+            </a:r>
+            <a:r>
+              <a:rPr lang="de-DE" baseline="0" dirty="0" smtClean="0"/>
+              <a:t> a </a:t>
+            </a:r>
+            <a:r>
+              <a:rPr lang="de-DE" baseline="0" dirty="0" err="1" smtClean="0"/>
+              <a:t>website</a:t>
+            </a:r>
+            <a:r>
+              <a:rPr lang="de-DE" baseline="0" dirty="0" smtClean="0"/>
+              <a:t> </a:t>
+            </a:r>
+            <a:r>
+              <a:rPr lang="de-DE" baseline="0" dirty="0" err="1" smtClean="0"/>
+              <a:t>with</a:t>
+            </a:r>
+            <a:r>
+              <a:rPr lang="de-DE" baseline="0" dirty="0" smtClean="0"/>
+              <a:t> ab </a:t>
+            </a:r>
+            <a:r>
+              <a:rPr lang="de-DE" baseline="0" dirty="0" err="1" smtClean="0"/>
+              <a:t>browser</a:t>
+            </a:r>
+            <a:r>
+              <a:rPr lang="de-DE" baseline="0" dirty="0" smtClean="0"/>
+              <a:t>, </a:t>
+            </a:r>
+            <a:r>
+              <a:rPr lang="de-DE" baseline="0" dirty="0" err="1" smtClean="0"/>
+              <a:t>the</a:t>
+            </a:r>
+            <a:r>
+              <a:rPr lang="de-DE" baseline="0" dirty="0" smtClean="0"/>
+              <a:t> </a:t>
+            </a:r>
+            <a:r>
+              <a:rPr lang="de-DE" baseline="0" dirty="0" err="1" smtClean="0"/>
+              <a:t>answer</a:t>
+            </a:r>
+            <a:r>
+              <a:rPr lang="de-DE" baseline="0" dirty="0" smtClean="0"/>
+              <a:t> </a:t>
+            </a:r>
+            <a:r>
+              <a:rPr lang="de-DE" baseline="0" dirty="0" err="1" smtClean="0"/>
+              <a:t>is</a:t>
+            </a:r>
+            <a:r>
+              <a:rPr lang="de-DE" baseline="0" dirty="0" smtClean="0"/>
+              <a:t> easy.</a:t>
+            </a:r>
+          </a:p>
+          <a:p>
+            <a:r>
+              <a:rPr lang="de-DE" baseline="0" dirty="0" err="1" smtClean="0"/>
+              <a:t>We</a:t>
+            </a:r>
+            <a:r>
+              <a:rPr lang="de-DE" baseline="0" dirty="0" smtClean="0"/>
+              <a:t> just </a:t>
+            </a:r>
+            <a:r>
+              <a:rPr lang="de-DE" baseline="0" dirty="0" err="1" smtClean="0"/>
+              <a:t>have</a:t>
+            </a:r>
+            <a:r>
+              <a:rPr lang="de-DE" baseline="0" dirty="0" smtClean="0"/>
+              <a:t> </a:t>
+            </a:r>
+            <a:r>
+              <a:rPr lang="de-DE" baseline="0" dirty="0" err="1" smtClean="0"/>
+              <a:t>to</a:t>
+            </a:r>
+            <a:r>
+              <a:rPr lang="de-DE" baseline="0" dirty="0" smtClean="0"/>
+              <a:t> </a:t>
+            </a:r>
+            <a:r>
+              <a:rPr lang="de-DE" baseline="0" dirty="0" err="1" smtClean="0"/>
+              <a:t>fake</a:t>
+            </a:r>
+            <a:r>
+              <a:rPr lang="de-DE" baseline="0" dirty="0" smtClean="0"/>
+              <a:t> a real </a:t>
+            </a:r>
+            <a:r>
+              <a:rPr lang="de-DE" baseline="0" dirty="0" err="1" smtClean="0"/>
+              <a:t>person</a:t>
+            </a:r>
+            <a:r>
+              <a:rPr lang="de-DE" baseline="0" dirty="0" smtClean="0"/>
+              <a:t> </a:t>
+            </a:r>
+            <a:r>
+              <a:rPr lang="de-DE" baseline="0" dirty="0" err="1" smtClean="0"/>
+              <a:t>behind</a:t>
+            </a:r>
+            <a:r>
+              <a:rPr lang="de-DE" baseline="0" dirty="0" smtClean="0"/>
+              <a:t> a web </a:t>
+            </a:r>
+            <a:r>
+              <a:rPr lang="de-DE" baseline="0" dirty="0" err="1" smtClean="0"/>
+              <a:t>browser</a:t>
+            </a:r>
+            <a:r>
+              <a:rPr lang="de-DE" baseline="0" dirty="0" smtClean="0"/>
+              <a:t>!</a:t>
+            </a:r>
             <a:endParaRPr lang="de-DE" dirty="0"/>
           </a:p>
         </p:txBody>
@@ -2704,6 +6022,729 @@
               <a:rPr lang="de-DE" dirty="0" smtClean="0"/>
               <a:t>Manuel</a:t>
             </a:r>
+          </a:p>
+          <a:p>
+            <a:endParaRPr lang="de-DE" dirty="0" smtClean="0"/>
+          </a:p>
+          <a:p>
+            <a:r>
+              <a:rPr lang="de-DE" dirty="0" err="1" smtClean="0"/>
+              <a:t>This</a:t>
+            </a:r>
+            <a:r>
+              <a:rPr lang="de-DE" dirty="0" smtClean="0"/>
+              <a:t> </a:t>
+            </a:r>
+            <a:r>
+              <a:rPr lang="de-DE" dirty="0" err="1" smtClean="0"/>
+              <a:t>leads</a:t>
+            </a:r>
+            <a:r>
+              <a:rPr lang="de-DE" dirty="0" smtClean="0"/>
+              <a:t> </a:t>
+            </a:r>
+            <a:r>
+              <a:rPr lang="de-DE" dirty="0" err="1" smtClean="0"/>
+              <a:t>us</a:t>
+            </a:r>
+            <a:r>
+              <a:rPr lang="de-DE" dirty="0" smtClean="0"/>
+              <a:t> </a:t>
+            </a:r>
+            <a:r>
+              <a:rPr lang="de-DE" dirty="0" err="1" smtClean="0"/>
+              <a:t>to</a:t>
+            </a:r>
+            <a:r>
+              <a:rPr lang="de-DE" dirty="0" smtClean="0"/>
+              <a:t> </a:t>
+            </a:r>
+            <a:r>
+              <a:rPr lang="de-DE" dirty="0" err="1" smtClean="0"/>
+              <a:t>the</a:t>
+            </a:r>
+            <a:r>
+              <a:rPr lang="de-DE" dirty="0" smtClean="0"/>
+              <a:t> </a:t>
+            </a:r>
+            <a:r>
+              <a:rPr lang="de-DE" dirty="0" err="1" smtClean="0"/>
+              <a:t>next</a:t>
+            </a:r>
+            <a:r>
+              <a:rPr lang="de-DE" dirty="0" smtClean="0"/>
+              <a:t> </a:t>
+            </a:r>
+            <a:r>
+              <a:rPr lang="de-DE" dirty="0" err="1" smtClean="0"/>
+              <a:t>problem</a:t>
+            </a:r>
+            <a:r>
+              <a:rPr lang="de-DE" dirty="0" smtClean="0"/>
+              <a:t>, </a:t>
+            </a:r>
+            <a:r>
+              <a:rPr lang="de-DE" dirty="0" err="1" smtClean="0"/>
+              <a:t>how</a:t>
+            </a:r>
+            <a:r>
+              <a:rPr lang="de-DE" dirty="0" smtClean="0"/>
+              <a:t> do </a:t>
+            </a:r>
+            <a:r>
+              <a:rPr lang="de-DE" dirty="0" err="1" smtClean="0"/>
+              <a:t>we</a:t>
+            </a:r>
+            <a:r>
+              <a:rPr lang="de-DE" dirty="0" smtClean="0"/>
+              <a:t> </a:t>
+            </a:r>
+            <a:r>
+              <a:rPr lang="de-DE" dirty="0" err="1" smtClean="0"/>
+              <a:t>fake</a:t>
+            </a:r>
+            <a:r>
+              <a:rPr lang="de-DE" dirty="0" smtClean="0"/>
+              <a:t> a web </a:t>
+            </a:r>
+            <a:r>
+              <a:rPr lang="de-DE" dirty="0" err="1" smtClean="0"/>
+              <a:t>browser</a:t>
+            </a:r>
+            <a:r>
+              <a:rPr lang="de-DE" dirty="0" smtClean="0"/>
+              <a:t>?</a:t>
+            </a:r>
+          </a:p>
+          <a:p>
+            <a:r>
+              <a:rPr lang="de-DE" dirty="0" err="1" smtClean="0"/>
+              <a:t>To</a:t>
+            </a:r>
+            <a:r>
+              <a:rPr lang="de-DE" dirty="0" smtClean="0"/>
+              <a:t> </a:t>
+            </a:r>
+            <a:r>
+              <a:rPr lang="de-DE" dirty="0" err="1" smtClean="0"/>
+              <a:t>make</a:t>
+            </a:r>
+            <a:r>
+              <a:rPr lang="de-DE" dirty="0" smtClean="0"/>
+              <a:t> </a:t>
+            </a:r>
+            <a:r>
+              <a:rPr lang="de-DE" dirty="0" err="1" smtClean="0"/>
+              <a:t>this</a:t>
+            </a:r>
+            <a:r>
+              <a:rPr lang="de-DE" dirty="0" smtClean="0"/>
+              <a:t> </a:t>
+            </a:r>
+            <a:r>
+              <a:rPr lang="de-DE" dirty="0" err="1" smtClean="0"/>
+              <a:t>more</a:t>
+            </a:r>
+            <a:r>
+              <a:rPr lang="de-DE" dirty="0" smtClean="0"/>
+              <a:t> </a:t>
+            </a:r>
+            <a:r>
+              <a:rPr lang="de-DE" dirty="0" err="1" smtClean="0"/>
+              <a:t>complicated</a:t>
+            </a:r>
+            <a:r>
+              <a:rPr lang="de-DE" dirty="0" smtClean="0"/>
+              <a:t> </a:t>
+            </a:r>
+            <a:r>
+              <a:rPr lang="de-DE" dirty="0" err="1" smtClean="0"/>
+              <a:t>how</a:t>
+            </a:r>
+            <a:r>
+              <a:rPr lang="de-DE" dirty="0" smtClean="0"/>
+              <a:t> </a:t>
+            </a:r>
+            <a:r>
+              <a:rPr lang="de-DE" dirty="0" err="1" smtClean="0"/>
+              <a:t>can</a:t>
+            </a:r>
+            <a:r>
+              <a:rPr lang="de-DE" dirty="0" smtClean="0"/>
+              <a:t> </a:t>
+            </a:r>
+            <a:r>
+              <a:rPr lang="de-DE" dirty="0" err="1" smtClean="0"/>
+              <a:t>we</a:t>
+            </a:r>
+            <a:r>
+              <a:rPr lang="de-DE" dirty="0" smtClean="0"/>
+              <a:t> </a:t>
+            </a:r>
+            <a:r>
+              <a:rPr lang="de-DE" dirty="0" err="1" smtClean="0"/>
+              <a:t>fake</a:t>
+            </a:r>
+            <a:r>
+              <a:rPr lang="de-DE" dirty="0" smtClean="0"/>
+              <a:t> a web </a:t>
+            </a:r>
+            <a:r>
+              <a:rPr lang="de-DE" dirty="0" err="1" smtClean="0"/>
+              <a:t>browser</a:t>
+            </a:r>
+            <a:r>
+              <a:rPr lang="de-DE" dirty="0" smtClean="0"/>
+              <a:t> </a:t>
+            </a:r>
+            <a:r>
+              <a:rPr lang="de-DE" dirty="0" err="1" smtClean="0"/>
+              <a:t>with</a:t>
+            </a:r>
+            <a:r>
+              <a:rPr lang="de-DE" dirty="0" smtClean="0"/>
+              <a:t> HTTPS?</a:t>
+            </a:r>
+          </a:p>
+          <a:p>
+            <a:r>
+              <a:rPr lang="de-DE" dirty="0" err="1" smtClean="0"/>
+              <a:t>We</a:t>
+            </a:r>
+            <a:r>
+              <a:rPr lang="de-DE" baseline="0" dirty="0" smtClean="0"/>
+              <a:t> do </a:t>
+            </a:r>
+            <a:r>
+              <a:rPr lang="de-DE" baseline="0" dirty="0" err="1" smtClean="0"/>
+              <a:t>need</a:t>
+            </a:r>
+            <a:r>
+              <a:rPr lang="de-DE" baseline="0" dirty="0" smtClean="0"/>
+              <a:t> HTTPS, </a:t>
+            </a:r>
+            <a:r>
+              <a:rPr lang="de-DE" baseline="0" dirty="0" err="1" smtClean="0"/>
+              <a:t>because</a:t>
+            </a:r>
+            <a:r>
+              <a:rPr lang="de-DE" baseline="0" dirty="0" smtClean="0"/>
+              <a:t> </a:t>
+            </a:r>
+            <a:r>
+              <a:rPr lang="de-DE" baseline="0" dirty="0" err="1" smtClean="0"/>
+              <a:t>the</a:t>
+            </a:r>
+            <a:r>
+              <a:rPr lang="de-DE" baseline="0" dirty="0" smtClean="0"/>
+              <a:t> </a:t>
+            </a:r>
+            <a:r>
+              <a:rPr lang="de-DE" baseline="0" dirty="0" err="1" smtClean="0"/>
+              <a:t>student</a:t>
+            </a:r>
+            <a:r>
+              <a:rPr lang="de-DE" baseline="0" dirty="0" smtClean="0"/>
+              <a:t> terminal </a:t>
+            </a:r>
+            <a:r>
+              <a:rPr lang="de-DE" baseline="0" dirty="0" err="1" smtClean="0"/>
+              <a:t>does</a:t>
+            </a:r>
+            <a:r>
+              <a:rPr lang="de-DE" baseline="0" dirty="0" smtClean="0"/>
+              <a:t> not </a:t>
+            </a:r>
+            <a:r>
+              <a:rPr lang="de-DE" baseline="0" dirty="0" err="1" smtClean="0"/>
+              <a:t>allow</a:t>
+            </a:r>
+            <a:r>
+              <a:rPr lang="de-DE" baseline="0" dirty="0" smtClean="0"/>
+              <a:t> </a:t>
+            </a:r>
+            <a:r>
+              <a:rPr lang="de-DE" baseline="0" dirty="0" err="1" smtClean="0"/>
+              <a:t>unencrypted</a:t>
+            </a:r>
+            <a:r>
+              <a:rPr lang="de-DE" baseline="0" dirty="0" smtClean="0"/>
+              <a:t> HHTP </a:t>
+            </a:r>
+            <a:r>
+              <a:rPr lang="de-DE" baseline="0" dirty="0" err="1" smtClean="0"/>
+              <a:t>connections</a:t>
+            </a:r>
+            <a:r>
+              <a:rPr lang="de-DE" baseline="0" dirty="0" smtClean="0"/>
+              <a:t>.</a:t>
+            </a:r>
+          </a:p>
+          <a:p>
+            <a:endParaRPr lang="de-DE" baseline="0" dirty="0" smtClean="0"/>
+          </a:p>
+          <a:p>
+            <a:r>
+              <a:rPr lang="de-DE" baseline="0" dirty="0" err="1" smtClean="0"/>
+              <a:t>This</a:t>
+            </a:r>
+            <a:r>
+              <a:rPr lang="de-DE" baseline="0" dirty="0" smtClean="0"/>
+              <a:t> time </a:t>
+            </a:r>
+            <a:r>
+              <a:rPr lang="de-DE" baseline="0" dirty="0" err="1" smtClean="0"/>
+              <a:t>the</a:t>
+            </a:r>
+            <a:r>
+              <a:rPr lang="de-DE" baseline="0" dirty="0" smtClean="0"/>
+              <a:t> </a:t>
+            </a:r>
+            <a:r>
+              <a:rPr lang="de-DE" baseline="0" dirty="0" err="1" smtClean="0"/>
+              <a:t>answer</a:t>
+            </a:r>
+            <a:r>
+              <a:rPr lang="de-DE" baseline="0" dirty="0" smtClean="0"/>
+              <a:t> was not so easy, but </a:t>
+            </a:r>
+            <a:r>
+              <a:rPr lang="de-DE" baseline="0" dirty="0" err="1" smtClean="0"/>
+              <a:t>we</a:t>
+            </a:r>
+            <a:r>
+              <a:rPr lang="de-DE" baseline="0" dirty="0" smtClean="0"/>
+              <a:t> </a:t>
+            </a:r>
+            <a:r>
+              <a:rPr lang="de-DE" baseline="0" dirty="0" err="1" smtClean="0"/>
+              <a:t>looked</a:t>
+            </a:r>
+            <a:r>
+              <a:rPr lang="de-DE" baseline="0" dirty="0" smtClean="0"/>
+              <a:t> </a:t>
+            </a:r>
+            <a:r>
+              <a:rPr lang="de-DE" baseline="0" dirty="0" err="1" smtClean="0"/>
+              <a:t>around</a:t>
+            </a:r>
+            <a:r>
+              <a:rPr lang="de-DE" baseline="0" dirty="0" smtClean="0"/>
+              <a:t> </a:t>
+            </a:r>
+            <a:r>
+              <a:rPr lang="de-DE" baseline="0" dirty="0" err="1" smtClean="0"/>
+              <a:t>and</a:t>
+            </a:r>
+            <a:r>
+              <a:rPr lang="de-DE" baseline="0" dirty="0" smtClean="0"/>
+              <a:t> </a:t>
+            </a:r>
+            <a:r>
+              <a:rPr lang="de-DE" baseline="0" dirty="0" err="1" smtClean="0"/>
+              <a:t>found</a:t>
+            </a:r>
+            <a:r>
+              <a:rPr lang="de-DE" baseline="0" dirty="0" smtClean="0"/>
+              <a:t> a </a:t>
+            </a:r>
+            <a:r>
+              <a:rPr lang="de-DE" baseline="0" dirty="0" err="1" smtClean="0"/>
+              <a:t>perfect</a:t>
+            </a:r>
+            <a:r>
+              <a:rPr lang="de-DE" baseline="0" dirty="0" smtClean="0"/>
+              <a:t> </a:t>
+            </a:r>
+            <a:r>
+              <a:rPr lang="de-DE" baseline="0" dirty="0" err="1" smtClean="0"/>
+              <a:t>solution</a:t>
+            </a:r>
+            <a:r>
+              <a:rPr lang="de-DE" baseline="0" dirty="0" smtClean="0"/>
+              <a:t> in </a:t>
+            </a:r>
+            <a:r>
+              <a:rPr lang="de-DE" baseline="0" dirty="0" err="1" smtClean="0"/>
+              <a:t>the</a:t>
+            </a:r>
+            <a:r>
+              <a:rPr lang="de-DE" baseline="0" dirty="0" smtClean="0"/>
+              <a:t> </a:t>
+            </a:r>
+            <a:r>
+              <a:rPr lang="de-DE" baseline="0" dirty="0" err="1" smtClean="0"/>
+              <a:t>standard</a:t>
+            </a:r>
+            <a:r>
+              <a:rPr lang="de-DE" baseline="0" dirty="0" smtClean="0"/>
+              <a:t> </a:t>
+            </a:r>
+            <a:r>
+              <a:rPr lang="de-DE" baseline="0" dirty="0" err="1" smtClean="0"/>
+              <a:t>java</a:t>
+            </a:r>
+            <a:r>
+              <a:rPr lang="de-DE" baseline="0" dirty="0" smtClean="0"/>
+              <a:t> </a:t>
+            </a:r>
+            <a:r>
+              <a:rPr lang="de-DE" baseline="0" dirty="0" err="1" smtClean="0"/>
+              <a:t>library</a:t>
+            </a:r>
+            <a:r>
+              <a:rPr lang="de-DE" baseline="0" dirty="0" smtClean="0"/>
+              <a:t>.</a:t>
+            </a:r>
+          </a:p>
+          <a:p>
+            <a:r>
+              <a:rPr lang="de-DE" baseline="0" dirty="0" err="1" smtClean="0"/>
+              <a:t>There</a:t>
+            </a:r>
+            <a:r>
+              <a:rPr lang="de-DE" baseline="0" dirty="0" smtClean="0"/>
+              <a:t> </a:t>
+            </a:r>
+            <a:r>
+              <a:rPr lang="de-DE" baseline="0" dirty="0" err="1" smtClean="0"/>
+              <a:t>is</a:t>
+            </a:r>
+            <a:r>
+              <a:rPr lang="de-DE" baseline="0" dirty="0" smtClean="0"/>
+              <a:t> a </a:t>
+            </a:r>
+            <a:r>
+              <a:rPr lang="de-DE" baseline="0" dirty="0" err="1" smtClean="0"/>
+              <a:t>class</a:t>
+            </a:r>
+            <a:r>
+              <a:rPr lang="de-DE" baseline="0" dirty="0" smtClean="0"/>
+              <a:t> </a:t>
+            </a:r>
+            <a:r>
+              <a:rPr lang="de-DE" baseline="0" dirty="0" err="1" smtClean="0"/>
+              <a:t>named</a:t>
+            </a:r>
+            <a:r>
+              <a:rPr lang="de-DE" baseline="0" dirty="0" smtClean="0"/>
+              <a:t> </a:t>
+            </a:r>
+            <a:r>
+              <a:rPr lang="de-DE" baseline="0" dirty="0" err="1" smtClean="0"/>
+              <a:t>HttpsURLConnection</a:t>
+            </a:r>
+            <a:r>
+              <a:rPr lang="de-DE" baseline="0" dirty="0" smtClean="0"/>
+              <a:t> </a:t>
+            </a:r>
+            <a:r>
+              <a:rPr lang="de-DE" baseline="0" dirty="0" err="1" smtClean="0"/>
+              <a:t>which</a:t>
+            </a:r>
+            <a:r>
+              <a:rPr lang="de-DE" baseline="0" dirty="0" smtClean="0"/>
+              <a:t> </a:t>
+            </a:r>
+            <a:r>
+              <a:rPr lang="de-DE" baseline="0" dirty="0" err="1" smtClean="0"/>
+              <a:t>can</a:t>
+            </a:r>
+            <a:r>
+              <a:rPr lang="de-DE" baseline="0" dirty="0" smtClean="0"/>
+              <a:t> send </a:t>
+            </a:r>
+            <a:r>
+              <a:rPr lang="de-DE" baseline="0" dirty="0" err="1" smtClean="0"/>
+              <a:t>and</a:t>
+            </a:r>
+            <a:r>
+              <a:rPr lang="de-DE" baseline="0" dirty="0" smtClean="0"/>
+              <a:t> </a:t>
+            </a:r>
+            <a:r>
+              <a:rPr lang="en-US" sz="1200" kern="1200" dirty="0" smtClean="0">
+                <a:solidFill>
+                  <a:schemeClr val="tx1"/>
+                </a:solidFill>
+                <a:latin typeface="+mn-lt"/>
+                <a:ea typeface="+mn-ea"/>
+                <a:cs typeface="+mn-cs"/>
+              </a:rPr>
+              <a:t>receive </a:t>
+            </a:r>
+            <a:r>
+              <a:rPr lang="de-DE" baseline="0" dirty="0" err="1" smtClean="0"/>
+              <a:t>websites</a:t>
+            </a:r>
+            <a:r>
+              <a:rPr lang="de-DE" baseline="0" dirty="0" smtClean="0"/>
+              <a:t> </a:t>
+            </a:r>
+            <a:r>
+              <a:rPr lang="de-DE" baseline="0" dirty="0" err="1" smtClean="0"/>
+              <a:t>over</a:t>
+            </a:r>
+            <a:r>
+              <a:rPr lang="de-DE" baseline="0" dirty="0" smtClean="0"/>
+              <a:t> an </a:t>
+            </a:r>
+            <a:r>
+              <a:rPr lang="de-DE" baseline="0" dirty="0" err="1" smtClean="0"/>
+              <a:t>encrypted</a:t>
+            </a:r>
+            <a:r>
+              <a:rPr lang="de-DE" baseline="0" dirty="0" smtClean="0"/>
+              <a:t> HTTPS </a:t>
+            </a:r>
+            <a:r>
+              <a:rPr lang="de-DE" baseline="0" dirty="0" err="1" smtClean="0"/>
+              <a:t>connection</a:t>
+            </a:r>
+            <a:r>
+              <a:rPr lang="de-DE" baseline="0" dirty="0" smtClean="0"/>
+              <a:t>.</a:t>
+            </a:r>
+          </a:p>
+          <a:p>
+            <a:endParaRPr lang="de-DE" baseline="0" dirty="0" smtClean="0"/>
+          </a:p>
+          <a:p>
+            <a:r>
+              <a:rPr lang="de-DE" baseline="0" dirty="0" err="1" smtClean="0"/>
+              <a:t>To</a:t>
+            </a:r>
+            <a:r>
+              <a:rPr lang="de-DE" baseline="0" dirty="0" smtClean="0"/>
+              <a:t> </a:t>
+            </a:r>
+            <a:r>
+              <a:rPr lang="de-DE" baseline="0" dirty="0" err="1" smtClean="0"/>
+              <a:t>get</a:t>
+            </a:r>
+            <a:r>
+              <a:rPr lang="de-DE" baseline="0" dirty="0" smtClean="0"/>
+              <a:t> </a:t>
+            </a:r>
+            <a:r>
+              <a:rPr lang="de-DE" baseline="0" dirty="0" err="1" smtClean="0"/>
+              <a:t>the</a:t>
+            </a:r>
+            <a:r>
+              <a:rPr lang="de-DE" baseline="0" dirty="0" smtClean="0"/>
+              <a:t> </a:t>
+            </a:r>
+            <a:r>
+              <a:rPr lang="de-DE" baseline="0" dirty="0" err="1" smtClean="0"/>
+              <a:t>required</a:t>
+            </a:r>
+            <a:r>
+              <a:rPr lang="de-DE" baseline="0" dirty="0" smtClean="0"/>
+              <a:t> </a:t>
+            </a:r>
+            <a:r>
+              <a:rPr lang="de-DE" baseline="0" dirty="0" err="1" smtClean="0"/>
+              <a:t>websites</a:t>
+            </a:r>
+            <a:r>
+              <a:rPr lang="de-DE" baseline="0" dirty="0" smtClean="0"/>
+              <a:t> </a:t>
+            </a:r>
+            <a:r>
+              <a:rPr lang="de-DE" baseline="0" dirty="0" err="1" smtClean="0"/>
+              <a:t>we</a:t>
+            </a:r>
+            <a:r>
+              <a:rPr lang="de-DE" baseline="0" dirty="0" smtClean="0"/>
+              <a:t> send a HTTP POST </a:t>
+            </a:r>
+            <a:r>
+              <a:rPr lang="de-DE" baseline="0" dirty="0" err="1" smtClean="0"/>
+              <a:t>message</a:t>
+            </a:r>
+            <a:r>
+              <a:rPr lang="de-DE" baseline="0" dirty="0" smtClean="0"/>
+              <a:t> </a:t>
+            </a:r>
+            <a:r>
+              <a:rPr lang="de-DE" baseline="0" dirty="0" err="1" smtClean="0"/>
+              <a:t>with</a:t>
+            </a:r>
+            <a:r>
+              <a:rPr lang="de-DE" baseline="0" dirty="0" smtClean="0"/>
+              <a:t> </a:t>
+            </a:r>
+            <a:r>
+              <a:rPr lang="de-DE" baseline="0" dirty="0" err="1" smtClean="0"/>
+              <a:t>login</a:t>
+            </a:r>
+            <a:r>
+              <a:rPr lang="de-DE" baseline="0" dirty="0" smtClean="0"/>
+              <a:t> </a:t>
+            </a:r>
+            <a:r>
+              <a:rPr lang="de-DE" baseline="0" dirty="0" err="1" smtClean="0"/>
+              <a:t>and</a:t>
+            </a:r>
+            <a:r>
+              <a:rPr lang="de-DE" baseline="0" dirty="0" smtClean="0"/>
+              <a:t> </a:t>
+            </a:r>
+            <a:r>
+              <a:rPr lang="de-DE" baseline="0" dirty="0" err="1" smtClean="0"/>
+              <a:t>password</a:t>
+            </a:r>
+            <a:r>
+              <a:rPr lang="de-DE" baseline="0" dirty="0" smtClean="0"/>
+              <a:t>.</a:t>
+            </a:r>
+          </a:p>
+          <a:p>
+            <a:r>
+              <a:rPr lang="de-DE" baseline="0" dirty="0" smtClean="0"/>
+              <a:t>In </a:t>
+            </a:r>
+            <a:r>
+              <a:rPr lang="de-DE" baseline="0" dirty="0" err="1" smtClean="0"/>
+              <a:t>the</a:t>
+            </a:r>
+            <a:r>
+              <a:rPr lang="de-DE" baseline="0" dirty="0" smtClean="0"/>
+              <a:t> </a:t>
+            </a:r>
+            <a:r>
+              <a:rPr lang="de-DE" baseline="0" dirty="0" err="1" smtClean="0"/>
+              <a:t>answer</a:t>
+            </a:r>
+            <a:r>
+              <a:rPr lang="de-DE" baseline="0" dirty="0" smtClean="0"/>
+              <a:t> </a:t>
+            </a:r>
+            <a:r>
+              <a:rPr lang="de-DE" baseline="0" dirty="0" err="1" smtClean="0"/>
+              <a:t>is</a:t>
+            </a:r>
+            <a:r>
+              <a:rPr lang="de-DE" baseline="0" dirty="0" smtClean="0"/>
+              <a:t> a </a:t>
+            </a:r>
+            <a:r>
+              <a:rPr lang="de-DE" baseline="0" dirty="0" err="1" smtClean="0"/>
+              <a:t>cookie</a:t>
+            </a:r>
+            <a:r>
+              <a:rPr lang="de-DE" baseline="0" dirty="0" smtClean="0"/>
+              <a:t> </a:t>
+            </a:r>
+            <a:r>
+              <a:rPr lang="de-DE" baseline="0" dirty="0" err="1" smtClean="0"/>
+              <a:t>included</a:t>
+            </a:r>
+            <a:r>
+              <a:rPr lang="de-DE" baseline="0" dirty="0" smtClean="0"/>
+              <a:t>.</a:t>
+            </a:r>
+          </a:p>
+          <a:p>
+            <a:r>
+              <a:rPr lang="de-DE" baseline="0" dirty="0" err="1" smtClean="0"/>
+              <a:t>With</a:t>
+            </a:r>
+            <a:r>
+              <a:rPr lang="de-DE" baseline="0" dirty="0" smtClean="0"/>
+              <a:t> </a:t>
+            </a:r>
+            <a:r>
+              <a:rPr lang="de-DE" baseline="0" dirty="0" err="1" smtClean="0"/>
+              <a:t>this</a:t>
+            </a:r>
+            <a:r>
+              <a:rPr lang="de-DE" baseline="0" dirty="0" smtClean="0"/>
+              <a:t> </a:t>
+            </a:r>
+            <a:r>
+              <a:rPr lang="de-DE" baseline="0" dirty="0" err="1" smtClean="0"/>
+              <a:t>cookie</a:t>
+            </a:r>
+            <a:r>
+              <a:rPr lang="de-DE" baseline="0" dirty="0" smtClean="0"/>
+              <a:t>, </a:t>
+            </a:r>
+            <a:r>
+              <a:rPr lang="de-DE" baseline="0" dirty="0" err="1" smtClean="0"/>
+              <a:t>we</a:t>
+            </a:r>
+            <a:r>
+              <a:rPr lang="de-DE" baseline="0" dirty="0" smtClean="0"/>
+              <a:t> </a:t>
+            </a:r>
+            <a:r>
+              <a:rPr lang="de-DE" baseline="0" dirty="0" err="1" smtClean="0"/>
+              <a:t>can</a:t>
+            </a:r>
+            <a:r>
+              <a:rPr lang="de-DE" baseline="0" dirty="0" smtClean="0"/>
+              <a:t> </a:t>
+            </a:r>
+            <a:r>
+              <a:rPr lang="de-DE" baseline="0" dirty="0" err="1" smtClean="0"/>
+              <a:t>request</a:t>
+            </a:r>
+            <a:r>
+              <a:rPr lang="de-DE" baseline="0" dirty="0" smtClean="0"/>
+              <a:t> </a:t>
+            </a:r>
+            <a:r>
+              <a:rPr lang="de-DE" baseline="0" dirty="0" err="1" smtClean="0"/>
+              <a:t>the</a:t>
+            </a:r>
+            <a:r>
+              <a:rPr lang="de-DE" baseline="0" dirty="0" smtClean="0"/>
+              <a:t> </a:t>
+            </a:r>
+            <a:r>
+              <a:rPr lang="de-DE" baseline="0" dirty="0" err="1" smtClean="0"/>
+              <a:t>websites</a:t>
+            </a:r>
+            <a:r>
+              <a:rPr lang="de-DE" baseline="0" dirty="0" smtClean="0"/>
+              <a:t> </a:t>
+            </a:r>
+            <a:r>
+              <a:rPr lang="de-DE" baseline="0" dirty="0" err="1" smtClean="0"/>
+              <a:t>with</a:t>
+            </a:r>
+            <a:r>
+              <a:rPr lang="de-DE" baseline="0" dirty="0" smtClean="0"/>
+              <a:t> </a:t>
+            </a:r>
+            <a:r>
+              <a:rPr lang="de-DE" baseline="0" dirty="0" err="1" smtClean="0"/>
+              <a:t>the</a:t>
+            </a:r>
+            <a:r>
+              <a:rPr lang="de-DE" baseline="0" dirty="0" smtClean="0"/>
+              <a:t> </a:t>
+            </a:r>
+            <a:r>
+              <a:rPr lang="de-DE" baseline="0" dirty="0" err="1" smtClean="0"/>
+              <a:t>required</a:t>
+            </a:r>
+            <a:r>
+              <a:rPr lang="de-DE" baseline="0" dirty="0" smtClean="0"/>
+              <a:t> </a:t>
+            </a:r>
+            <a:r>
+              <a:rPr lang="de-DE" baseline="0" dirty="0" err="1" smtClean="0"/>
+              <a:t>information</a:t>
+            </a:r>
+            <a:r>
+              <a:rPr lang="de-DE" baseline="0" dirty="0" smtClean="0"/>
+              <a:t>.</a:t>
+            </a:r>
+            <a:endParaRPr lang="de-DE" dirty="0" smtClean="0"/>
+          </a:p>
+          <a:p>
             <a:endParaRPr lang="de-DE" dirty="0"/>
           </a:p>
         </p:txBody>
@@ -7097,7 +11138,7 @@
     </p:spTree>
     <p:extLst>
       <p:ext uri="{BB962C8B-B14F-4D97-AF65-F5344CB8AC3E}">
-        <p14:creationId xmlns:p14="http://schemas.microsoft.com/office/powerpoint/2010/main" val="2209468386"/>
+        <p14:creationId xmlns:p14="http://schemas.microsoft.com/office/powerpoint/2010/main" xmlns="" val="2209468386"/>
       </p:ext>
     </p:extLst>
   </p:cSld>
@@ -7633,11 +11674,15 @@
           <a:p>
             <a:r>
               <a:rPr lang="de-DE" b="1" dirty="0" err="1" smtClean="0"/>
-              <a:t>Planed</a:t>
+              <a:t>Planned</a:t>
             </a:r>
             <a:r>
               <a:rPr lang="de-DE" b="1" dirty="0" smtClean="0"/>
-              <a:t> Features:</a:t>
+              <a:t> </a:t>
+            </a:r>
+            <a:r>
+              <a:rPr lang="de-DE" b="1" dirty="0" smtClean="0"/>
+              <a:t>Features:</a:t>
             </a:r>
           </a:p>
           <a:p>

</xml_diff>